<commit_message>
Ver 6.1.4.3 - KN - 2025032   [Featute] Added OSRAM_ICC support.   [HseKeep] Remove VOLUME_OFST, AOT_HeightCloseLoop, AOT_FrontTestCloseLoop dependencies.   [Feature] Update ZPathDot   [BugFix] Update local TModel.modelNo to reflect correct model instance.   [HseKeep] Removed frm_LotEntryAnalog and dependencies Ver 6.1.4.1 - KN - 20250306 - Internal   [Feature] Added PAR_LINES selection for Weight or Volume   [BugFix] Fix IdlePurge for HPC3   [Changes] Update Messages to tidy error descriptions.   [Changes] Added RMCD class, to enable retrieval of list, usage not implemented.   [Features] Added TEVID, Support list of SVID, DVID and ECID.   [Features] Added feature to generate ID List and RMCD.
</commit_message>
<xml_diff>
--- a/Doc/Z Pattern Cast Height 20240905.pptx
+++ b/Doc/Z Pattern Cast Height 20240905.pptx
@@ -7,6 +7,7 @@
   <p:sldIdLst>
     <p:sldId id="257" r:id="rId2"/>
     <p:sldId id="256" r:id="rId3"/>
+    <p:sldId id="258" r:id="rId4"/>
   </p:sldIdLst>
   <p:sldSz cx="12192000" cy="6858000"/>
   <p:notesSz cx="6858000" cy="9144000"/>
@@ -260,7 +261,7 @@
           <a:p>
             <a:fld id="{FC340914-155A-4C7C-9240-728CD98F1C4F}" type="datetimeFigureOut">
               <a:rPr lang="en-US" smtClean="0"/>
-              <a:t>9/5/2024</a:t>
+              <a:t>3/19/2025</a:t>
             </a:fld>
             <a:endParaRPr lang="en-US"/>
           </a:p>
@@ -458,7 +459,7 @@
           <a:p>
             <a:fld id="{FC340914-155A-4C7C-9240-728CD98F1C4F}" type="datetimeFigureOut">
               <a:rPr lang="en-US" smtClean="0"/>
-              <a:t>9/5/2024</a:t>
+              <a:t>3/19/2025</a:t>
             </a:fld>
             <a:endParaRPr lang="en-US"/>
           </a:p>
@@ -666,7 +667,7 @@
           <a:p>
             <a:fld id="{FC340914-155A-4C7C-9240-728CD98F1C4F}" type="datetimeFigureOut">
               <a:rPr lang="en-US" smtClean="0"/>
-              <a:t>9/5/2024</a:t>
+              <a:t>3/19/2025</a:t>
             </a:fld>
             <a:endParaRPr lang="en-US"/>
           </a:p>
@@ -864,7 +865,7 @@
           <a:p>
             <a:fld id="{FC340914-155A-4C7C-9240-728CD98F1C4F}" type="datetimeFigureOut">
               <a:rPr lang="en-US" smtClean="0"/>
-              <a:t>9/5/2024</a:t>
+              <a:t>3/19/2025</a:t>
             </a:fld>
             <a:endParaRPr lang="en-US"/>
           </a:p>
@@ -1139,7 +1140,7 @@
           <a:p>
             <a:fld id="{FC340914-155A-4C7C-9240-728CD98F1C4F}" type="datetimeFigureOut">
               <a:rPr lang="en-US" smtClean="0"/>
-              <a:t>9/5/2024</a:t>
+              <a:t>3/19/2025</a:t>
             </a:fld>
             <a:endParaRPr lang="en-US"/>
           </a:p>
@@ -1404,7 +1405,7 @@
           <a:p>
             <a:fld id="{FC340914-155A-4C7C-9240-728CD98F1C4F}" type="datetimeFigureOut">
               <a:rPr lang="en-US" smtClean="0"/>
-              <a:t>9/5/2024</a:t>
+              <a:t>3/19/2025</a:t>
             </a:fld>
             <a:endParaRPr lang="en-US"/>
           </a:p>
@@ -1816,7 +1817,7 @@
           <a:p>
             <a:fld id="{FC340914-155A-4C7C-9240-728CD98F1C4F}" type="datetimeFigureOut">
               <a:rPr lang="en-US" smtClean="0"/>
-              <a:t>9/5/2024</a:t>
+              <a:t>3/19/2025</a:t>
             </a:fld>
             <a:endParaRPr lang="en-US"/>
           </a:p>
@@ -1957,7 +1958,7 @@
           <a:p>
             <a:fld id="{FC340914-155A-4C7C-9240-728CD98F1C4F}" type="datetimeFigureOut">
               <a:rPr lang="en-US" smtClean="0"/>
-              <a:t>9/5/2024</a:t>
+              <a:t>3/19/2025</a:t>
             </a:fld>
             <a:endParaRPr lang="en-US"/>
           </a:p>
@@ -2070,7 +2071,7 @@
           <a:p>
             <a:fld id="{FC340914-155A-4C7C-9240-728CD98F1C4F}" type="datetimeFigureOut">
               <a:rPr lang="en-US" smtClean="0"/>
-              <a:t>9/5/2024</a:t>
+              <a:t>3/19/2025</a:t>
             </a:fld>
             <a:endParaRPr lang="en-US"/>
           </a:p>
@@ -2381,7 +2382,7 @@
           <a:p>
             <a:fld id="{FC340914-155A-4C7C-9240-728CD98F1C4F}" type="datetimeFigureOut">
               <a:rPr lang="en-US" smtClean="0"/>
-              <a:t>9/5/2024</a:t>
+              <a:t>3/19/2025</a:t>
             </a:fld>
             <a:endParaRPr lang="en-US"/>
           </a:p>
@@ -2669,7 +2670,7 @@
           <a:p>
             <a:fld id="{FC340914-155A-4C7C-9240-728CD98F1C4F}" type="datetimeFigureOut">
               <a:rPr lang="en-US" smtClean="0"/>
-              <a:t>9/5/2024</a:t>
+              <a:t>3/19/2025</a:t>
             </a:fld>
             <a:endParaRPr lang="en-US"/>
           </a:p>
@@ -2910,7 +2911,7 @@
           <a:p>
             <a:fld id="{FC340914-155A-4C7C-9240-728CD98F1C4F}" type="datetimeFigureOut">
               <a:rPr lang="en-US" smtClean="0"/>
-              <a:t>9/5/2024</a:t>
+              <a:t>3/19/2025</a:t>
             </a:fld>
             <a:endParaRPr lang="en-US"/>
           </a:p>
@@ -3329,6 +3330,114 @@
       </p:grpSpPr>
       <p:sp>
         <p:nvSpPr>
+          <p:cNvPr id="32" name="Oval 31">
+            <a:extLst>
+              <a:ext uri="{FF2B5EF4-FFF2-40B4-BE49-F238E27FC236}">
+                <a16:creationId xmlns:a16="http://schemas.microsoft.com/office/drawing/2014/main" id="{24B974AC-55CA-02E2-B213-F6DF8ECB851C}"/>
+              </a:ext>
+            </a:extLst>
+          </p:cNvPr>
+          <p:cNvSpPr/>
+          <p:nvPr/>
+        </p:nvSpPr>
+        <p:spPr>
+          <a:xfrm>
+            <a:off x="4223792" y="3933056"/>
+            <a:ext cx="144016" cy="144016"/>
+          </a:xfrm>
+          <a:prstGeom prst="ellipse">
+            <a:avLst/>
+          </a:prstGeom>
+          <a:solidFill>
+            <a:schemeClr val="bg1">
+              <a:lumMod val="50000"/>
+            </a:schemeClr>
+          </a:solidFill>
+          <a:ln>
+            <a:noFill/>
+          </a:ln>
+        </p:spPr>
+        <p:style>
+          <a:lnRef idx="2">
+            <a:schemeClr val="accent1">
+              <a:shade val="15000"/>
+            </a:schemeClr>
+          </a:lnRef>
+          <a:fillRef idx="1">
+            <a:schemeClr val="accent1"/>
+          </a:fillRef>
+          <a:effectRef idx="0">
+            <a:schemeClr val="accent1"/>
+          </a:effectRef>
+          <a:fontRef idx="minor">
+            <a:schemeClr val="lt1"/>
+          </a:fontRef>
+        </p:style>
+        <p:txBody>
+          <a:bodyPr rtlCol="0" anchor="ctr"/>
+          <a:lstStyle/>
+          <a:p>
+            <a:pPr algn="ctr"/>
+            <a:endParaRPr lang="en-MY"/>
+          </a:p>
+        </p:txBody>
+      </p:sp>
+      <p:sp>
+        <p:nvSpPr>
+          <p:cNvPr id="44" name="Oval 43">
+            <a:extLst>
+              <a:ext uri="{FF2B5EF4-FFF2-40B4-BE49-F238E27FC236}">
+                <a16:creationId xmlns:a16="http://schemas.microsoft.com/office/drawing/2014/main" id="{EC056946-D161-4B41-3701-7D33EAABFC15}"/>
+              </a:ext>
+            </a:extLst>
+          </p:cNvPr>
+          <p:cNvSpPr/>
+          <p:nvPr/>
+        </p:nvSpPr>
+        <p:spPr>
+          <a:xfrm>
+            <a:off x="5591944" y="5157192"/>
+            <a:ext cx="144016" cy="144016"/>
+          </a:xfrm>
+          <a:prstGeom prst="ellipse">
+            <a:avLst/>
+          </a:prstGeom>
+          <a:solidFill>
+            <a:schemeClr val="bg1">
+              <a:lumMod val="50000"/>
+            </a:schemeClr>
+          </a:solidFill>
+          <a:ln>
+            <a:noFill/>
+          </a:ln>
+        </p:spPr>
+        <p:style>
+          <a:lnRef idx="2">
+            <a:schemeClr val="accent1">
+              <a:shade val="15000"/>
+            </a:schemeClr>
+          </a:lnRef>
+          <a:fillRef idx="1">
+            <a:schemeClr val="accent1"/>
+          </a:fillRef>
+          <a:effectRef idx="0">
+            <a:schemeClr val="accent1"/>
+          </a:effectRef>
+          <a:fontRef idx="minor">
+            <a:schemeClr val="lt1"/>
+          </a:fontRef>
+        </p:style>
+        <p:txBody>
+          <a:bodyPr rtlCol="0" anchor="ctr"/>
+          <a:lstStyle/>
+          <a:p>
+            <a:pPr algn="ctr"/>
+            <a:endParaRPr lang="en-MY"/>
+          </a:p>
+        </p:txBody>
+      </p:sp>
+      <p:sp>
+        <p:nvSpPr>
           <p:cNvPr id="23" name="Flowchart: Terminator 22">
             <a:extLst>
               <a:ext uri="{FF2B5EF4-FFF2-40B4-BE49-F238E27FC236}">
@@ -5493,6 +5602,4651 @@
           </a:p>
         </p:txBody>
       </p:sp>
+      <p:cxnSp>
+        <p:nvCxnSpPr>
+          <p:cNvPr id="8" name="Straight Arrow Connector 7">
+            <a:extLst>
+              <a:ext uri="{FF2B5EF4-FFF2-40B4-BE49-F238E27FC236}">
+                <a16:creationId xmlns:a16="http://schemas.microsoft.com/office/drawing/2014/main" id="{F144044C-45E1-B17F-3AFB-CA48FE9B98B2}"/>
+              </a:ext>
+            </a:extLst>
+          </p:cNvPr>
+          <p:cNvCxnSpPr>
+            <a:cxnSpLocks/>
+          </p:cNvCxnSpPr>
+          <p:nvPr/>
+        </p:nvCxnSpPr>
+        <p:spPr>
+          <a:xfrm>
+            <a:off x="4295800" y="4005064"/>
+            <a:ext cx="1368152" cy="0"/>
+          </a:xfrm>
+          <a:prstGeom prst="straightConnector1">
+            <a:avLst/>
+          </a:prstGeom>
+          <a:ln w="28575">
+            <a:solidFill>
+              <a:srgbClr val="FFC000"/>
+            </a:solidFill>
+            <a:headEnd w="lg" len="lg"/>
+            <a:tailEnd type="triangle" w="lg" len="lg"/>
+          </a:ln>
+        </p:spPr>
+        <p:style>
+          <a:lnRef idx="2">
+            <a:schemeClr val="accent1"/>
+          </a:lnRef>
+          <a:fillRef idx="0">
+            <a:schemeClr val="accent1"/>
+          </a:fillRef>
+          <a:effectRef idx="1">
+            <a:schemeClr val="accent1"/>
+          </a:effectRef>
+          <a:fontRef idx="minor">
+            <a:schemeClr val="tx1"/>
+          </a:fontRef>
+        </p:style>
+      </p:cxnSp>
+      <p:cxnSp>
+        <p:nvCxnSpPr>
+          <p:cNvPr id="10" name="Straight Arrow Connector 9">
+            <a:extLst>
+              <a:ext uri="{FF2B5EF4-FFF2-40B4-BE49-F238E27FC236}">
+                <a16:creationId xmlns:a16="http://schemas.microsoft.com/office/drawing/2014/main" id="{DA9E73A4-9635-093D-B5C0-D4011E3B67E4}"/>
+              </a:ext>
+            </a:extLst>
+          </p:cNvPr>
+          <p:cNvCxnSpPr>
+            <a:cxnSpLocks/>
+          </p:cNvCxnSpPr>
+          <p:nvPr/>
+        </p:nvCxnSpPr>
+        <p:spPr>
+          <a:xfrm flipH="1">
+            <a:off x="4295800" y="4005064"/>
+            <a:ext cx="1368152" cy="1224136"/>
+          </a:xfrm>
+          <a:prstGeom prst="straightConnector1">
+            <a:avLst/>
+          </a:prstGeom>
+          <a:ln w="28575">
+            <a:solidFill>
+              <a:srgbClr val="FFC000"/>
+            </a:solidFill>
+            <a:prstDash val="dash"/>
+            <a:headEnd w="lg" len="lg"/>
+            <a:tailEnd type="triangle" w="lg" len="lg"/>
+          </a:ln>
+        </p:spPr>
+        <p:style>
+          <a:lnRef idx="2">
+            <a:schemeClr val="accent1"/>
+          </a:lnRef>
+          <a:fillRef idx="0">
+            <a:schemeClr val="accent1"/>
+          </a:fillRef>
+          <a:effectRef idx="1">
+            <a:schemeClr val="accent1"/>
+          </a:effectRef>
+          <a:fontRef idx="minor">
+            <a:schemeClr val="tx1"/>
+          </a:fontRef>
+        </p:style>
+      </p:cxnSp>
+      <p:sp>
+        <p:nvSpPr>
+          <p:cNvPr id="28" name="Rectangle 27">
+            <a:extLst>
+              <a:ext uri="{FF2B5EF4-FFF2-40B4-BE49-F238E27FC236}">
+                <a16:creationId xmlns:a16="http://schemas.microsoft.com/office/drawing/2014/main" id="{EEC0DB7B-7C34-45B4-7684-DC1D290716F7}"/>
+              </a:ext>
+            </a:extLst>
+          </p:cNvPr>
+          <p:cNvSpPr/>
+          <p:nvPr/>
+        </p:nvSpPr>
+        <p:spPr>
+          <a:xfrm>
+            <a:off x="3935760" y="3429000"/>
+            <a:ext cx="720080" cy="338736"/>
+          </a:xfrm>
+          <a:prstGeom prst="rect">
+            <a:avLst/>
+          </a:prstGeom>
+          <a:noFill/>
+          <a:ln>
+            <a:noFill/>
+          </a:ln>
+        </p:spPr>
+        <p:style>
+          <a:lnRef idx="2">
+            <a:schemeClr val="accent1">
+              <a:shade val="15000"/>
+            </a:schemeClr>
+          </a:lnRef>
+          <a:fillRef idx="1">
+            <a:schemeClr val="accent1"/>
+          </a:fillRef>
+          <a:effectRef idx="0">
+            <a:schemeClr val="accent1"/>
+          </a:effectRef>
+          <a:fontRef idx="minor">
+            <a:schemeClr val="lt1"/>
+          </a:fontRef>
+        </p:style>
+        <p:txBody>
+          <a:bodyPr rtlCol="0" anchor="ctr"/>
+          <a:lstStyle/>
+          <a:p>
+            <a:pPr algn="ctr"/>
+            <a:r>
+              <a:rPr lang="en-US" sz="1100" dirty="0">
+                <a:solidFill>
+                  <a:sysClr val="windowText" lastClr="000000"/>
+                </a:solidFill>
+              </a:rPr>
+              <a:t>Point TL</a:t>
+            </a:r>
+          </a:p>
+        </p:txBody>
+      </p:sp>
+      <p:cxnSp>
+        <p:nvCxnSpPr>
+          <p:cNvPr id="38" name="Straight Arrow Connector 37">
+            <a:extLst>
+              <a:ext uri="{FF2B5EF4-FFF2-40B4-BE49-F238E27FC236}">
+                <a16:creationId xmlns:a16="http://schemas.microsoft.com/office/drawing/2014/main" id="{D0876022-643C-22D4-A221-EF0D39471A67}"/>
+              </a:ext>
+            </a:extLst>
+          </p:cNvPr>
+          <p:cNvCxnSpPr>
+            <a:cxnSpLocks/>
+          </p:cNvCxnSpPr>
+          <p:nvPr/>
+        </p:nvCxnSpPr>
+        <p:spPr>
+          <a:xfrm>
+            <a:off x="3647728" y="4005064"/>
+            <a:ext cx="648072" cy="0"/>
+          </a:xfrm>
+          <a:prstGeom prst="straightConnector1">
+            <a:avLst/>
+          </a:prstGeom>
+          <a:ln w="28575">
+            <a:solidFill>
+              <a:srgbClr val="FFC000"/>
+            </a:solidFill>
+            <a:headEnd w="lg" len="lg"/>
+            <a:tailEnd type="triangle" w="lg" len="lg"/>
+          </a:ln>
+        </p:spPr>
+        <p:style>
+          <a:lnRef idx="2">
+            <a:schemeClr val="accent1"/>
+          </a:lnRef>
+          <a:fillRef idx="0">
+            <a:schemeClr val="accent1"/>
+          </a:fillRef>
+          <a:effectRef idx="1">
+            <a:schemeClr val="accent1"/>
+          </a:effectRef>
+          <a:fontRef idx="minor">
+            <a:schemeClr val="tx1"/>
+          </a:fontRef>
+        </p:style>
+      </p:cxnSp>
+      <p:cxnSp>
+        <p:nvCxnSpPr>
+          <p:cNvPr id="41" name="Straight Arrow Connector 40">
+            <a:extLst>
+              <a:ext uri="{FF2B5EF4-FFF2-40B4-BE49-F238E27FC236}">
+                <a16:creationId xmlns:a16="http://schemas.microsoft.com/office/drawing/2014/main" id="{07EFE79D-25B9-5155-38E7-5CCBD753949E}"/>
+              </a:ext>
+            </a:extLst>
+          </p:cNvPr>
+          <p:cNvCxnSpPr>
+            <a:cxnSpLocks/>
+          </p:cNvCxnSpPr>
+          <p:nvPr/>
+        </p:nvCxnSpPr>
+        <p:spPr>
+          <a:xfrm>
+            <a:off x="4295800" y="5229200"/>
+            <a:ext cx="1368152" cy="0"/>
+          </a:xfrm>
+          <a:prstGeom prst="straightConnector1">
+            <a:avLst/>
+          </a:prstGeom>
+          <a:ln w="28575">
+            <a:solidFill>
+              <a:srgbClr val="FFC000"/>
+            </a:solidFill>
+            <a:headEnd w="lg" len="lg"/>
+            <a:tailEnd type="triangle" w="lg" len="lg"/>
+          </a:ln>
+        </p:spPr>
+        <p:style>
+          <a:lnRef idx="2">
+            <a:schemeClr val="accent1"/>
+          </a:lnRef>
+          <a:fillRef idx="0">
+            <a:schemeClr val="accent1"/>
+          </a:fillRef>
+          <a:effectRef idx="1">
+            <a:schemeClr val="accent1"/>
+          </a:effectRef>
+          <a:fontRef idx="minor">
+            <a:schemeClr val="tx1"/>
+          </a:fontRef>
+        </p:style>
+      </p:cxnSp>
+      <p:sp>
+        <p:nvSpPr>
+          <p:cNvPr id="45" name="Rectangle 44">
+            <a:extLst>
+              <a:ext uri="{FF2B5EF4-FFF2-40B4-BE49-F238E27FC236}">
+                <a16:creationId xmlns:a16="http://schemas.microsoft.com/office/drawing/2014/main" id="{FDC1440C-1101-A898-AA3B-9AB9AFABB6B6}"/>
+              </a:ext>
+            </a:extLst>
+          </p:cNvPr>
+          <p:cNvSpPr/>
+          <p:nvPr/>
+        </p:nvSpPr>
+        <p:spPr>
+          <a:xfrm>
+            <a:off x="5303912" y="5373216"/>
+            <a:ext cx="720080" cy="338736"/>
+          </a:xfrm>
+          <a:prstGeom prst="rect">
+            <a:avLst/>
+          </a:prstGeom>
+          <a:noFill/>
+          <a:ln>
+            <a:noFill/>
+          </a:ln>
+        </p:spPr>
+        <p:style>
+          <a:lnRef idx="2">
+            <a:schemeClr val="accent1">
+              <a:shade val="15000"/>
+            </a:schemeClr>
+          </a:lnRef>
+          <a:fillRef idx="1">
+            <a:schemeClr val="accent1"/>
+          </a:fillRef>
+          <a:effectRef idx="0">
+            <a:schemeClr val="accent1"/>
+          </a:effectRef>
+          <a:fontRef idx="minor">
+            <a:schemeClr val="lt1"/>
+          </a:fontRef>
+        </p:style>
+        <p:txBody>
+          <a:bodyPr rtlCol="0" anchor="ctr"/>
+          <a:lstStyle/>
+          <a:p>
+            <a:pPr algn="ctr"/>
+            <a:r>
+              <a:rPr lang="en-US" sz="1100" dirty="0">
+                <a:solidFill>
+                  <a:sysClr val="windowText" lastClr="000000"/>
+                </a:solidFill>
+              </a:rPr>
+              <a:t>Point BR</a:t>
+            </a:r>
+          </a:p>
+        </p:txBody>
+      </p:sp>
+      <p:sp>
+        <p:nvSpPr>
+          <p:cNvPr id="65" name="Rectangle 64">
+            <a:extLst>
+              <a:ext uri="{FF2B5EF4-FFF2-40B4-BE49-F238E27FC236}">
+                <a16:creationId xmlns:a16="http://schemas.microsoft.com/office/drawing/2014/main" id="{82D52841-914A-8460-FF34-A0AC4B81194E}"/>
+              </a:ext>
+            </a:extLst>
+          </p:cNvPr>
+          <p:cNvSpPr/>
+          <p:nvPr/>
+        </p:nvSpPr>
+        <p:spPr>
+          <a:xfrm>
+            <a:off x="4295800" y="4437112"/>
+            <a:ext cx="648072" cy="216024"/>
+          </a:xfrm>
+          <a:prstGeom prst="rect">
+            <a:avLst/>
+          </a:prstGeom>
+          <a:noFill/>
+          <a:ln>
+            <a:noFill/>
+          </a:ln>
+        </p:spPr>
+        <p:style>
+          <a:lnRef idx="2">
+            <a:schemeClr val="accent1">
+              <a:shade val="15000"/>
+            </a:schemeClr>
+          </a:lnRef>
+          <a:fillRef idx="1">
+            <a:schemeClr val="accent1"/>
+          </a:fillRef>
+          <a:effectRef idx="0">
+            <a:schemeClr val="accent1"/>
+          </a:effectRef>
+          <a:fontRef idx="minor">
+            <a:schemeClr val="lt1"/>
+          </a:fontRef>
+        </p:style>
+        <p:txBody>
+          <a:bodyPr rtlCol="0" anchor="ctr"/>
+          <a:lstStyle/>
+          <a:p>
+            <a:pPr algn="ctr"/>
+            <a:r>
+              <a:rPr lang="en-US" sz="900" dirty="0">
+                <a:solidFill>
+                  <a:sysClr val="windowText" lastClr="000000"/>
+                </a:solidFill>
+              </a:rPr>
+              <a:t>SpeedF</a:t>
+            </a:r>
+          </a:p>
+        </p:txBody>
+      </p:sp>
+      <p:sp>
+        <p:nvSpPr>
+          <p:cNvPr id="66" name="Rectangle 65">
+            <a:extLst>
+              <a:ext uri="{FF2B5EF4-FFF2-40B4-BE49-F238E27FC236}">
+                <a16:creationId xmlns:a16="http://schemas.microsoft.com/office/drawing/2014/main" id="{CBC2EFF1-A5F4-7562-63FC-163E74FF1997}"/>
+              </a:ext>
+            </a:extLst>
+          </p:cNvPr>
+          <p:cNvSpPr/>
+          <p:nvPr/>
+        </p:nvSpPr>
+        <p:spPr>
+          <a:xfrm>
+            <a:off x="4655840" y="3717032"/>
+            <a:ext cx="648072" cy="216024"/>
+          </a:xfrm>
+          <a:prstGeom prst="rect">
+            <a:avLst/>
+          </a:prstGeom>
+          <a:noFill/>
+          <a:ln>
+            <a:noFill/>
+          </a:ln>
+        </p:spPr>
+        <p:style>
+          <a:lnRef idx="2">
+            <a:schemeClr val="accent1">
+              <a:shade val="15000"/>
+            </a:schemeClr>
+          </a:lnRef>
+          <a:fillRef idx="1">
+            <a:schemeClr val="accent1"/>
+          </a:fillRef>
+          <a:effectRef idx="0">
+            <a:schemeClr val="accent1"/>
+          </a:effectRef>
+          <a:fontRef idx="minor">
+            <a:schemeClr val="lt1"/>
+          </a:fontRef>
+        </p:style>
+        <p:txBody>
+          <a:bodyPr rtlCol="0" anchor="ctr"/>
+          <a:lstStyle/>
+          <a:p>
+            <a:pPr algn="ctr"/>
+            <a:r>
+              <a:rPr lang="en-US" sz="900" dirty="0">
+                <a:solidFill>
+                  <a:sysClr val="windowText" lastClr="000000"/>
+                </a:solidFill>
+              </a:rPr>
+              <a:t>Speed</a:t>
+            </a:r>
+          </a:p>
+        </p:txBody>
+      </p:sp>
+      <p:sp>
+        <p:nvSpPr>
+          <p:cNvPr id="69" name="Rectangle 68">
+            <a:extLst>
+              <a:ext uri="{FF2B5EF4-FFF2-40B4-BE49-F238E27FC236}">
+                <a16:creationId xmlns:a16="http://schemas.microsoft.com/office/drawing/2014/main" id="{B224F6F6-EF00-C383-6409-DAE646D88DB0}"/>
+              </a:ext>
+            </a:extLst>
+          </p:cNvPr>
+          <p:cNvSpPr/>
+          <p:nvPr/>
+        </p:nvSpPr>
+        <p:spPr>
+          <a:xfrm>
+            <a:off x="4655840" y="5301208"/>
+            <a:ext cx="648072" cy="216024"/>
+          </a:xfrm>
+          <a:prstGeom prst="rect">
+            <a:avLst/>
+          </a:prstGeom>
+          <a:noFill/>
+          <a:ln>
+            <a:noFill/>
+          </a:ln>
+        </p:spPr>
+        <p:style>
+          <a:lnRef idx="2">
+            <a:schemeClr val="accent1">
+              <a:shade val="15000"/>
+            </a:schemeClr>
+          </a:lnRef>
+          <a:fillRef idx="1">
+            <a:schemeClr val="accent1"/>
+          </a:fillRef>
+          <a:effectRef idx="0">
+            <a:schemeClr val="accent1"/>
+          </a:effectRef>
+          <a:fontRef idx="minor">
+            <a:schemeClr val="lt1"/>
+          </a:fontRef>
+        </p:style>
+        <p:txBody>
+          <a:bodyPr rtlCol="0" anchor="ctr"/>
+          <a:lstStyle/>
+          <a:p>
+            <a:pPr algn="ctr"/>
+            <a:r>
+              <a:rPr lang="en-US" sz="900" dirty="0">
+                <a:solidFill>
+                  <a:sysClr val="windowText" lastClr="000000"/>
+                </a:solidFill>
+              </a:rPr>
+              <a:t>Speed</a:t>
+            </a:r>
+          </a:p>
+        </p:txBody>
+      </p:sp>
+      <p:cxnSp>
+        <p:nvCxnSpPr>
+          <p:cNvPr id="70" name="Straight Arrow Connector 69">
+            <a:extLst>
+              <a:ext uri="{FF2B5EF4-FFF2-40B4-BE49-F238E27FC236}">
+                <a16:creationId xmlns:a16="http://schemas.microsoft.com/office/drawing/2014/main" id="{71D69111-2BBF-3A65-FE14-549DA7C7FBB2}"/>
+              </a:ext>
+            </a:extLst>
+          </p:cNvPr>
+          <p:cNvCxnSpPr>
+            <a:cxnSpLocks/>
+          </p:cNvCxnSpPr>
+          <p:nvPr/>
+        </p:nvCxnSpPr>
+        <p:spPr>
+          <a:xfrm flipH="1" flipV="1">
+            <a:off x="5087888" y="4725144"/>
+            <a:ext cx="576064" cy="504056"/>
+          </a:xfrm>
+          <a:prstGeom prst="straightConnector1">
+            <a:avLst/>
+          </a:prstGeom>
+          <a:ln w="28575">
+            <a:solidFill>
+              <a:srgbClr val="FFC000"/>
+            </a:solidFill>
+            <a:prstDash val="solid"/>
+            <a:tailEnd type="triangle"/>
+          </a:ln>
+        </p:spPr>
+        <p:style>
+          <a:lnRef idx="2">
+            <a:schemeClr val="accent1"/>
+          </a:lnRef>
+          <a:fillRef idx="0">
+            <a:schemeClr val="accent1"/>
+          </a:fillRef>
+          <a:effectRef idx="1">
+            <a:schemeClr val="accent1"/>
+          </a:effectRef>
+          <a:fontRef idx="minor">
+            <a:schemeClr val="tx1"/>
+          </a:fontRef>
+        </p:style>
+      </p:cxnSp>
+      <p:sp>
+        <p:nvSpPr>
+          <p:cNvPr id="75" name="Rectangle 74">
+            <a:extLst>
+              <a:ext uri="{FF2B5EF4-FFF2-40B4-BE49-F238E27FC236}">
+                <a16:creationId xmlns:a16="http://schemas.microsoft.com/office/drawing/2014/main" id="{9CAE39EE-4C18-1F45-7588-08585DBF4CC2}"/>
+              </a:ext>
+            </a:extLst>
+          </p:cNvPr>
+          <p:cNvSpPr/>
+          <p:nvPr/>
+        </p:nvSpPr>
+        <p:spPr>
+          <a:xfrm>
+            <a:off x="4007768" y="4077072"/>
+            <a:ext cx="720080" cy="216024"/>
+          </a:xfrm>
+          <a:prstGeom prst="rect">
+            <a:avLst/>
+          </a:prstGeom>
+          <a:noFill/>
+          <a:ln>
+            <a:noFill/>
+          </a:ln>
+        </p:spPr>
+        <p:style>
+          <a:lnRef idx="2">
+            <a:schemeClr val="accent1">
+              <a:shade val="15000"/>
+            </a:schemeClr>
+          </a:lnRef>
+          <a:fillRef idx="1">
+            <a:schemeClr val="accent1"/>
+          </a:fillRef>
+          <a:effectRef idx="0">
+            <a:schemeClr val="accent1"/>
+          </a:effectRef>
+          <a:fontRef idx="minor">
+            <a:schemeClr val="lt1"/>
+          </a:fontRef>
+        </p:style>
+        <p:txBody>
+          <a:bodyPr rtlCol="0" anchor="ctr"/>
+          <a:lstStyle/>
+          <a:p>
+            <a:pPr algn="ctr"/>
+            <a:r>
+              <a:rPr lang="en-US" sz="800" dirty="0">
+                <a:solidFill>
+                  <a:sysClr val="windowText" lastClr="000000"/>
+                </a:solidFill>
+              </a:rPr>
+              <a:t>Disp Gap</a:t>
+            </a:r>
+          </a:p>
+        </p:txBody>
+      </p:sp>
+      <p:sp>
+        <p:nvSpPr>
+          <p:cNvPr id="77" name="Rectangle 76">
+            <a:extLst>
+              <a:ext uri="{FF2B5EF4-FFF2-40B4-BE49-F238E27FC236}">
+                <a16:creationId xmlns:a16="http://schemas.microsoft.com/office/drawing/2014/main" id="{13DD8898-763D-93E8-9D32-29C27D6D719F}"/>
+              </a:ext>
+            </a:extLst>
+          </p:cNvPr>
+          <p:cNvSpPr/>
+          <p:nvPr/>
+        </p:nvSpPr>
+        <p:spPr>
+          <a:xfrm>
+            <a:off x="3431704" y="4149080"/>
+            <a:ext cx="648072" cy="72008"/>
+          </a:xfrm>
+          <a:prstGeom prst="rect">
+            <a:avLst/>
+          </a:prstGeom>
+          <a:noFill/>
+          <a:ln>
+            <a:noFill/>
+          </a:ln>
+        </p:spPr>
+        <p:style>
+          <a:lnRef idx="2">
+            <a:schemeClr val="accent1">
+              <a:shade val="15000"/>
+            </a:schemeClr>
+          </a:lnRef>
+          <a:fillRef idx="1">
+            <a:schemeClr val="accent1"/>
+          </a:fillRef>
+          <a:effectRef idx="0">
+            <a:schemeClr val="accent1"/>
+          </a:effectRef>
+          <a:fontRef idx="minor">
+            <a:schemeClr val="lt1"/>
+          </a:fontRef>
+        </p:style>
+        <p:txBody>
+          <a:bodyPr rtlCol="0" anchor="ctr"/>
+          <a:lstStyle/>
+          <a:p>
+            <a:pPr algn="ctr"/>
+            <a:r>
+              <a:rPr lang="en-US" sz="800" dirty="0">
+                <a:solidFill>
+                  <a:sysClr val="windowText" lastClr="000000"/>
+                </a:solidFill>
+              </a:rPr>
+              <a:t>Start Gap</a:t>
+            </a:r>
+          </a:p>
+        </p:txBody>
+      </p:sp>
+      <p:sp>
+        <p:nvSpPr>
+          <p:cNvPr id="78" name="Rectangle 77">
+            <a:extLst>
+              <a:ext uri="{FF2B5EF4-FFF2-40B4-BE49-F238E27FC236}">
+                <a16:creationId xmlns:a16="http://schemas.microsoft.com/office/drawing/2014/main" id="{E1DC9670-64B1-2531-EAD1-D2B5C7539760}"/>
+              </a:ext>
+            </a:extLst>
+          </p:cNvPr>
+          <p:cNvSpPr/>
+          <p:nvPr/>
+        </p:nvSpPr>
+        <p:spPr>
+          <a:xfrm>
+            <a:off x="4799856" y="4941168"/>
+            <a:ext cx="648072" cy="72008"/>
+          </a:xfrm>
+          <a:prstGeom prst="rect">
+            <a:avLst/>
+          </a:prstGeom>
+          <a:noFill/>
+          <a:ln>
+            <a:noFill/>
+          </a:ln>
+        </p:spPr>
+        <p:style>
+          <a:lnRef idx="2">
+            <a:schemeClr val="accent1">
+              <a:shade val="15000"/>
+            </a:schemeClr>
+          </a:lnRef>
+          <a:fillRef idx="1">
+            <a:schemeClr val="accent1"/>
+          </a:fillRef>
+          <a:effectRef idx="0">
+            <a:schemeClr val="accent1"/>
+          </a:effectRef>
+          <a:fontRef idx="minor">
+            <a:schemeClr val="lt1"/>
+          </a:fontRef>
+        </p:style>
+        <p:txBody>
+          <a:bodyPr rtlCol="0" anchor="ctr"/>
+          <a:lstStyle/>
+          <a:p>
+            <a:r>
+              <a:rPr lang="en-US" sz="800" dirty="0">
+                <a:solidFill>
+                  <a:sysClr val="windowText" lastClr="000000"/>
+                </a:solidFill>
+              </a:rPr>
+              <a:t>End Gap</a:t>
+            </a:r>
+          </a:p>
+        </p:txBody>
+      </p:sp>
+      <p:sp>
+        <p:nvSpPr>
+          <p:cNvPr id="80" name="Rectangle 79">
+            <a:extLst>
+              <a:ext uri="{FF2B5EF4-FFF2-40B4-BE49-F238E27FC236}">
+                <a16:creationId xmlns:a16="http://schemas.microsoft.com/office/drawing/2014/main" id="{C8519135-3D37-5618-39B8-84585928C6BC}"/>
+              </a:ext>
+            </a:extLst>
+          </p:cNvPr>
+          <p:cNvSpPr/>
+          <p:nvPr/>
+        </p:nvSpPr>
+        <p:spPr>
+          <a:xfrm>
+            <a:off x="5231904" y="4581128"/>
+            <a:ext cx="936104" cy="144016"/>
+          </a:xfrm>
+          <a:prstGeom prst="rect">
+            <a:avLst/>
+          </a:prstGeom>
+          <a:noFill/>
+          <a:ln>
+            <a:noFill/>
+          </a:ln>
+        </p:spPr>
+        <p:style>
+          <a:lnRef idx="2">
+            <a:schemeClr val="accent1">
+              <a:shade val="15000"/>
+            </a:schemeClr>
+          </a:lnRef>
+          <a:fillRef idx="1">
+            <a:schemeClr val="accent1"/>
+          </a:fillRef>
+          <a:effectRef idx="0">
+            <a:schemeClr val="accent1"/>
+          </a:effectRef>
+          <a:fontRef idx="minor">
+            <a:schemeClr val="lt1"/>
+          </a:fontRef>
+        </p:style>
+        <p:txBody>
+          <a:bodyPr rtlCol="0" anchor="ctr"/>
+          <a:lstStyle/>
+          <a:p>
+            <a:pPr algn="ctr"/>
+            <a:r>
+              <a:rPr lang="en-US" sz="900" dirty="0">
+                <a:solidFill>
+                  <a:sysClr val="windowText" lastClr="000000"/>
+                </a:solidFill>
+              </a:rPr>
+              <a:t>End Length</a:t>
+            </a:r>
+          </a:p>
+        </p:txBody>
+      </p:sp>
+      <p:sp>
+        <p:nvSpPr>
+          <p:cNvPr id="82" name="Rectangle 81">
+            <a:extLst>
+              <a:ext uri="{FF2B5EF4-FFF2-40B4-BE49-F238E27FC236}">
+                <a16:creationId xmlns:a16="http://schemas.microsoft.com/office/drawing/2014/main" id="{5822248A-598F-C1E4-3B9B-16405EDDB332}"/>
+              </a:ext>
+            </a:extLst>
+          </p:cNvPr>
+          <p:cNvSpPr/>
+          <p:nvPr/>
+        </p:nvSpPr>
+        <p:spPr>
+          <a:xfrm>
+            <a:off x="3503712" y="3645024"/>
+            <a:ext cx="720080" cy="144016"/>
+          </a:xfrm>
+          <a:prstGeom prst="rect">
+            <a:avLst/>
+          </a:prstGeom>
+          <a:noFill/>
+          <a:ln>
+            <a:noFill/>
+          </a:ln>
+        </p:spPr>
+        <p:style>
+          <a:lnRef idx="2">
+            <a:schemeClr val="accent1">
+              <a:shade val="15000"/>
+            </a:schemeClr>
+          </a:lnRef>
+          <a:fillRef idx="1">
+            <a:schemeClr val="accent1"/>
+          </a:fillRef>
+          <a:effectRef idx="0">
+            <a:schemeClr val="accent1"/>
+          </a:effectRef>
+          <a:fontRef idx="minor">
+            <a:schemeClr val="lt1"/>
+          </a:fontRef>
+        </p:style>
+        <p:txBody>
+          <a:bodyPr rtlCol="0" anchor="ctr"/>
+          <a:lstStyle/>
+          <a:p>
+            <a:pPr algn="ctr"/>
+            <a:r>
+              <a:rPr lang="en-US" sz="800" dirty="0">
+                <a:solidFill>
+                  <a:sysClr val="windowText" lastClr="000000"/>
+                </a:solidFill>
+              </a:rPr>
+              <a:t>Start Length</a:t>
+            </a:r>
+          </a:p>
+        </p:txBody>
+      </p:sp>
+      <p:sp>
+        <p:nvSpPr>
+          <p:cNvPr id="83" name="Right Brace 82">
+            <a:extLst>
+              <a:ext uri="{FF2B5EF4-FFF2-40B4-BE49-F238E27FC236}">
+                <a16:creationId xmlns:a16="http://schemas.microsoft.com/office/drawing/2014/main" id="{3D0EA8F3-9B25-8066-BCC4-2F27815A2BDD}"/>
+              </a:ext>
+            </a:extLst>
+          </p:cNvPr>
+          <p:cNvSpPr/>
+          <p:nvPr/>
+        </p:nvSpPr>
+        <p:spPr>
+          <a:xfrm rot="16200000">
+            <a:off x="3858036" y="3578732"/>
+            <a:ext cx="155448" cy="576064"/>
+          </a:xfrm>
+          <a:prstGeom prst="rightBrace">
+            <a:avLst/>
+          </a:prstGeom>
+          <a:ln w="6350">
+            <a:solidFill>
+              <a:schemeClr val="bg1">
+                <a:lumMod val="50000"/>
+              </a:schemeClr>
+            </a:solidFill>
+          </a:ln>
+        </p:spPr>
+        <p:style>
+          <a:lnRef idx="2">
+            <a:schemeClr val="accent1"/>
+          </a:lnRef>
+          <a:fillRef idx="0">
+            <a:schemeClr val="accent1"/>
+          </a:fillRef>
+          <a:effectRef idx="1">
+            <a:schemeClr val="accent1"/>
+          </a:effectRef>
+          <a:fontRef idx="minor">
+            <a:schemeClr val="tx1"/>
+          </a:fontRef>
+        </p:style>
+        <p:txBody>
+          <a:bodyPr rtlCol="0" anchor="ctr"/>
+          <a:lstStyle/>
+          <a:p>
+            <a:pPr algn="ctr"/>
+            <a:endParaRPr lang="en-MY"/>
+          </a:p>
+        </p:txBody>
+      </p:sp>
+      <p:sp>
+        <p:nvSpPr>
+          <p:cNvPr id="85" name="Right Brace 84">
+            <a:extLst>
+              <a:ext uri="{FF2B5EF4-FFF2-40B4-BE49-F238E27FC236}">
+                <a16:creationId xmlns:a16="http://schemas.microsoft.com/office/drawing/2014/main" id="{CA9D096F-1D38-90B5-627A-E2A1A73ED6A4}"/>
+              </a:ext>
+            </a:extLst>
+          </p:cNvPr>
+          <p:cNvSpPr/>
+          <p:nvPr/>
+        </p:nvSpPr>
+        <p:spPr>
+          <a:xfrm rot="18718178">
+            <a:off x="5396811" y="4481432"/>
+            <a:ext cx="246247" cy="747016"/>
+          </a:xfrm>
+          <a:prstGeom prst="rightBrace">
+            <a:avLst/>
+          </a:prstGeom>
+          <a:ln w="6350">
+            <a:solidFill>
+              <a:schemeClr val="bg1">
+                <a:lumMod val="50000"/>
+              </a:schemeClr>
+            </a:solidFill>
+          </a:ln>
+        </p:spPr>
+        <p:style>
+          <a:lnRef idx="2">
+            <a:schemeClr val="accent1"/>
+          </a:lnRef>
+          <a:fillRef idx="0">
+            <a:schemeClr val="accent1"/>
+          </a:fillRef>
+          <a:effectRef idx="1">
+            <a:schemeClr val="accent1"/>
+          </a:effectRef>
+          <a:fontRef idx="minor">
+            <a:schemeClr val="tx1"/>
+          </a:fontRef>
+        </p:style>
+        <p:txBody>
+          <a:bodyPr rtlCol="0" anchor="ctr"/>
+          <a:lstStyle/>
+          <a:p>
+            <a:pPr algn="ctr"/>
+            <a:endParaRPr lang="en-MY"/>
+          </a:p>
+        </p:txBody>
+      </p:sp>
+      <p:cxnSp>
+        <p:nvCxnSpPr>
+          <p:cNvPr id="100" name="Straight Arrow Connector 99">
+            <a:extLst>
+              <a:ext uri="{FF2B5EF4-FFF2-40B4-BE49-F238E27FC236}">
+                <a16:creationId xmlns:a16="http://schemas.microsoft.com/office/drawing/2014/main" id="{71B796B6-D0E6-8D31-1754-3B052570FEAC}"/>
+              </a:ext>
+            </a:extLst>
+          </p:cNvPr>
+          <p:cNvCxnSpPr>
+            <a:cxnSpLocks/>
+            <a:endCxn id="32" idx="0"/>
+          </p:cNvCxnSpPr>
+          <p:nvPr/>
+        </p:nvCxnSpPr>
+        <p:spPr>
+          <a:xfrm>
+            <a:off x="4295800" y="3717032"/>
+            <a:ext cx="0" cy="216024"/>
+          </a:xfrm>
+          <a:prstGeom prst="straightConnector1">
+            <a:avLst/>
+          </a:prstGeom>
+          <a:ln w="3175">
+            <a:solidFill>
+              <a:schemeClr val="bg1">
+                <a:lumMod val="50000"/>
+              </a:schemeClr>
+            </a:solidFill>
+            <a:tailEnd type="triangle"/>
+          </a:ln>
+        </p:spPr>
+        <p:style>
+          <a:lnRef idx="2">
+            <a:schemeClr val="accent1"/>
+          </a:lnRef>
+          <a:fillRef idx="0">
+            <a:schemeClr val="accent1"/>
+          </a:fillRef>
+          <a:effectRef idx="1">
+            <a:schemeClr val="accent1"/>
+          </a:effectRef>
+          <a:fontRef idx="minor">
+            <a:schemeClr val="tx1"/>
+          </a:fontRef>
+        </p:style>
+      </p:cxnSp>
+      <p:cxnSp>
+        <p:nvCxnSpPr>
+          <p:cNvPr id="101" name="Straight Arrow Connector 100">
+            <a:extLst>
+              <a:ext uri="{FF2B5EF4-FFF2-40B4-BE49-F238E27FC236}">
+                <a16:creationId xmlns:a16="http://schemas.microsoft.com/office/drawing/2014/main" id="{8874BD2F-0DE6-CE02-4F80-F42C9B453B5A}"/>
+              </a:ext>
+            </a:extLst>
+          </p:cNvPr>
+          <p:cNvCxnSpPr>
+            <a:cxnSpLocks/>
+          </p:cNvCxnSpPr>
+          <p:nvPr/>
+        </p:nvCxnSpPr>
+        <p:spPr>
+          <a:xfrm flipV="1">
+            <a:off x="5663952" y="5301208"/>
+            <a:ext cx="0" cy="144016"/>
+          </a:xfrm>
+          <a:prstGeom prst="straightConnector1">
+            <a:avLst/>
+          </a:prstGeom>
+          <a:ln w="3175">
+            <a:solidFill>
+              <a:schemeClr val="bg1">
+                <a:lumMod val="50000"/>
+              </a:schemeClr>
+            </a:solidFill>
+            <a:tailEnd type="triangle"/>
+          </a:ln>
+        </p:spPr>
+        <p:style>
+          <a:lnRef idx="2">
+            <a:schemeClr val="accent1"/>
+          </a:lnRef>
+          <a:fillRef idx="0">
+            <a:schemeClr val="accent1"/>
+          </a:fillRef>
+          <a:effectRef idx="1">
+            <a:schemeClr val="accent1"/>
+          </a:effectRef>
+          <a:fontRef idx="minor">
+            <a:schemeClr val="tx1"/>
+          </a:fontRef>
+        </p:style>
+      </p:cxnSp>
+      <p:cxnSp>
+        <p:nvCxnSpPr>
+          <p:cNvPr id="105" name="Straight Arrow Connector 104">
+            <a:extLst>
+              <a:ext uri="{FF2B5EF4-FFF2-40B4-BE49-F238E27FC236}">
+                <a16:creationId xmlns:a16="http://schemas.microsoft.com/office/drawing/2014/main" id="{4952FE1D-A2E8-0A21-3066-DC61B33426E8}"/>
+              </a:ext>
+            </a:extLst>
+          </p:cNvPr>
+          <p:cNvCxnSpPr>
+            <a:cxnSpLocks/>
+          </p:cNvCxnSpPr>
+          <p:nvPr/>
+        </p:nvCxnSpPr>
+        <p:spPr>
+          <a:xfrm>
+            <a:off x="4871864" y="3933056"/>
+            <a:ext cx="216024" cy="0"/>
+          </a:xfrm>
+          <a:prstGeom prst="straightConnector1">
+            <a:avLst/>
+          </a:prstGeom>
+          <a:ln w="3175">
+            <a:solidFill>
+              <a:srgbClr val="00B050"/>
+            </a:solidFill>
+            <a:tailEnd type="triangle"/>
+          </a:ln>
+        </p:spPr>
+        <p:style>
+          <a:lnRef idx="2">
+            <a:schemeClr val="accent1"/>
+          </a:lnRef>
+          <a:fillRef idx="0">
+            <a:schemeClr val="accent1"/>
+          </a:fillRef>
+          <a:effectRef idx="1">
+            <a:schemeClr val="accent1"/>
+          </a:effectRef>
+          <a:fontRef idx="minor">
+            <a:schemeClr val="tx1"/>
+          </a:fontRef>
+        </p:style>
+      </p:cxnSp>
+      <p:cxnSp>
+        <p:nvCxnSpPr>
+          <p:cNvPr id="109" name="Straight Arrow Connector 108">
+            <a:extLst>
+              <a:ext uri="{FF2B5EF4-FFF2-40B4-BE49-F238E27FC236}">
+                <a16:creationId xmlns:a16="http://schemas.microsoft.com/office/drawing/2014/main" id="{5072C0A5-0033-0D32-FA17-3653E3858E5E}"/>
+              </a:ext>
+            </a:extLst>
+          </p:cNvPr>
+          <p:cNvCxnSpPr>
+            <a:cxnSpLocks/>
+          </p:cNvCxnSpPr>
+          <p:nvPr/>
+        </p:nvCxnSpPr>
+        <p:spPr>
+          <a:xfrm>
+            <a:off x="4871864" y="5301208"/>
+            <a:ext cx="216024" cy="0"/>
+          </a:xfrm>
+          <a:prstGeom prst="straightConnector1">
+            <a:avLst/>
+          </a:prstGeom>
+          <a:ln w="3175">
+            <a:solidFill>
+              <a:srgbClr val="00B050"/>
+            </a:solidFill>
+            <a:tailEnd type="triangle"/>
+          </a:ln>
+        </p:spPr>
+        <p:style>
+          <a:lnRef idx="2">
+            <a:schemeClr val="accent1"/>
+          </a:lnRef>
+          <a:fillRef idx="0">
+            <a:schemeClr val="accent1"/>
+          </a:fillRef>
+          <a:effectRef idx="1">
+            <a:schemeClr val="accent1"/>
+          </a:effectRef>
+          <a:fontRef idx="minor">
+            <a:schemeClr val="tx1"/>
+          </a:fontRef>
+        </p:style>
+      </p:cxnSp>
+      <p:cxnSp>
+        <p:nvCxnSpPr>
+          <p:cNvPr id="110" name="Straight Arrow Connector 109">
+            <a:extLst>
+              <a:ext uri="{FF2B5EF4-FFF2-40B4-BE49-F238E27FC236}">
+                <a16:creationId xmlns:a16="http://schemas.microsoft.com/office/drawing/2014/main" id="{2DB5EC27-2D37-4862-527D-E82C8FA6159A}"/>
+              </a:ext>
+            </a:extLst>
+          </p:cNvPr>
+          <p:cNvCxnSpPr>
+            <a:cxnSpLocks/>
+          </p:cNvCxnSpPr>
+          <p:nvPr/>
+        </p:nvCxnSpPr>
+        <p:spPr>
+          <a:xfrm flipH="1">
+            <a:off x="4799856" y="4509120"/>
+            <a:ext cx="144016" cy="144016"/>
+          </a:xfrm>
+          <a:prstGeom prst="straightConnector1">
+            <a:avLst/>
+          </a:prstGeom>
+          <a:ln w="3175">
+            <a:solidFill>
+              <a:srgbClr val="00B050"/>
+            </a:solidFill>
+            <a:tailEnd type="triangle"/>
+          </a:ln>
+        </p:spPr>
+        <p:style>
+          <a:lnRef idx="2">
+            <a:schemeClr val="accent1"/>
+          </a:lnRef>
+          <a:fillRef idx="0">
+            <a:schemeClr val="accent1"/>
+          </a:fillRef>
+          <a:effectRef idx="1">
+            <a:schemeClr val="accent1"/>
+          </a:effectRef>
+          <a:fontRef idx="minor">
+            <a:schemeClr val="tx1"/>
+          </a:fontRef>
+        </p:style>
+      </p:cxnSp>
+      <p:sp>
+        <p:nvSpPr>
+          <p:cNvPr id="112" name="Rectangle 111">
+            <a:extLst>
+              <a:ext uri="{FF2B5EF4-FFF2-40B4-BE49-F238E27FC236}">
+                <a16:creationId xmlns:a16="http://schemas.microsoft.com/office/drawing/2014/main" id="{2971128F-1B0B-DF50-4CF8-814D0DD92BE2}"/>
+              </a:ext>
+            </a:extLst>
+          </p:cNvPr>
+          <p:cNvSpPr/>
+          <p:nvPr/>
+        </p:nvSpPr>
+        <p:spPr>
+          <a:xfrm>
+            <a:off x="3359696" y="3429000"/>
+            <a:ext cx="2664296" cy="2304256"/>
+          </a:xfrm>
+          <a:prstGeom prst="rect">
+            <a:avLst/>
+          </a:prstGeom>
+          <a:noFill/>
+        </p:spPr>
+        <p:style>
+          <a:lnRef idx="2">
+            <a:schemeClr val="accent1">
+              <a:shade val="15000"/>
+            </a:schemeClr>
+          </a:lnRef>
+          <a:fillRef idx="1">
+            <a:schemeClr val="accent1"/>
+          </a:fillRef>
+          <a:effectRef idx="0">
+            <a:schemeClr val="accent1"/>
+          </a:effectRef>
+          <a:fontRef idx="minor">
+            <a:schemeClr val="lt1"/>
+          </a:fontRef>
+        </p:style>
+        <p:txBody>
+          <a:bodyPr rtlCol="0" anchor="ctr"/>
+          <a:lstStyle/>
+          <a:p>
+            <a:pPr algn="ctr"/>
+            <a:endParaRPr lang="en-MY"/>
+          </a:p>
+        </p:txBody>
+      </p:sp>
+      <p:grpSp>
+        <p:nvGrpSpPr>
+          <p:cNvPr id="35" name="Group 34">
+            <a:extLst>
+              <a:ext uri="{FF2B5EF4-FFF2-40B4-BE49-F238E27FC236}">
+                <a16:creationId xmlns:a16="http://schemas.microsoft.com/office/drawing/2014/main" id="{F3146198-E9A6-00AC-2D76-91E9F2A0D1B1}"/>
+              </a:ext>
+            </a:extLst>
+          </p:cNvPr>
+          <p:cNvGrpSpPr/>
+          <p:nvPr/>
+        </p:nvGrpSpPr>
+        <p:grpSpPr>
+          <a:xfrm>
+            <a:off x="3431704" y="4293096"/>
+            <a:ext cx="72008" cy="72008"/>
+            <a:chOff x="2711624" y="4149080"/>
+            <a:chExt cx="144016" cy="144016"/>
+          </a:xfrm>
+        </p:grpSpPr>
+        <p:sp>
+          <p:nvSpPr>
+            <p:cNvPr id="2" name="Oval 1">
+              <a:extLst>
+                <a:ext uri="{FF2B5EF4-FFF2-40B4-BE49-F238E27FC236}">
+                  <a16:creationId xmlns:a16="http://schemas.microsoft.com/office/drawing/2014/main" id="{7FC287BE-ADD1-1625-5D53-2DE145558273}"/>
+                </a:ext>
+              </a:extLst>
+            </p:cNvPr>
+            <p:cNvSpPr/>
+            <p:nvPr/>
+          </p:nvSpPr>
+          <p:spPr>
+            <a:xfrm>
+              <a:off x="2711624" y="4149080"/>
+              <a:ext cx="144016" cy="144016"/>
+            </a:xfrm>
+            <a:prstGeom prst="ellipse">
+              <a:avLst/>
+            </a:prstGeom>
+            <a:noFill/>
+            <a:ln w="9525"/>
+          </p:spPr>
+          <p:style>
+            <a:lnRef idx="2">
+              <a:schemeClr val="accent1">
+                <a:shade val="15000"/>
+              </a:schemeClr>
+            </a:lnRef>
+            <a:fillRef idx="1">
+              <a:schemeClr val="accent1"/>
+            </a:fillRef>
+            <a:effectRef idx="0">
+              <a:schemeClr val="accent1"/>
+            </a:effectRef>
+            <a:fontRef idx="minor">
+              <a:schemeClr val="lt1"/>
+            </a:fontRef>
+          </p:style>
+          <p:txBody>
+            <a:bodyPr rtlCol="0" anchor="ctr"/>
+            <a:lstStyle/>
+            <a:p>
+              <a:pPr algn="ctr"/>
+              <a:endParaRPr lang="en-MY"/>
+            </a:p>
+          </p:txBody>
+        </p:sp>
+        <p:cxnSp>
+          <p:nvCxnSpPr>
+            <p:cNvPr id="4" name="Straight Connector 3">
+              <a:extLst>
+                <a:ext uri="{FF2B5EF4-FFF2-40B4-BE49-F238E27FC236}">
+                  <a16:creationId xmlns:a16="http://schemas.microsoft.com/office/drawing/2014/main" id="{5F2E5FCA-F3E1-8F7E-CF8B-3678FEFBEC4E}"/>
+                </a:ext>
+              </a:extLst>
+            </p:cNvPr>
+            <p:cNvCxnSpPr>
+              <a:cxnSpLocks/>
+            </p:cNvCxnSpPr>
+            <p:nvPr/>
+          </p:nvCxnSpPr>
+          <p:spPr>
+            <a:xfrm>
+              <a:off x="2783632" y="4149080"/>
+              <a:ext cx="0" cy="72008"/>
+            </a:xfrm>
+            <a:prstGeom prst="line">
+              <a:avLst/>
+            </a:prstGeom>
+            <a:ln w="9525"/>
+          </p:spPr>
+          <p:style>
+            <a:lnRef idx="2">
+              <a:schemeClr val="dk1"/>
+            </a:lnRef>
+            <a:fillRef idx="0">
+              <a:schemeClr val="dk1"/>
+            </a:fillRef>
+            <a:effectRef idx="1">
+              <a:schemeClr val="dk1"/>
+            </a:effectRef>
+            <a:fontRef idx="minor">
+              <a:schemeClr val="tx1"/>
+            </a:fontRef>
+          </p:style>
+        </p:cxnSp>
+        <p:cxnSp>
+          <p:nvCxnSpPr>
+            <p:cNvPr id="12" name="Straight Connector 11">
+              <a:extLst>
+                <a:ext uri="{FF2B5EF4-FFF2-40B4-BE49-F238E27FC236}">
+                  <a16:creationId xmlns:a16="http://schemas.microsoft.com/office/drawing/2014/main" id="{BB9432AE-400A-2F8A-432A-515BC0565897}"/>
+                </a:ext>
+              </a:extLst>
+            </p:cNvPr>
+            <p:cNvCxnSpPr>
+              <a:cxnSpLocks/>
+            </p:cNvCxnSpPr>
+            <p:nvPr/>
+          </p:nvCxnSpPr>
+          <p:spPr>
+            <a:xfrm flipH="1">
+              <a:off x="2711624" y="4221088"/>
+              <a:ext cx="72008" cy="0"/>
+            </a:xfrm>
+            <a:prstGeom prst="line">
+              <a:avLst/>
+            </a:prstGeom>
+            <a:ln w="9525"/>
+          </p:spPr>
+          <p:style>
+            <a:lnRef idx="2">
+              <a:schemeClr val="dk1"/>
+            </a:lnRef>
+            <a:fillRef idx="0">
+              <a:schemeClr val="dk1"/>
+            </a:fillRef>
+            <a:effectRef idx="1">
+              <a:schemeClr val="dk1"/>
+            </a:effectRef>
+            <a:fontRef idx="minor">
+              <a:schemeClr val="tx1"/>
+            </a:fontRef>
+          </p:style>
+        </p:cxnSp>
+      </p:grpSp>
+      <p:sp>
+        <p:nvSpPr>
+          <p:cNvPr id="36" name="Rectangle 35">
+            <a:extLst>
+              <a:ext uri="{FF2B5EF4-FFF2-40B4-BE49-F238E27FC236}">
+                <a16:creationId xmlns:a16="http://schemas.microsoft.com/office/drawing/2014/main" id="{2FCC57CE-A59C-E5EB-4B53-246A2DDD1A6C}"/>
+              </a:ext>
+            </a:extLst>
+          </p:cNvPr>
+          <p:cNvSpPr/>
+          <p:nvPr/>
+        </p:nvSpPr>
+        <p:spPr>
+          <a:xfrm>
+            <a:off x="3438904" y="4293096"/>
+            <a:ext cx="712879" cy="72008"/>
+          </a:xfrm>
+          <a:prstGeom prst="rect">
+            <a:avLst/>
+          </a:prstGeom>
+          <a:noFill/>
+          <a:ln>
+            <a:noFill/>
+          </a:ln>
+        </p:spPr>
+        <p:style>
+          <a:lnRef idx="2">
+            <a:schemeClr val="accent1">
+              <a:shade val="15000"/>
+            </a:schemeClr>
+          </a:lnRef>
+          <a:fillRef idx="1">
+            <a:schemeClr val="accent1"/>
+          </a:fillRef>
+          <a:effectRef idx="0">
+            <a:schemeClr val="accent1"/>
+          </a:effectRef>
+          <a:fontRef idx="minor">
+            <a:schemeClr val="lt1"/>
+          </a:fontRef>
+        </p:style>
+        <p:txBody>
+          <a:bodyPr rtlCol="0" anchor="ctr"/>
+          <a:lstStyle/>
+          <a:p>
+            <a:pPr algn="ctr"/>
+            <a:r>
+              <a:rPr lang="en-US" sz="800" dirty="0">
+                <a:solidFill>
+                  <a:sysClr val="windowText" lastClr="000000"/>
+                </a:solidFill>
+              </a:rPr>
+              <a:t>Down Wait</a:t>
+            </a:r>
+          </a:p>
+        </p:txBody>
+      </p:sp>
+      <p:grpSp>
+        <p:nvGrpSpPr>
+          <p:cNvPr id="37" name="Group 36">
+            <a:extLst>
+              <a:ext uri="{FF2B5EF4-FFF2-40B4-BE49-F238E27FC236}">
+                <a16:creationId xmlns:a16="http://schemas.microsoft.com/office/drawing/2014/main" id="{BD9DA64A-AE5F-59B1-767C-2DE999EB7F22}"/>
+              </a:ext>
+            </a:extLst>
+          </p:cNvPr>
+          <p:cNvGrpSpPr/>
+          <p:nvPr/>
+        </p:nvGrpSpPr>
+        <p:grpSpPr>
+          <a:xfrm>
+            <a:off x="4799856" y="5085184"/>
+            <a:ext cx="72008" cy="72008"/>
+            <a:chOff x="2711624" y="4149080"/>
+            <a:chExt cx="144016" cy="144016"/>
+          </a:xfrm>
+        </p:grpSpPr>
+        <p:sp>
+          <p:nvSpPr>
+            <p:cNvPr id="39" name="Oval 38">
+              <a:extLst>
+                <a:ext uri="{FF2B5EF4-FFF2-40B4-BE49-F238E27FC236}">
+                  <a16:creationId xmlns:a16="http://schemas.microsoft.com/office/drawing/2014/main" id="{D9B01D0B-8FD9-250D-4FDE-9C1ACD483CB0}"/>
+                </a:ext>
+              </a:extLst>
+            </p:cNvPr>
+            <p:cNvSpPr/>
+            <p:nvPr/>
+          </p:nvSpPr>
+          <p:spPr>
+            <a:xfrm>
+              <a:off x="2711624" y="4149080"/>
+              <a:ext cx="144016" cy="144016"/>
+            </a:xfrm>
+            <a:prstGeom prst="ellipse">
+              <a:avLst/>
+            </a:prstGeom>
+            <a:noFill/>
+            <a:ln w="9525"/>
+          </p:spPr>
+          <p:style>
+            <a:lnRef idx="2">
+              <a:schemeClr val="accent1">
+                <a:shade val="15000"/>
+              </a:schemeClr>
+            </a:lnRef>
+            <a:fillRef idx="1">
+              <a:schemeClr val="accent1"/>
+            </a:fillRef>
+            <a:effectRef idx="0">
+              <a:schemeClr val="accent1"/>
+            </a:effectRef>
+            <a:fontRef idx="minor">
+              <a:schemeClr val="lt1"/>
+            </a:fontRef>
+          </p:style>
+          <p:txBody>
+            <a:bodyPr rtlCol="0" anchor="ctr"/>
+            <a:lstStyle/>
+            <a:p>
+              <a:pPr algn="ctr"/>
+              <a:endParaRPr lang="en-MY"/>
+            </a:p>
+          </p:txBody>
+        </p:sp>
+        <p:cxnSp>
+          <p:nvCxnSpPr>
+            <p:cNvPr id="40" name="Straight Connector 39">
+              <a:extLst>
+                <a:ext uri="{FF2B5EF4-FFF2-40B4-BE49-F238E27FC236}">
+                  <a16:creationId xmlns:a16="http://schemas.microsoft.com/office/drawing/2014/main" id="{018710EC-12D1-9250-19DB-2F8D644D5AB2}"/>
+                </a:ext>
+              </a:extLst>
+            </p:cNvPr>
+            <p:cNvCxnSpPr>
+              <a:cxnSpLocks/>
+            </p:cNvCxnSpPr>
+            <p:nvPr/>
+          </p:nvCxnSpPr>
+          <p:spPr>
+            <a:xfrm>
+              <a:off x="2783632" y="4149080"/>
+              <a:ext cx="0" cy="72008"/>
+            </a:xfrm>
+            <a:prstGeom prst="line">
+              <a:avLst/>
+            </a:prstGeom>
+            <a:ln w="9525"/>
+          </p:spPr>
+          <p:style>
+            <a:lnRef idx="2">
+              <a:schemeClr val="dk1"/>
+            </a:lnRef>
+            <a:fillRef idx="0">
+              <a:schemeClr val="dk1"/>
+            </a:fillRef>
+            <a:effectRef idx="1">
+              <a:schemeClr val="dk1"/>
+            </a:effectRef>
+            <a:fontRef idx="minor">
+              <a:schemeClr val="tx1"/>
+            </a:fontRef>
+          </p:style>
+        </p:cxnSp>
+        <p:cxnSp>
+          <p:nvCxnSpPr>
+            <p:cNvPr id="42" name="Straight Connector 41">
+              <a:extLst>
+                <a:ext uri="{FF2B5EF4-FFF2-40B4-BE49-F238E27FC236}">
+                  <a16:creationId xmlns:a16="http://schemas.microsoft.com/office/drawing/2014/main" id="{3241B60C-F07E-F588-575B-8D1E6F1F0C28}"/>
+                </a:ext>
+              </a:extLst>
+            </p:cNvPr>
+            <p:cNvCxnSpPr>
+              <a:cxnSpLocks/>
+            </p:cNvCxnSpPr>
+            <p:nvPr/>
+          </p:nvCxnSpPr>
+          <p:spPr>
+            <a:xfrm flipH="1">
+              <a:off x="2711624" y="4221088"/>
+              <a:ext cx="72008" cy="0"/>
+            </a:xfrm>
+            <a:prstGeom prst="line">
+              <a:avLst/>
+            </a:prstGeom>
+            <a:ln w="9525"/>
+          </p:spPr>
+          <p:style>
+            <a:lnRef idx="2">
+              <a:schemeClr val="dk1"/>
+            </a:lnRef>
+            <a:fillRef idx="0">
+              <a:schemeClr val="dk1"/>
+            </a:fillRef>
+            <a:effectRef idx="1">
+              <a:schemeClr val="dk1"/>
+            </a:effectRef>
+            <a:fontRef idx="minor">
+              <a:schemeClr val="tx1"/>
+            </a:fontRef>
+          </p:style>
+        </p:cxnSp>
+      </p:grpSp>
+      <p:sp>
+        <p:nvSpPr>
+          <p:cNvPr id="43" name="Rectangle 42">
+            <a:extLst>
+              <a:ext uri="{FF2B5EF4-FFF2-40B4-BE49-F238E27FC236}">
+                <a16:creationId xmlns:a16="http://schemas.microsoft.com/office/drawing/2014/main" id="{BD6C1350-5D45-AAE5-087E-A8753CD05EE2}"/>
+              </a:ext>
+            </a:extLst>
+          </p:cNvPr>
+          <p:cNvSpPr/>
+          <p:nvPr/>
+        </p:nvSpPr>
+        <p:spPr>
+          <a:xfrm>
+            <a:off x="4799856" y="5085184"/>
+            <a:ext cx="648071" cy="72008"/>
+          </a:xfrm>
+          <a:prstGeom prst="rect">
+            <a:avLst/>
+          </a:prstGeom>
+          <a:noFill/>
+          <a:ln>
+            <a:noFill/>
+          </a:ln>
+        </p:spPr>
+        <p:style>
+          <a:lnRef idx="2">
+            <a:schemeClr val="accent1">
+              <a:shade val="15000"/>
+            </a:schemeClr>
+          </a:lnRef>
+          <a:fillRef idx="1">
+            <a:schemeClr val="accent1"/>
+          </a:fillRef>
+          <a:effectRef idx="0">
+            <a:schemeClr val="accent1"/>
+          </a:effectRef>
+          <a:fontRef idx="minor">
+            <a:schemeClr val="lt1"/>
+          </a:fontRef>
+        </p:style>
+        <p:txBody>
+          <a:bodyPr rtlCol="0" anchor="ctr"/>
+          <a:lstStyle/>
+          <a:p>
+            <a:r>
+              <a:rPr lang="en-US" sz="800" dirty="0">
+                <a:solidFill>
+                  <a:sysClr val="windowText" lastClr="000000"/>
+                </a:solidFill>
+              </a:rPr>
+              <a:t>Post Wait</a:t>
+            </a:r>
+          </a:p>
+        </p:txBody>
+      </p:sp>
+      <p:sp>
+        <p:nvSpPr>
+          <p:cNvPr id="46" name="Rectangle 45">
+            <a:extLst>
+              <a:ext uri="{FF2B5EF4-FFF2-40B4-BE49-F238E27FC236}">
+                <a16:creationId xmlns:a16="http://schemas.microsoft.com/office/drawing/2014/main" id="{5383F9FF-D251-3B8D-F84D-48BD4031EEB8}"/>
+              </a:ext>
+            </a:extLst>
+          </p:cNvPr>
+          <p:cNvSpPr/>
+          <p:nvPr/>
+        </p:nvSpPr>
+        <p:spPr>
+          <a:xfrm>
+            <a:off x="3719736" y="4005064"/>
+            <a:ext cx="432048" cy="144016"/>
+          </a:xfrm>
+          <a:prstGeom prst="rect">
+            <a:avLst/>
+          </a:prstGeom>
+          <a:noFill/>
+          <a:ln>
+            <a:noFill/>
+          </a:ln>
+        </p:spPr>
+        <p:style>
+          <a:lnRef idx="2">
+            <a:schemeClr val="accent1">
+              <a:shade val="15000"/>
+            </a:schemeClr>
+          </a:lnRef>
+          <a:fillRef idx="1">
+            <a:schemeClr val="accent1"/>
+          </a:fillRef>
+          <a:effectRef idx="0">
+            <a:schemeClr val="accent1"/>
+          </a:effectRef>
+          <a:fontRef idx="minor">
+            <a:schemeClr val="lt1"/>
+          </a:fontRef>
+        </p:style>
+        <p:txBody>
+          <a:bodyPr rtlCol="0" anchor="ctr"/>
+          <a:lstStyle/>
+          <a:p>
+            <a:pPr algn="ctr"/>
+            <a:r>
+              <a:rPr lang="en-US" sz="800" dirty="0">
+                <a:solidFill>
+                  <a:sysClr val="windowText" lastClr="000000"/>
+                </a:solidFill>
+              </a:rPr>
+              <a:t>D1</a:t>
+            </a:r>
+          </a:p>
+        </p:txBody>
+      </p:sp>
+      <p:sp>
+        <p:nvSpPr>
+          <p:cNvPr id="47" name="Rectangle 46">
+            <a:extLst>
+              <a:ext uri="{FF2B5EF4-FFF2-40B4-BE49-F238E27FC236}">
+                <a16:creationId xmlns:a16="http://schemas.microsoft.com/office/drawing/2014/main" id="{B2A0DA23-FB86-2773-0972-D15722357F75}"/>
+              </a:ext>
+            </a:extLst>
+          </p:cNvPr>
+          <p:cNvSpPr/>
+          <p:nvPr/>
+        </p:nvSpPr>
+        <p:spPr>
+          <a:xfrm>
+            <a:off x="4655840" y="4005064"/>
+            <a:ext cx="432048" cy="144016"/>
+          </a:xfrm>
+          <a:prstGeom prst="rect">
+            <a:avLst/>
+          </a:prstGeom>
+          <a:noFill/>
+          <a:ln>
+            <a:noFill/>
+          </a:ln>
+        </p:spPr>
+        <p:style>
+          <a:lnRef idx="2">
+            <a:schemeClr val="accent1">
+              <a:shade val="15000"/>
+            </a:schemeClr>
+          </a:lnRef>
+          <a:fillRef idx="1">
+            <a:schemeClr val="accent1"/>
+          </a:fillRef>
+          <a:effectRef idx="0">
+            <a:schemeClr val="accent1"/>
+          </a:effectRef>
+          <a:fontRef idx="minor">
+            <a:schemeClr val="lt1"/>
+          </a:fontRef>
+        </p:style>
+        <p:txBody>
+          <a:bodyPr rtlCol="0" anchor="ctr"/>
+          <a:lstStyle/>
+          <a:p>
+            <a:pPr algn="ctr"/>
+            <a:r>
+              <a:rPr lang="en-US" sz="800" dirty="0">
+                <a:solidFill>
+                  <a:sysClr val="windowText" lastClr="000000"/>
+                </a:solidFill>
+              </a:rPr>
+              <a:t>D2</a:t>
+            </a:r>
+          </a:p>
+        </p:txBody>
+      </p:sp>
+      <p:sp>
+        <p:nvSpPr>
+          <p:cNvPr id="48" name="Rectangle 47">
+            <a:extLst>
+              <a:ext uri="{FF2B5EF4-FFF2-40B4-BE49-F238E27FC236}">
+                <a16:creationId xmlns:a16="http://schemas.microsoft.com/office/drawing/2014/main" id="{3631E214-7DB1-36F8-7AB8-A8B494D7978E}"/>
+              </a:ext>
+            </a:extLst>
+          </p:cNvPr>
+          <p:cNvSpPr/>
+          <p:nvPr/>
+        </p:nvSpPr>
+        <p:spPr>
+          <a:xfrm>
+            <a:off x="4367808" y="5229200"/>
+            <a:ext cx="432048" cy="144016"/>
+          </a:xfrm>
+          <a:prstGeom prst="rect">
+            <a:avLst/>
+          </a:prstGeom>
+          <a:noFill/>
+          <a:ln>
+            <a:noFill/>
+          </a:ln>
+        </p:spPr>
+        <p:style>
+          <a:lnRef idx="2">
+            <a:schemeClr val="accent1">
+              <a:shade val="15000"/>
+            </a:schemeClr>
+          </a:lnRef>
+          <a:fillRef idx="1">
+            <a:schemeClr val="accent1"/>
+          </a:fillRef>
+          <a:effectRef idx="0">
+            <a:schemeClr val="accent1"/>
+          </a:effectRef>
+          <a:fontRef idx="minor">
+            <a:schemeClr val="lt1"/>
+          </a:fontRef>
+        </p:style>
+        <p:txBody>
+          <a:bodyPr rtlCol="0" anchor="ctr"/>
+          <a:lstStyle/>
+          <a:p>
+            <a:pPr algn="ctr"/>
+            <a:r>
+              <a:rPr lang="en-US" sz="800" dirty="0">
+                <a:solidFill>
+                  <a:sysClr val="windowText" lastClr="000000"/>
+                </a:solidFill>
+              </a:rPr>
+              <a:t>D3</a:t>
+            </a:r>
+          </a:p>
+        </p:txBody>
+      </p:sp>
+      <p:sp>
+        <p:nvSpPr>
+          <p:cNvPr id="49" name="Rectangle 48">
+            <a:extLst>
+              <a:ext uri="{FF2B5EF4-FFF2-40B4-BE49-F238E27FC236}">
+                <a16:creationId xmlns:a16="http://schemas.microsoft.com/office/drawing/2014/main" id="{898B273A-AE58-9E82-E997-EED6E5F31788}"/>
+              </a:ext>
+            </a:extLst>
+          </p:cNvPr>
+          <p:cNvSpPr/>
+          <p:nvPr/>
+        </p:nvSpPr>
+        <p:spPr>
+          <a:xfrm>
+            <a:off x="5231904" y="4869160"/>
+            <a:ext cx="432048" cy="144016"/>
+          </a:xfrm>
+          <a:prstGeom prst="rect">
+            <a:avLst/>
+          </a:prstGeom>
+          <a:noFill/>
+          <a:ln>
+            <a:noFill/>
+          </a:ln>
+        </p:spPr>
+        <p:style>
+          <a:lnRef idx="2">
+            <a:schemeClr val="accent1">
+              <a:shade val="15000"/>
+            </a:schemeClr>
+          </a:lnRef>
+          <a:fillRef idx="1">
+            <a:schemeClr val="accent1"/>
+          </a:fillRef>
+          <a:effectRef idx="0">
+            <a:schemeClr val="accent1"/>
+          </a:effectRef>
+          <a:fontRef idx="minor">
+            <a:schemeClr val="lt1"/>
+          </a:fontRef>
+        </p:style>
+        <p:txBody>
+          <a:bodyPr rtlCol="0" anchor="ctr"/>
+          <a:lstStyle/>
+          <a:p>
+            <a:pPr algn="ctr"/>
+            <a:r>
+              <a:rPr lang="en-US" sz="800" dirty="0">
+                <a:solidFill>
+                  <a:sysClr val="windowText" lastClr="000000"/>
+                </a:solidFill>
+              </a:rPr>
+              <a:t>D4</a:t>
+            </a:r>
+          </a:p>
+        </p:txBody>
+      </p:sp>
+      <p:cxnSp>
+        <p:nvCxnSpPr>
+          <p:cNvPr id="54" name="Straight Arrow Connector 53">
+            <a:extLst>
+              <a:ext uri="{FF2B5EF4-FFF2-40B4-BE49-F238E27FC236}">
+                <a16:creationId xmlns:a16="http://schemas.microsoft.com/office/drawing/2014/main" id="{529416B0-D7EF-4C53-42E4-9C0177B8AF38}"/>
+              </a:ext>
+            </a:extLst>
+          </p:cNvPr>
+          <p:cNvCxnSpPr>
+            <a:cxnSpLocks/>
+          </p:cNvCxnSpPr>
+          <p:nvPr/>
+        </p:nvCxnSpPr>
+        <p:spPr>
+          <a:xfrm>
+            <a:off x="7752184" y="4005064"/>
+            <a:ext cx="1224136" cy="0"/>
+          </a:xfrm>
+          <a:prstGeom prst="straightConnector1">
+            <a:avLst/>
+          </a:prstGeom>
+          <a:ln w="28575">
+            <a:solidFill>
+              <a:schemeClr val="bg2">
+                <a:lumMod val="90000"/>
+              </a:schemeClr>
+            </a:solidFill>
+            <a:prstDash val="dash"/>
+            <a:headEnd w="lg" len="lg"/>
+            <a:tailEnd type="triangle" w="lg" len="lg"/>
+          </a:ln>
+        </p:spPr>
+        <p:style>
+          <a:lnRef idx="2">
+            <a:schemeClr val="accent1"/>
+          </a:lnRef>
+          <a:fillRef idx="0">
+            <a:schemeClr val="accent1"/>
+          </a:fillRef>
+          <a:effectRef idx="1">
+            <a:schemeClr val="accent1"/>
+          </a:effectRef>
+          <a:fontRef idx="minor">
+            <a:schemeClr val="tx1"/>
+          </a:fontRef>
+        </p:style>
+      </p:cxnSp>
+      <p:cxnSp>
+        <p:nvCxnSpPr>
+          <p:cNvPr id="55" name="Straight Arrow Connector 54">
+            <a:extLst>
+              <a:ext uri="{FF2B5EF4-FFF2-40B4-BE49-F238E27FC236}">
+                <a16:creationId xmlns:a16="http://schemas.microsoft.com/office/drawing/2014/main" id="{F87A4C01-F213-67AF-7F57-B4A77E0EB5AC}"/>
+              </a:ext>
+            </a:extLst>
+          </p:cNvPr>
+          <p:cNvCxnSpPr>
+            <a:cxnSpLocks/>
+          </p:cNvCxnSpPr>
+          <p:nvPr/>
+        </p:nvCxnSpPr>
+        <p:spPr>
+          <a:xfrm flipH="1">
+            <a:off x="7854019" y="4005064"/>
+            <a:ext cx="1266317" cy="1122301"/>
+          </a:xfrm>
+          <a:prstGeom prst="straightConnector1">
+            <a:avLst/>
+          </a:prstGeom>
+          <a:ln w="28575">
+            <a:solidFill>
+              <a:schemeClr val="bg2">
+                <a:lumMod val="90000"/>
+              </a:schemeClr>
+            </a:solidFill>
+            <a:prstDash val="dash"/>
+            <a:headEnd w="lg" len="lg"/>
+            <a:tailEnd type="triangle" w="lg" len="lg"/>
+          </a:ln>
+        </p:spPr>
+        <p:style>
+          <a:lnRef idx="2">
+            <a:schemeClr val="accent1"/>
+          </a:lnRef>
+          <a:fillRef idx="0">
+            <a:schemeClr val="accent1"/>
+          </a:fillRef>
+          <a:effectRef idx="1">
+            <a:schemeClr val="accent1"/>
+          </a:effectRef>
+          <a:fontRef idx="minor">
+            <a:schemeClr val="tx1"/>
+          </a:fontRef>
+        </p:style>
+      </p:cxnSp>
+      <p:sp>
+        <p:nvSpPr>
+          <p:cNvPr id="56" name="Rectangle 55">
+            <a:extLst>
+              <a:ext uri="{FF2B5EF4-FFF2-40B4-BE49-F238E27FC236}">
+                <a16:creationId xmlns:a16="http://schemas.microsoft.com/office/drawing/2014/main" id="{E72CE919-A6E5-BEF9-39C3-F81CB0220A0A}"/>
+              </a:ext>
+            </a:extLst>
+          </p:cNvPr>
+          <p:cNvSpPr/>
+          <p:nvPr/>
+        </p:nvSpPr>
+        <p:spPr>
+          <a:xfrm>
+            <a:off x="7392144" y="3501008"/>
+            <a:ext cx="720080" cy="216024"/>
+          </a:xfrm>
+          <a:prstGeom prst="rect">
+            <a:avLst/>
+          </a:prstGeom>
+          <a:noFill/>
+          <a:ln>
+            <a:noFill/>
+          </a:ln>
+        </p:spPr>
+        <p:style>
+          <a:lnRef idx="2">
+            <a:schemeClr val="accent1">
+              <a:shade val="15000"/>
+            </a:schemeClr>
+          </a:lnRef>
+          <a:fillRef idx="1">
+            <a:schemeClr val="accent1"/>
+          </a:fillRef>
+          <a:effectRef idx="0">
+            <a:schemeClr val="accent1"/>
+          </a:effectRef>
+          <a:fontRef idx="minor">
+            <a:schemeClr val="lt1"/>
+          </a:fontRef>
+        </p:style>
+        <p:txBody>
+          <a:bodyPr rtlCol="0" anchor="ctr"/>
+          <a:lstStyle/>
+          <a:p>
+            <a:pPr algn="ctr"/>
+            <a:r>
+              <a:rPr lang="en-US" sz="1100" dirty="0">
+                <a:solidFill>
+                  <a:sysClr val="windowText" lastClr="000000"/>
+                </a:solidFill>
+              </a:rPr>
+              <a:t>Point TL</a:t>
+            </a:r>
+          </a:p>
+        </p:txBody>
+      </p:sp>
+      <p:cxnSp>
+        <p:nvCxnSpPr>
+          <p:cNvPr id="58" name="Straight Arrow Connector 57">
+            <a:extLst>
+              <a:ext uri="{FF2B5EF4-FFF2-40B4-BE49-F238E27FC236}">
+                <a16:creationId xmlns:a16="http://schemas.microsoft.com/office/drawing/2014/main" id="{078C628F-C49E-C0FC-B5B8-DC0D2586DFD2}"/>
+              </a:ext>
+            </a:extLst>
+          </p:cNvPr>
+          <p:cNvCxnSpPr>
+            <a:cxnSpLocks/>
+          </p:cNvCxnSpPr>
+          <p:nvPr/>
+        </p:nvCxnSpPr>
+        <p:spPr>
+          <a:xfrm>
+            <a:off x="7752184" y="5229200"/>
+            <a:ext cx="1224136" cy="0"/>
+          </a:xfrm>
+          <a:prstGeom prst="straightConnector1">
+            <a:avLst/>
+          </a:prstGeom>
+          <a:ln w="28575">
+            <a:solidFill>
+              <a:schemeClr val="bg2">
+                <a:lumMod val="90000"/>
+              </a:schemeClr>
+            </a:solidFill>
+            <a:prstDash val="dash"/>
+            <a:headEnd w="lg" len="lg"/>
+            <a:tailEnd type="triangle" w="lg" len="lg"/>
+          </a:ln>
+        </p:spPr>
+        <p:style>
+          <a:lnRef idx="2">
+            <a:schemeClr val="accent1"/>
+          </a:lnRef>
+          <a:fillRef idx="0">
+            <a:schemeClr val="accent1"/>
+          </a:fillRef>
+          <a:effectRef idx="1">
+            <a:schemeClr val="accent1"/>
+          </a:effectRef>
+          <a:fontRef idx="minor">
+            <a:schemeClr val="tx1"/>
+          </a:fontRef>
+        </p:style>
+      </p:cxnSp>
+      <p:sp>
+        <p:nvSpPr>
+          <p:cNvPr id="59" name="Rectangle 58">
+            <a:extLst>
+              <a:ext uri="{FF2B5EF4-FFF2-40B4-BE49-F238E27FC236}">
+                <a16:creationId xmlns:a16="http://schemas.microsoft.com/office/drawing/2014/main" id="{9982BC98-81F3-79AB-2F0E-3F3C3B0B1449}"/>
+              </a:ext>
+            </a:extLst>
+          </p:cNvPr>
+          <p:cNvSpPr/>
+          <p:nvPr/>
+        </p:nvSpPr>
+        <p:spPr>
+          <a:xfrm>
+            <a:off x="8760296" y="5517232"/>
+            <a:ext cx="720080" cy="144016"/>
+          </a:xfrm>
+          <a:prstGeom prst="rect">
+            <a:avLst/>
+          </a:prstGeom>
+          <a:noFill/>
+          <a:ln>
+            <a:noFill/>
+          </a:ln>
+        </p:spPr>
+        <p:style>
+          <a:lnRef idx="2">
+            <a:schemeClr val="accent1">
+              <a:shade val="15000"/>
+            </a:schemeClr>
+          </a:lnRef>
+          <a:fillRef idx="1">
+            <a:schemeClr val="accent1"/>
+          </a:fillRef>
+          <a:effectRef idx="0">
+            <a:schemeClr val="accent1"/>
+          </a:effectRef>
+          <a:fontRef idx="minor">
+            <a:schemeClr val="lt1"/>
+          </a:fontRef>
+        </p:style>
+        <p:txBody>
+          <a:bodyPr rtlCol="0" anchor="ctr"/>
+          <a:lstStyle/>
+          <a:p>
+            <a:pPr algn="ctr"/>
+            <a:r>
+              <a:rPr lang="en-US" sz="1100" dirty="0">
+                <a:solidFill>
+                  <a:sysClr val="windowText" lastClr="000000"/>
+                </a:solidFill>
+              </a:rPr>
+              <a:t>Point BR</a:t>
+            </a:r>
+          </a:p>
+        </p:txBody>
+      </p:sp>
+      <p:sp>
+        <p:nvSpPr>
+          <p:cNvPr id="60" name="Rectangle 59">
+            <a:extLst>
+              <a:ext uri="{FF2B5EF4-FFF2-40B4-BE49-F238E27FC236}">
+                <a16:creationId xmlns:a16="http://schemas.microsoft.com/office/drawing/2014/main" id="{251DB7ED-8D99-323C-77F4-DB1DF2871280}"/>
+              </a:ext>
+            </a:extLst>
+          </p:cNvPr>
+          <p:cNvSpPr/>
+          <p:nvPr/>
+        </p:nvSpPr>
+        <p:spPr>
+          <a:xfrm>
+            <a:off x="7968208" y="4293096"/>
+            <a:ext cx="648072" cy="216024"/>
+          </a:xfrm>
+          <a:prstGeom prst="rect">
+            <a:avLst/>
+          </a:prstGeom>
+          <a:noFill/>
+          <a:ln>
+            <a:noFill/>
+          </a:ln>
+        </p:spPr>
+        <p:style>
+          <a:lnRef idx="2">
+            <a:schemeClr val="accent1">
+              <a:shade val="15000"/>
+            </a:schemeClr>
+          </a:lnRef>
+          <a:fillRef idx="1">
+            <a:schemeClr val="accent1"/>
+          </a:fillRef>
+          <a:effectRef idx="0">
+            <a:schemeClr val="accent1"/>
+          </a:effectRef>
+          <a:fontRef idx="minor">
+            <a:schemeClr val="lt1"/>
+          </a:fontRef>
+        </p:style>
+        <p:txBody>
+          <a:bodyPr rtlCol="0" anchor="ctr"/>
+          <a:lstStyle/>
+          <a:p>
+            <a:pPr algn="ctr"/>
+            <a:r>
+              <a:rPr lang="en-US" sz="900" dirty="0">
+                <a:solidFill>
+                  <a:sysClr val="windowText" lastClr="000000"/>
+                </a:solidFill>
+              </a:rPr>
+              <a:t>SpeedF</a:t>
+            </a:r>
+          </a:p>
+        </p:txBody>
+      </p:sp>
+      <p:sp>
+        <p:nvSpPr>
+          <p:cNvPr id="61" name="Rectangle 60">
+            <a:extLst>
+              <a:ext uri="{FF2B5EF4-FFF2-40B4-BE49-F238E27FC236}">
+                <a16:creationId xmlns:a16="http://schemas.microsoft.com/office/drawing/2014/main" id="{A042A5BB-9C36-AFC4-4FB4-A724A4FD218B}"/>
+              </a:ext>
+            </a:extLst>
+          </p:cNvPr>
+          <p:cNvSpPr/>
+          <p:nvPr/>
+        </p:nvSpPr>
+        <p:spPr>
+          <a:xfrm>
+            <a:off x="8112224" y="3717032"/>
+            <a:ext cx="648072" cy="216024"/>
+          </a:xfrm>
+          <a:prstGeom prst="rect">
+            <a:avLst/>
+          </a:prstGeom>
+          <a:noFill/>
+          <a:ln>
+            <a:noFill/>
+          </a:ln>
+        </p:spPr>
+        <p:style>
+          <a:lnRef idx="2">
+            <a:schemeClr val="accent1">
+              <a:shade val="15000"/>
+            </a:schemeClr>
+          </a:lnRef>
+          <a:fillRef idx="1">
+            <a:schemeClr val="accent1"/>
+          </a:fillRef>
+          <a:effectRef idx="0">
+            <a:schemeClr val="accent1"/>
+          </a:effectRef>
+          <a:fontRef idx="minor">
+            <a:schemeClr val="lt1"/>
+          </a:fontRef>
+        </p:style>
+        <p:txBody>
+          <a:bodyPr rtlCol="0" anchor="ctr"/>
+          <a:lstStyle/>
+          <a:p>
+            <a:pPr algn="ctr"/>
+            <a:r>
+              <a:rPr lang="en-US" sz="900" dirty="0">
+                <a:solidFill>
+                  <a:sysClr val="windowText" lastClr="000000"/>
+                </a:solidFill>
+              </a:rPr>
+              <a:t>Speed</a:t>
+            </a:r>
+          </a:p>
+        </p:txBody>
+      </p:sp>
+      <p:sp>
+        <p:nvSpPr>
+          <p:cNvPr id="62" name="Rectangle 61">
+            <a:extLst>
+              <a:ext uri="{FF2B5EF4-FFF2-40B4-BE49-F238E27FC236}">
+                <a16:creationId xmlns:a16="http://schemas.microsoft.com/office/drawing/2014/main" id="{9BE8F2FB-6DDD-1D4C-3843-07DD4C8704BC}"/>
+              </a:ext>
+            </a:extLst>
+          </p:cNvPr>
+          <p:cNvSpPr/>
+          <p:nvPr/>
+        </p:nvSpPr>
+        <p:spPr>
+          <a:xfrm>
+            <a:off x="8112224" y="5301208"/>
+            <a:ext cx="648072" cy="216024"/>
+          </a:xfrm>
+          <a:prstGeom prst="rect">
+            <a:avLst/>
+          </a:prstGeom>
+          <a:noFill/>
+          <a:ln>
+            <a:noFill/>
+          </a:ln>
+        </p:spPr>
+        <p:style>
+          <a:lnRef idx="2">
+            <a:schemeClr val="accent1">
+              <a:shade val="15000"/>
+            </a:schemeClr>
+          </a:lnRef>
+          <a:fillRef idx="1">
+            <a:schemeClr val="accent1"/>
+          </a:fillRef>
+          <a:effectRef idx="0">
+            <a:schemeClr val="accent1"/>
+          </a:effectRef>
+          <a:fontRef idx="minor">
+            <a:schemeClr val="lt1"/>
+          </a:fontRef>
+        </p:style>
+        <p:txBody>
+          <a:bodyPr rtlCol="0" anchor="ctr"/>
+          <a:lstStyle/>
+          <a:p>
+            <a:pPr algn="ctr"/>
+            <a:r>
+              <a:rPr lang="en-US" sz="900" dirty="0">
+                <a:solidFill>
+                  <a:sysClr val="windowText" lastClr="000000"/>
+                </a:solidFill>
+              </a:rPr>
+              <a:t>Speed</a:t>
+            </a:r>
+          </a:p>
+        </p:txBody>
+      </p:sp>
+      <p:sp>
+        <p:nvSpPr>
+          <p:cNvPr id="71" name="Rectangle 70">
+            <a:extLst>
+              <a:ext uri="{FF2B5EF4-FFF2-40B4-BE49-F238E27FC236}">
+                <a16:creationId xmlns:a16="http://schemas.microsoft.com/office/drawing/2014/main" id="{997A4063-9763-EB97-F03C-8B6C2907462C}"/>
+              </a:ext>
+            </a:extLst>
+          </p:cNvPr>
+          <p:cNvSpPr/>
+          <p:nvPr/>
+        </p:nvSpPr>
+        <p:spPr>
+          <a:xfrm>
+            <a:off x="7104112" y="3645024"/>
+            <a:ext cx="720080" cy="216024"/>
+          </a:xfrm>
+          <a:prstGeom prst="rect">
+            <a:avLst/>
+          </a:prstGeom>
+          <a:noFill/>
+          <a:ln>
+            <a:noFill/>
+          </a:ln>
+        </p:spPr>
+        <p:style>
+          <a:lnRef idx="2">
+            <a:schemeClr val="accent1">
+              <a:shade val="15000"/>
+            </a:schemeClr>
+          </a:lnRef>
+          <a:fillRef idx="1">
+            <a:schemeClr val="accent1"/>
+          </a:fillRef>
+          <a:effectRef idx="0">
+            <a:schemeClr val="accent1"/>
+          </a:effectRef>
+          <a:fontRef idx="minor">
+            <a:schemeClr val="lt1"/>
+          </a:fontRef>
+        </p:style>
+        <p:txBody>
+          <a:bodyPr rtlCol="0" anchor="ctr"/>
+          <a:lstStyle/>
+          <a:p>
+            <a:r>
+              <a:rPr lang="en-US" sz="800" dirty="0">
+                <a:solidFill>
+                  <a:sysClr val="windowText" lastClr="000000"/>
+                </a:solidFill>
+              </a:rPr>
+              <a:t>Disp Gap</a:t>
+            </a:r>
+          </a:p>
+        </p:txBody>
+      </p:sp>
+      <p:cxnSp>
+        <p:nvCxnSpPr>
+          <p:cNvPr id="107" name="Straight Arrow Connector 106">
+            <a:extLst>
+              <a:ext uri="{FF2B5EF4-FFF2-40B4-BE49-F238E27FC236}">
+                <a16:creationId xmlns:a16="http://schemas.microsoft.com/office/drawing/2014/main" id="{89E06B75-12AD-E3DA-6AC9-59C4537A2226}"/>
+              </a:ext>
+            </a:extLst>
+          </p:cNvPr>
+          <p:cNvCxnSpPr>
+            <a:cxnSpLocks/>
+            <a:stCxn id="56" idx="2"/>
+            <a:endCxn id="51" idx="0"/>
+          </p:cNvCxnSpPr>
+          <p:nvPr/>
+        </p:nvCxnSpPr>
+        <p:spPr>
+          <a:xfrm>
+            <a:off x="7752184" y="3717032"/>
+            <a:ext cx="0" cy="144016"/>
+          </a:xfrm>
+          <a:prstGeom prst="straightConnector1">
+            <a:avLst/>
+          </a:prstGeom>
+          <a:ln w="3175">
+            <a:solidFill>
+              <a:schemeClr val="bg1">
+                <a:lumMod val="50000"/>
+              </a:schemeClr>
+            </a:solidFill>
+            <a:tailEnd type="triangle"/>
+          </a:ln>
+        </p:spPr>
+        <p:style>
+          <a:lnRef idx="2">
+            <a:schemeClr val="accent1"/>
+          </a:lnRef>
+          <a:fillRef idx="0">
+            <a:schemeClr val="accent1"/>
+          </a:fillRef>
+          <a:effectRef idx="1">
+            <a:schemeClr val="accent1"/>
+          </a:effectRef>
+          <a:fontRef idx="minor">
+            <a:schemeClr val="tx1"/>
+          </a:fontRef>
+        </p:style>
+      </p:cxnSp>
+      <p:cxnSp>
+        <p:nvCxnSpPr>
+          <p:cNvPr id="108" name="Straight Arrow Connector 107">
+            <a:extLst>
+              <a:ext uri="{FF2B5EF4-FFF2-40B4-BE49-F238E27FC236}">
+                <a16:creationId xmlns:a16="http://schemas.microsoft.com/office/drawing/2014/main" id="{15B62099-F3CF-9E00-F02D-52DC77BBBD1E}"/>
+              </a:ext>
+            </a:extLst>
+          </p:cNvPr>
+          <p:cNvCxnSpPr>
+            <a:cxnSpLocks/>
+            <a:stCxn id="59" idx="0"/>
+          </p:cNvCxnSpPr>
+          <p:nvPr/>
+        </p:nvCxnSpPr>
+        <p:spPr>
+          <a:xfrm flipV="1">
+            <a:off x="9120336" y="5373216"/>
+            <a:ext cx="0" cy="144016"/>
+          </a:xfrm>
+          <a:prstGeom prst="straightConnector1">
+            <a:avLst/>
+          </a:prstGeom>
+          <a:ln w="3175">
+            <a:solidFill>
+              <a:schemeClr val="bg1">
+                <a:lumMod val="50000"/>
+              </a:schemeClr>
+            </a:solidFill>
+            <a:tailEnd type="triangle"/>
+          </a:ln>
+        </p:spPr>
+        <p:style>
+          <a:lnRef idx="2">
+            <a:schemeClr val="accent1"/>
+          </a:lnRef>
+          <a:fillRef idx="0">
+            <a:schemeClr val="accent1"/>
+          </a:fillRef>
+          <a:effectRef idx="1">
+            <a:schemeClr val="accent1"/>
+          </a:effectRef>
+          <a:fontRef idx="minor">
+            <a:schemeClr val="tx1"/>
+          </a:fontRef>
+        </p:style>
+      </p:cxnSp>
+      <p:cxnSp>
+        <p:nvCxnSpPr>
+          <p:cNvPr id="111" name="Straight Arrow Connector 110">
+            <a:extLst>
+              <a:ext uri="{FF2B5EF4-FFF2-40B4-BE49-F238E27FC236}">
+                <a16:creationId xmlns:a16="http://schemas.microsoft.com/office/drawing/2014/main" id="{A7A28DE7-518C-30A3-CC97-85CB7CBB7732}"/>
+              </a:ext>
+            </a:extLst>
+          </p:cNvPr>
+          <p:cNvCxnSpPr>
+            <a:cxnSpLocks/>
+          </p:cNvCxnSpPr>
+          <p:nvPr/>
+        </p:nvCxnSpPr>
+        <p:spPr>
+          <a:xfrm>
+            <a:off x="8328248" y="3933056"/>
+            <a:ext cx="216024" cy="0"/>
+          </a:xfrm>
+          <a:prstGeom prst="straightConnector1">
+            <a:avLst/>
+          </a:prstGeom>
+          <a:ln w="3175">
+            <a:solidFill>
+              <a:srgbClr val="00B050"/>
+            </a:solidFill>
+            <a:tailEnd type="triangle"/>
+          </a:ln>
+        </p:spPr>
+        <p:style>
+          <a:lnRef idx="2">
+            <a:schemeClr val="accent1"/>
+          </a:lnRef>
+          <a:fillRef idx="0">
+            <a:schemeClr val="accent1"/>
+          </a:fillRef>
+          <a:effectRef idx="1">
+            <a:schemeClr val="accent1"/>
+          </a:effectRef>
+          <a:fontRef idx="minor">
+            <a:schemeClr val="tx1"/>
+          </a:fontRef>
+        </p:style>
+      </p:cxnSp>
+      <p:cxnSp>
+        <p:nvCxnSpPr>
+          <p:cNvPr id="113" name="Straight Arrow Connector 112">
+            <a:extLst>
+              <a:ext uri="{FF2B5EF4-FFF2-40B4-BE49-F238E27FC236}">
+                <a16:creationId xmlns:a16="http://schemas.microsoft.com/office/drawing/2014/main" id="{C8A9D41F-6519-25B0-FDE0-2272BB02FE42}"/>
+              </a:ext>
+            </a:extLst>
+          </p:cNvPr>
+          <p:cNvCxnSpPr>
+            <a:cxnSpLocks/>
+          </p:cNvCxnSpPr>
+          <p:nvPr/>
+        </p:nvCxnSpPr>
+        <p:spPr>
+          <a:xfrm>
+            <a:off x="8328248" y="5301208"/>
+            <a:ext cx="216024" cy="0"/>
+          </a:xfrm>
+          <a:prstGeom prst="straightConnector1">
+            <a:avLst/>
+          </a:prstGeom>
+          <a:ln w="3175">
+            <a:solidFill>
+              <a:srgbClr val="00B050"/>
+            </a:solidFill>
+            <a:tailEnd type="triangle"/>
+          </a:ln>
+        </p:spPr>
+        <p:style>
+          <a:lnRef idx="2">
+            <a:schemeClr val="accent1"/>
+          </a:lnRef>
+          <a:fillRef idx="0">
+            <a:schemeClr val="accent1"/>
+          </a:fillRef>
+          <a:effectRef idx="1">
+            <a:schemeClr val="accent1"/>
+          </a:effectRef>
+          <a:fontRef idx="minor">
+            <a:schemeClr val="tx1"/>
+          </a:fontRef>
+        </p:style>
+      </p:cxnSp>
+      <p:cxnSp>
+        <p:nvCxnSpPr>
+          <p:cNvPr id="115" name="Straight Arrow Connector 114">
+            <a:extLst>
+              <a:ext uri="{FF2B5EF4-FFF2-40B4-BE49-F238E27FC236}">
+                <a16:creationId xmlns:a16="http://schemas.microsoft.com/office/drawing/2014/main" id="{C1EF47DA-DFA3-2E63-EC0E-74F4CE5C8501}"/>
+              </a:ext>
+            </a:extLst>
+          </p:cNvPr>
+          <p:cNvCxnSpPr>
+            <a:cxnSpLocks/>
+          </p:cNvCxnSpPr>
+          <p:nvPr/>
+        </p:nvCxnSpPr>
+        <p:spPr>
+          <a:xfrm flipH="1">
+            <a:off x="8256240" y="4509120"/>
+            <a:ext cx="144016" cy="144016"/>
+          </a:xfrm>
+          <a:prstGeom prst="straightConnector1">
+            <a:avLst/>
+          </a:prstGeom>
+          <a:ln w="3175">
+            <a:solidFill>
+              <a:srgbClr val="00B050"/>
+            </a:solidFill>
+            <a:tailEnd type="triangle"/>
+          </a:ln>
+        </p:spPr>
+        <p:style>
+          <a:lnRef idx="2">
+            <a:schemeClr val="accent1"/>
+          </a:lnRef>
+          <a:fillRef idx="0">
+            <a:schemeClr val="accent1"/>
+          </a:fillRef>
+          <a:effectRef idx="1">
+            <a:schemeClr val="accent1"/>
+          </a:effectRef>
+          <a:fontRef idx="minor">
+            <a:schemeClr val="tx1"/>
+          </a:fontRef>
+        </p:style>
+      </p:cxnSp>
+      <p:grpSp>
+        <p:nvGrpSpPr>
+          <p:cNvPr id="117" name="Group 116">
+            <a:extLst>
+              <a:ext uri="{FF2B5EF4-FFF2-40B4-BE49-F238E27FC236}">
+                <a16:creationId xmlns:a16="http://schemas.microsoft.com/office/drawing/2014/main" id="{52B5DB22-1599-5B30-86F9-DE2F75E4EBD4}"/>
+              </a:ext>
+            </a:extLst>
+          </p:cNvPr>
+          <p:cNvGrpSpPr/>
+          <p:nvPr/>
+        </p:nvGrpSpPr>
+        <p:grpSpPr>
+          <a:xfrm>
+            <a:off x="7104112" y="3861048"/>
+            <a:ext cx="72008" cy="72008"/>
+            <a:chOff x="2711624" y="4149080"/>
+            <a:chExt cx="144016" cy="144016"/>
+          </a:xfrm>
+        </p:grpSpPr>
+        <p:sp>
+          <p:nvSpPr>
+            <p:cNvPr id="118" name="Oval 117">
+              <a:extLst>
+                <a:ext uri="{FF2B5EF4-FFF2-40B4-BE49-F238E27FC236}">
+                  <a16:creationId xmlns:a16="http://schemas.microsoft.com/office/drawing/2014/main" id="{1377A4A0-1BA0-5C0C-0890-058E8D96AF59}"/>
+                </a:ext>
+              </a:extLst>
+            </p:cNvPr>
+            <p:cNvSpPr/>
+            <p:nvPr/>
+          </p:nvSpPr>
+          <p:spPr>
+            <a:xfrm>
+              <a:off x="2711624" y="4149080"/>
+              <a:ext cx="144016" cy="144016"/>
+            </a:xfrm>
+            <a:prstGeom prst="ellipse">
+              <a:avLst/>
+            </a:prstGeom>
+            <a:noFill/>
+            <a:ln w="9525"/>
+          </p:spPr>
+          <p:style>
+            <a:lnRef idx="2">
+              <a:schemeClr val="accent1">
+                <a:shade val="15000"/>
+              </a:schemeClr>
+            </a:lnRef>
+            <a:fillRef idx="1">
+              <a:schemeClr val="accent1"/>
+            </a:fillRef>
+            <a:effectRef idx="0">
+              <a:schemeClr val="accent1"/>
+            </a:effectRef>
+            <a:fontRef idx="minor">
+              <a:schemeClr val="lt1"/>
+            </a:fontRef>
+          </p:style>
+          <p:txBody>
+            <a:bodyPr rtlCol="0" anchor="ctr"/>
+            <a:lstStyle/>
+            <a:p>
+              <a:pPr algn="ctr"/>
+              <a:endParaRPr lang="en-MY"/>
+            </a:p>
+          </p:txBody>
+        </p:sp>
+        <p:cxnSp>
+          <p:nvCxnSpPr>
+            <p:cNvPr id="119" name="Straight Connector 118">
+              <a:extLst>
+                <a:ext uri="{FF2B5EF4-FFF2-40B4-BE49-F238E27FC236}">
+                  <a16:creationId xmlns:a16="http://schemas.microsoft.com/office/drawing/2014/main" id="{AAE34D4E-1E17-8E9D-0CB9-B52C0D31948B}"/>
+                </a:ext>
+              </a:extLst>
+            </p:cNvPr>
+            <p:cNvCxnSpPr>
+              <a:cxnSpLocks/>
+            </p:cNvCxnSpPr>
+            <p:nvPr/>
+          </p:nvCxnSpPr>
+          <p:spPr>
+            <a:xfrm>
+              <a:off x="2783632" y="4149080"/>
+              <a:ext cx="0" cy="72008"/>
+            </a:xfrm>
+            <a:prstGeom prst="line">
+              <a:avLst/>
+            </a:prstGeom>
+            <a:ln w="9525"/>
+          </p:spPr>
+          <p:style>
+            <a:lnRef idx="2">
+              <a:schemeClr val="dk1"/>
+            </a:lnRef>
+            <a:fillRef idx="0">
+              <a:schemeClr val="dk1"/>
+            </a:fillRef>
+            <a:effectRef idx="1">
+              <a:schemeClr val="dk1"/>
+            </a:effectRef>
+            <a:fontRef idx="minor">
+              <a:schemeClr val="tx1"/>
+            </a:fontRef>
+          </p:style>
+        </p:cxnSp>
+        <p:cxnSp>
+          <p:nvCxnSpPr>
+            <p:cNvPr id="120" name="Straight Connector 119">
+              <a:extLst>
+                <a:ext uri="{FF2B5EF4-FFF2-40B4-BE49-F238E27FC236}">
+                  <a16:creationId xmlns:a16="http://schemas.microsoft.com/office/drawing/2014/main" id="{C3EFC49A-7772-AE39-FEF9-1C68EBF6E73C}"/>
+                </a:ext>
+              </a:extLst>
+            </p:cNvPr>
+            <p:cNvCxnSpPr>
+              <a:cxnSpLocks/>
+            </p:cNvCxnSpPr>
+            <p:nvPr/>
+          </p:nvCxnSpPr>
+          <p:spPr>
+            <a:xfrm flipH="1">
+              <a:off x="2711624" y="4221088"/>
+              <a:ext cx="72008" cy="0"/>
+            </a:xfrm>
+            <a:prstGeom prst="line">
+              <a:avLst/>
+            </a:prstGeom>
+            <a:ln w="9525"/>
+          </p:spPr>
+          <p:style>
+            <a:lnRef idx="2">
+              <a:schemeClr val="dk1"/>
+            </a:lnRef>
+            <a:fillRef idx="0">
+              <a:schemeClr val="dk1"/>
+            </a:fillRef>
+            <a:effectRef idx="1">
+              <a:schemeClr val="dk1"/>
+            </a:effectRef>
+            <a:fontRef idx="minor">
+              <a:schemeClr val="tx1"/>
+            </a:fontRef>
+          </p:style>
+        </p:cxnSp>
+      </p:grpSp>
+      <p:cxnSp>
+        <p:nvCxnSpPr>
+          <p:cNvPr id="138" name="Straight Arrow Connector 137">
+            <a:extLst>
+              <a:ext uri="{FF2B5EF4-FFF2-40B4-BE49-F238E27FC236}">
+                <a16:creationId xmlns:a16="http://schemas.microsoft.com/office/drawing/2014/main" id="{1F3C95D8-AAEB-3439-BD7A-DF19ED6F73E3}"/>
+              </a:ext>
+            </a:extLst>
+          </p:cNvPr>
+          <p:cNvCxnSpPr/>
+          <p:nvPr/>
+        </p:nvCxnSpPr>
+        <p:spPr>
+          <a:xfrm>
+            <a:off x="2279576" y="4797152"/>
+            <a:ext cx="216024" cy="0"/>
+          </a:xfrm>
+          <a:prstGeom prst="straightConnector1">
+            <a:avLst/>
+          </a:prstGeom>
+          <a:ln>
+            <a:tailEnd type="triangle"/>
+          </a:ln>
+        </p:spPr>
+        <p:style>
+          <a:lnRef idx="2">
+            <a:schemeClr val="accent1"/>
+          </a:lnRef>
+          <a:fillRef idx="0">
+            <a:schemeClr val="accent1"/>
+          </a:fillRef>
+          <a:effectRef idx="1">
+            <a:schemeClr val="accent1"/>
+          </a:effectRef>
+          <a:fontRef idx="minor">
+            <a:schemeClr val="tx1"/>
+          </a:fontRef>
+        </p:style>
+      </p:cxnSp>
+      <p:cxnSp>
+        <p:nvCxnSpPr>
+          <p:cNvPr id="141" name="Straight Connector 140">
+            <a:extLst>
+              <a:ext uri="{FF2B5EF4-FFF2-40B4-BE49-F238E27FC236}">
+                <a16:creationId xmlns:a16="http://schemas.microsoft.com/office/drawing/2014/main" id="{ED8901F3-8366-2634-5453-D4F67083C793}"/>
+              </a:ext>
+            </a:extLst>
+          </p:cNvPr>
+          <p:cNvCxnSpPr/>
+          <p:nvPr/>
+        </p:nvCxnSpPr>
+        <p:spPr>
+          <a:xfrm>
+            <a:off x="2135560" y="4437112"/>
+            <a:ext cx="144016" cy="0"/>
+          </a:xfrm>
+          <a:prstGeom prst="line">
+            <a:avLst/>
+          </a:prstGeom>
+        </p:spPr>
+        <p:style>
+          <a:lnRef idx="2">
+            <a:schemeClr val="accent1"/>
+          </a:lnRef>
+          <a:fillRef idx="0">
+            <a:schemeClr val="accent1"/>
+          </a:fillRef>
+          <a:effectRef idx="1">
+            <a:schemeClr val="accent1"/>
+          </a:effectRef>
+          <a:fontRef idx="minor">
+            <a:schemeClr val="tx1"/>
+          </a:fontRef>
+        </p:style>
+      </p:cxnSp>
+      <p:sp>
+        <p:nvSpPr>
+          <p:cNvPr id="144" name="Rectangle 143">
+            <a:extLst>
+              <a:ext uri="{FF2B5EF4-FFF2-40B4-BE49-F238E27FC236}">
+                <a16:creationId xmlns:a16="http://schemas.microsoft.com/office/drawing/2014/main" id="{52C3EC2A-7F42-5759-328A-8C50C601FB44}"/>
+              </a:ext>
+            </a:extLst>
+          </p:cNvPr>
+          <p:cNvSpPr/>
+          <p:nvPr/>
+        </p:nvSpPr>
+        <p:spPr>
+          <a:xfrm>
+            <a:off x="2207568" y="4221088"/>
+            <a:ext cx="216024" cy="72008"/>
+          </a:xfrm>
+          <a:prstGeom prst="rect">
+            <a:avLst/>
+          </a:prstGeom>
+        </p:spPr>
+        <p:style>
+          <a:lnRef idx="2">
+            <a:schemeClr val="accent1">
+              <a:shade val="15000"/>
+            </a:schemeClr>
+          </a:lnRef>
+          <a:fillRef idx="1">
+            <a:schemeClr val="accent1"/>
+          </a:fillRef>
+          <a:effectRef idx="0">
+            <a:schemeClr val="accent1"/>
+          </a:effectRef>
+          <a:fontRef idx="minor">
+            <a:schemeClr val="lt1"/>
+          </a:fontRef>
+        </p:style>
+        <p:txBody>
+          <a:bodyPr rtlCol="0" anchor="ctr"/>
+          <a:lstStyle/>
+          <a:p>
+            <a:pPr algn="ctr"/>
+            <a:endParaRPr lang="en-MY"/>
+          </a:p>
+        </p:txBody>
+      </p:sp>
+      <p:grpSp>
+        <p:nvGrpSpPr>
+          <p:cNvPr id="146" name="Group 145">
+            <a:extLst>
+              <a:ext uri="{FF2B5EF4-FFF2-40B4-BE49-F238E27FC236}">
+                <a16:creationId xmlns:a16="http://schemas.microsoft.com/office/drawing/2014/main" id="{4A96FC39-BE32-A5A4-CFD3-098CF0F29F04}"/>
+              </a:ext>
+            </a:extLst>
+          </p:cNvPr>
+          <p:cNvGrpSpPr/>
+          <p:nvPr/>
+        </p:nvGrpSpPr>
+        <p:grpSpPr>
+          <a:xfrm>
+            <a:off x="3431704" y="4149080"/>
+            <a:ext cx="72008" cy="72008"/>
+            <a:chOff x="2567608" y="4437112"/>
+            <a:chExt cx="216024" cy="216024"/>
+          </a:xfrm>
+        </p:grpSpPr>
+        <p:cxnSp>
+          <p:nvCxnSpPr>
+            <p:cNvPr id="140" name="Straight Connector 139">
+              <a:extLst>
+                <a:ext uri="{FF2B5EF4-FFF2-40B4-BE49-F238E27FC236}">
+                  <a16:creationId xmlns:a16="http://schemas.microsoft.com/office/drawing/2014/main" id="{B84A0F10-4ED4-C4FA-89AF-22D2ACA75EEB}"/>
+                </a:ext>
+              </a:extLst>
+            </p:cNvPr>
+            <p:cNvCxnSpPr>
+              <a:cxnSpLocks/>
+            </p:cNvCxnSpPr>
+            <p:nvPr/>
+          </p:nvCxnSpPr>
+          <p:spPr>
+            <a:xfrm>
+              <a:off x="2567608" y="4653136"/>
+              <a:ext cx="216024" cy="0"/>
+            </a:xfrm>
+            <a:prstGeom prst="line">
+              <a:avLst/>
+            </a:prstGeom>
+            <a:ln w="9525">
+              <a:solidFill>
+                <a:schemeClr val="tx1"/>
+              </a:solidFill>
+            </a:ln>
+          </p:spPr>
+          <p:style>
+            <a:lnRef idx="2">
+              <a:schemeClr val="accent1"/>
+            </a:lnRef>
+            <a:fillRef idx="0">
+              <a:schemeClr val="accent1"/>
+            </a:fillRef>
+            <a:effectRef idx="1">
+              <a:schemeClr val="accent1"/>
+            </a:effectRef>
+            <a:fontRef idx="minor">
+              <a:schemeClr val="tx1"/>
+            </a:fontRef>
+          </p:style>
+        </p:cxnSp>
+        <p:sp>
+          <p:nvSpPr>
+            <p:cNvPr id="142" name="Rectangle 141">
+              <a:extLst>
+                <a:ext uri="{FF2B5EF4-FFF2-40B4-BE49-F238E27FC236}">
+                  <a16:creationId xmlns:a16="http://schemas.microsoft.com/office/drawing/2014/main" id="{21181E74-2DE6-5779-4F5D-372D4E788137}"/>
+                </a:ext>
+              </a:extLst>
+            </p:cNvPr>
+            <p:cNvSpPr/>
+            <p:nvPr/>
+          </p:nvSpPr>
+          <p:spPr>
+            <a:xfrm>
+              <a:off x="2639616" y="4509120"/>
+              <a:ext cx="72008" cy="72008"/>
+            </a:xfrm>
+            <a:prstGeom prst="rect">
+              <a:avLst/>
+            </a:prstGeom>
+            <a:noFill/>
+            <a:ln w="9525"/>
+          </p:spPr>
+          <p:style>
+            <a:lnRef idx="2">
+              <a:schemeClr val="accent1">
+                <a:shade val="15000"/>
+              </a:schemeClr>
+            </a:lnRef>
+            <a:fillRef idx="1">
+              <a:schemeClr val="accent1"/>
+            </a:fillRef>
+            <a:effectRef idx="0">
+              <a:schemeClr val="accent1"/>
+            </a:effectRef>
+            <a:fontRef idx="minor">
+              <a:schemeClr val="lt1"/>
+            </a:fontRef>
+          </p:style>
+          <p:txBody>
+            <a:bodyPr rtlCol="0" anchor="ctr"/>
+            <a:lstStyle/>
+            <a:p>
+              <a:pPr algn="ctr"/>
+              <a:endParaRPr lang="en-MY"/>
+            </a:p>
+          </p:txBody>
+        </p:sp>
+        <p:sp>
+          <p:nvSpPr>
+            <p:cNvPr id="145" name="Rectangle: Top Corners Snipped 144">
+              <a:extLst>
+                <a:ext uri="{FF2B5EF4-FFF2-40B4-BE49-F238E27FC236}">
+                  <a16:creationId xmlns:a16="http://schemas.microsoft.com/office/drawing/2014/main" id="{99285828-CA6C-A100-D69D-A1A85ABC7867}"/>
+                </a:ext>
+              </a:extLst>
+            </p:cNvPr>
+            <p:cNvSpPr/>
+            <p:nvPr/>
+          </p:nvSpPr>
+          <p:spPr>
+            <a:xfrm rot="10800000">
+              <a:off x="2567608" y="4437112"/>
+              <a:ext cx="216024" cy="72008"/>
+            </a:xfrm>
+            <a:prstGeom prst="snip2SameRect">
+              <a:avLst>
+                <a:gd name="adj1" fmla="val 41469"/>
+                <a:gd name="adj2" fmla="val 0"/>
+              </a:avLst>
+            </a:prstGeom>
+            <a:noFill/>
+            <a:ln w="9525"/>
+          </p:spPr>
+          <p:style>
+            <a:lnRef idx="2">
+              <a:schemeClr val="accent1">
+                <a:shade val="15000"/>
+              </a:schemeClr>
+            </a:lnRef>
+            <a:fillRef idx="1">
+              <a:schemeClr val="accent1"/>
+            </a:fillRef>
+            <a:effectRef idx="0">
+              <a:schemeClr val="accent1"/>
+            </a:effectRef>
+            <a:fontRef idx="minor">
+              <a:schemeClr val="lt1"/>
+            </a:fontRef>
+          </p:style>
+          <p:txBody>
+            <a:bodyPr rtlCol="0" anchor="ctr"/>
+            <a:lstStyle/>
+            <a:p>
+              <a:pPr algn="ctr"/>
+              <a:endParaRPr lang="en-MY"/>
+            </a:p>
+          </p:txBody>
+        </p:sp>
+      </p:grpSp>
+      <p:grpSp>
+        <p:nvGrpSpPr>
+          <p:cNvPr id="148" name="Group 147">
+            <a:extLst>
+              <a:ext uri="{FF2B5EF4-FFF2-40B4-BE49-F238E27FC236}">
+                <a16:creationId xmlns:a16="http://schemas.microsoft.com/office/drawing/2014/main" id="{4B3637D3-8199-8DD6-5519-3D6CF3F3DCC3}"/>
+              </a:ext>
+            </a:extLst>
+          </p:cNvPr>
+          <p:cNvGrpSpPr/>
+          <p:nvPr/>
+        </p:nvGrpSpPr>
+        <p:grpSpPr>
+          <a:xfrm>
+            <a:off x="4079776" y="4149080"/>
+            <a:ext cx="72008" cy="72008"/>
+            <a:chOff x="2567608" y="4437112"/>
+            <a:chExt cx="216024" cy="216024"/>
+          </a:xfrm>
+        </p:grpSpPr>
+        <p:cxnSp>
+          <p:nvCxnSpPr>
+            <p:cNvPr id="149" name="Straight Connector 148">
+              <a:extLst>
+                <a:ext uri="{FF2B5EF4-FFF2-40B4-BE49-F238E27FC236}">
+                  <a16:creationId xmlns:a16="http://schemas.microsoft.com/office/drawing/2014/main" id="{05543475-2C9C-3898-9FB0-A943D50E36CB}"/>
+                </a:ext>
+              </a:extLst>
+            </p:cNvPr>
+            <p:cNvCxnSpPr>
+              <a:cxnSpLocks/>
+            </p:cNvCxnSpPr>
+            <p:nvPr/>
+          </p:nvCxnSpPr>
+          <p:spPr>
+            <a:xfrm>
+              <a:off x="2567608" y="4653136"/>
+              <a:ext cx="216024" cy="0"/>
+            </a:xfrm>
+            <a:prstGeom prst="line">
+              <a:avLst/>
+            </a:prstGeom>
+            <a:ln w="9525">
+              <a:solidFill>
+                <a:schemeClr val="tx1"/>
+              </a:solidFill>
+            </a:ln>
+          </p:spPr>
+          <p:style>
+            <a:lnRef idx="2">
+              <a:schemeClr val="accent1"/>
+            </a:lnRef>
+            <a:fillRef idx="0">
+              <a:schemeClr val="accent1"/>
+            </a:fillRef>
+            <a:effectRef idx="1">
+              <a:schemeClr val="accent1"/>
+            </a:effectRef>
+            <a:fontRef idx="minor">
+              <a:schemeClr val="tx1"/>
+            </a:fontRef>
+          </p:style>
+        </p:cxnSp>
+        <p:sp>
+          <p:nvSpPr>
+            <p:cNvPr id="150" name="Rectangle 149">
+              <a:extLst>
+                <a:ext uri="{FF2B5EF4-FFF2-40B4-BE49-F238E27FC236}">
+                  <a16:creationId xmlns:a16="http://schemas.microsoft.com/office/drawing/2014/main" id="{F0E2FC0D-2EBD-A71C-43FA-2F4B47323D50}"/>
+                </a:ext>
+              </a:extLst>
+            </p:cNvPr>
+            <p:cNvSpPr/>
+            <p:nvPr/>
+          </p:nvSpPr>
+          <p:spPr>
+            <a:xfrm>
+              <a:off x="2639616" y="4509120"/>
+              <a:ext cx="72008" cy="72008"/>
+            </a:xfrm>
+            <a:prstGeom prst="rect">
+              <a:avLst/>
+            </a:prstGeom>
+            <a:noFill/>
+            <a:ln w="9525"/>
+          </p:spPr>
+          <p:style>
+            <a:lnRef idx="2">
+              <a:schemeClr val="accent1">
+                <a:shade val="15000"/>
+              </a:schemeClr>
+            </a:lnRef>
+            <a:fillRef idx="1">
+              <a:schemeClr val="accent1"/>
+            </a:fillRef>
+            <a:effectRef idx="0">
+              <a:schemeClr val="accent1"/>
+            </a:effectRef>
+            <a:fontRef idx="minor">
+              <a:schemeClr val="lt1"/>
+            </a:fontRef>
+          </p:style>
+          <p:txBody>
+            <a:bodyPr rtlCol="0" anchor="ctr"/>
+            <a:lstStyle/>
+            <a:p>
+              <a:pPr algn="ctr"/>
+              <a:endParaRPr lang="en-MY"/>
+            </a:p>
+          </p:txBody>
+        </p:sp>
+        <p:sp>
+          <p:nvSpPr>
+            <p:cNvPr id="151" name="Rectangle: Top Corners Snipped 150">
+              <a:extLst>
+                <a:ext uri="{FF2B5EF4-FFF2-40B4-BE49-F238E27FC236}">
+                  <a16:creationId xmlns:a16="http://schemas.microsoft.com/office/drawing/2014/main" id="{A2231E63-8D68-7B93-7A5E-864CB125D03D}"/>
+                </a:ext>
+              </a:extLst>
+            </p:cNvPr>
+            <p:cNvSpPr/>
+            <p:nvPr/>
+          </p:nvSpPr>
+          <p:spPr>
+            <a:xfrm rot="10800000">
+              <a:off x="2567608" y="4437112"/>
+              <a:ext cx="216024" cy="72008"/>
+            </a:xfrm>
+            <a:prstGeom prst="snip2SameRect">
+              <a:avLst>
+                <a:gd name="adj1" fmla="val 41469"/>
+                <a:gd name="adj2" fmla="val 0"/>
+              </a:avLst>
+            </a:prstGeom>
+            <a:noFill/>
+            <a:ln w="9525"/>
+          </p:spPr>
+          <p:style>
+            <a:lnRef idx="2">
+              <a:schemeClr val="accent1">
+                <a:shade val="15000"/>
+              </a:schemeClr>
+            </a:lnRef>
+            <a:fillRef idx="1">
+              <a:schemeClr val="accent1"/>
+            </a:fillRef>
+            <a:effectRef idx="0">
+              <a:schemeClr val="accent1"/>
+            </a:effectRef>
+            <a:fontRef idx="minor">
+              <a:schemeClr val="lt1"/>
+            </a:fontRef>
+          </p:style>
+          <p:txBody>
+            <a:bodyPr rtlCol="0" anchor="ctr"/>
+            <a:lstStyle/>
+            <a:p>
+              <a:pPr algn="ctr"/>
+              <a:endParaRPr lang="en-MY"/>
+            </a:p>
+          </p:txBody>
+        </p:sp>
+      </p:grpSp>
+      <p:grpSp>
+        <p:nvGrpSpPr>
+          <p:cNvPr id="152" name="Group 151">
+            <a:extLst>
+              <a:ext uri="{FF2B5EF4-FFF2-40B4-BE49-F238E27FC236}">
+                <a16:creationId xmlns:a16="http://schemas.microsoft.com/office/drawing/2014/main" id="{2D5D8211-151F-3B20-27F2-8308F760D7C9}"/>
+              </a:ext>
+            </a:extLst>
+          </p:cNvPr>
+          <p:cNvGrpSpPr/>
+          <p:nvPr/>
+        </p:nvGrpSpPr>
+        <p:grpSpPr>
+          <a:xfrm>
+            <a:off x="4799856" y="4941168"/>
+            <a:ext cx="72008" cy="72008"/>
+            <a:chOff x="2567608" y="4437112"/>
+            <a:chExt cx="216024" cy="216024"/>
+          </a:xfrm>
+        </p:grpSpPr>
+        <p:cxnSp>
+          <p:nvCxnSpPr>
+            <p:cNvPr id="153" name="Straight Connector 152">
+              <a:extLst>
+                <a:ext uri="{FF2B5EF4-FFF2-40B4-BE49-F238E27FC236}">
+                  <a16:creationId xmlns:a16="http://schemas.microsoft.com/office/drawing/2014/main" id="{6C08A7A0-D0FD-367B-9C89-413AF1605656}"/>
+                </a:ext>
+              </a:extLst>
+            </p:cNvPr>
+            <p:cNvCxnSpPr>
+              <a:cxnSpLocks/>
+            </p:cNvCxnSpPr>
+            <p:nvPr/>
+          </p:nvCxnSpPr>
+          <p:spPr>
+            <a:xfrm>
+              <a:off x="2567608" y="4653136"/>
+              <a:ext cx="216024" cy="0"/>
+            </a:xfrm>
+            <a:prstGeom prst="line">
+              <a:avLst/>
+            </a:prstGeom>
+            <a:ln w="9525">
+              <a:solidFill>
+                <a:schemeClr val="tx1"/>
+              </a:solidFill>
+            </a:ln>
+          </p:spPr>
+          <p:style>
+            <a:lnRef idx="2">
+              <a:schemeClr val="accent1"/>
+            </a:lnRef>
+            <a:fillRef idx="0">
+              <a:schemeClr val="accent1"/>
+            </a:fillRef>
+            <a:effectRef idx="1">
+              <a:schemeClr val="accent1"/>
+            </a:effectRef>
+            <a:fontRef idx="minor">
+              <a:schemeClr val="tx1"/>
+            </a:fontRef>
+          </p:style>
+        </p:cxnSp>
+        <p:sp>
+          <p:nvSpPr>
+            <p:cNvPr id="154" name="Rectangle 153">
+              <a:extLst>
+                <a:ext uri="{FF2B5EF4-FFF2-40B4-BE49-F238E27FC236}">
+                  <a16:creationId xmlns:a16="http://schemas.microsoft.com/office/drawing/2014/main" id="{87FAD325-B2E9-8514-6611-902AAD11E24C}"/>
+                </a:ext>
+              </a:extLst>
+            </p:cNvPr>
+            <p:cNvSpPr/>
+            <p:nvPr/>
+          </p:nvSpPr>
+          <p:spPr>
+            <a:xfrm>
+              <a:off x="2639616" y="4509120"/>
+              <a:ext cx="72008" cy="72008"/>
+            </a:xfrm>
+            <a:prstGeom prst="rect">
+              <a:avLst/>
+            </a:prstGeom>
+            <a:noFill/>
+            <a:ln w="9525"/>
+          </p:spPr>
+          <p:style>
+            <a:lnRef idx="2">
+              <a:schemeClr val="accent1">
+                <a:shade val="15000"/>
+              </a:schemeClr>
+            </a:lnRef>
+            <a:fillRef idx="1">
+              <a:schemeClr val="accent1"/>
+            </a:fillRef>
+            <a:effectRef idx="0">
+              <a:schemeClr val="accent1"/>
+            </a:effectRef>
+            <a:fontRef idx="minor">
+              <a:schemeClr val="lt1"/>
+            </a:fontRef>
+          </p:style>
+          <p:txBody>
+            <a:bodyPr rtlCol="0" anchor="ctr"/>
+            <a:lstStyle/>
+            <a:p>
+              <a:pPr algn="ctr"/>
+              <a:endParaRPr lang="en-MY"/>
+            </a:p>
+          </p:txBody>
+        </p:sp>
+        <p:sp>
+          <p:nvSpPr>
+            <p:cNvPr id="155" name="Rectangle: Top Corners Snipped 154">
+              <a:extLst>
+                <a:ext uri="{FF2B5EF4-FFF2-40B4-BE49-F238E27FC236}">
+                  <a16:creationId xmlns:a16="http://schemas.microsoft.com/office/drawing/2014/main" id="{92B1D406-1EC6-5747-2F2B-67A194D4E372}"/>
+                </a:ext>
+              </a:extLst>
+            </p:cNvPr>
+            <p:cNvSpPr/>
+            <p:nvPr/>
+          </p:nvSpPr>
+          <p:spPr>
+            <a:xfrm rot="10800000">
+              <a:off x="2567608" y="4437112"/>
+              <a:ext cx="216024" cy="72008"/>
+            </a:xfrm>
+            <a:prstGeom prst="snip2SameRect">
+              <a:avLst>
+                <a:gd name="adj1" fmla="val 41469"/>
+                <a:gd name="adj2" fmla="val 0"/>
+              </a:avLst>
+            </a:prstGeom>
+            <a:noFill/>
+            <a:ln w="9525"/>
+          </p:spPr>
+          <p:style>
+            <a:lnRef idx="2">
+              <a:schemeClr val="accent1">
+                <a:shade val="15000"/>
+              </a:schemeClr>
+            </a:lnRef>
+            <a:fillRef idx="1">
+              <a:schemeClr val="accent1"/>
+            </a:fillRef>
+            <a:effectRef idx="0">
+              <a:schemeClr val="accent1"/>
+            </a:effectRef>
+            <a:fontRef idx="minor">
+              <a:schemeClr val="lt1"/>
+            </a:fontRef>
+          </p:style>
+          <p:txBody>
+            <a:bodyPr rtlCol="0" anchor="ctr"/>
+            <a:lstStyle/>
+            <a:p>
+              <a:pPr algn="ctr"/>
+              <a:endParaRPr lang="en-MY"/>
+            </a:p>
+          </p:txBody>
+        </p:sp>
+      </p:grpSp>
+      <p:grpSp>
+        <p:nvGrpSpPr>
+          <p:cNvPr id="156" name="Group 155">
+            <a:extLst>
+              <a:ext uri="{FF2B5EF4-FFF2-40B4-BE49-F238E27FC236}">
+                <a16:creationId xmlns:a16="http://schemas.microsoft.com/office/drawing/2014/main" id="{ED8B60E6-A37E-1144-EC86-D63ABBD7CC47}"/>
+              </a:ext>
+            </a:extLst>
+          </p:cNvPr>
+          <p:cNvGrpSpPr/>
+          <p:nvPr/>
+        </p:nvGrpSpPr>
+        <p:grpSpPr>
+          <a:xfrm>
+            <a:off x="7104112" y="3717032"/>
+            <a:ext cx="72008" cy="72008"/>
+            <a:chOff x="2567608" y="4437112"/>
+            <a:chExt cx="216024" cy="216024"/>
+          </a:xfrm>
+        </p:grpSpPr>
+        <p:cxnSp>
+          <p:nvCxnSpPr>
+            <p:cNvPr id="157" name="Straight Connector 156">
+              <a:extLst>
+                <a:ext uri="{FF2B5EF4-FFF2-40B4-BE49-F238E27FC236}">
+                  <a16:creationId xmlns:a16="http://schemas.microsoft.com/office/drawing/2014/main" id="{B6847356-38F9-8F37-B224-956ECC347F06}"/>
+                </a:ext>
+              </a:extLst>
+            </p:cNvPr>
+            <p:cNvCxnSpPr>
+              <a:cxnSpLocks/>
+            </p:cNvCxnSpPr>
+            <p:nvPr/>
+          </p:nvCxnSpPr>
+          <p:spPr>
+            <a:xfrm>
+              <a:off x="2567608" y="4653136"/>
+              <a:ext cx="216024" cy="0"/>
+            </a:xfrm>
+            <a:prstGeom prst="line">
+              <a:avLst/>
+            </a:prstGeom>
+            <a:ln w="9525">
+              <a:solidFill>
+                <a:schemeClr val="tx1"/>
+              </a:solidFill>
+            </a:ln>
+          </p:spPr>
+          <p:style>
+            <a:lnRef idx="2">
+              <a:schemeClr val="accent1"/>
+            </a:lnRef>
+            <a:fillRef idx="0">
+              <a:schemeClr val="accent1"/>
+            </a:fillRef>
+            <a:effectRef idx="1">
+              <a:schemeClr val="accent1"/>
+            </a:effectRef>
+            <a:fontRef idx="minor">
+              <a:schemeClr val="tx1"/>
+            </a:fontRef>
+          </p:style>
+        </p:cxnSp>
+        <p:sp>
+          <p:nvSpPr>
+            <p:cNvPr id="158" name="Rectangle 157">
+              <a:extLst>
+                <a:ext uri="{FF2B5EF4-FFF2-40B4-BE49-F238E27FC236}">
+                  <a16:creationId xmlns:a16="http://schemas.microsoft.com/office/drawing/2014/main" id="{B4863A92-7950-F212-C5A7-B029340EA1E4}"/>
+                </a:ext>
+              </a:extLst>
+            </p:cNvPr>
+            <p:cNvSpPr/>
+            <p:nvPr/>
+          </p:nvSpPr>
+          <p:spPr>
+            <a:xfrm>
+              <a:off x="2639616" y="4509120"/>
+              <a:ext cx="72008" cy="72008"/>
+            </a:xfrm>
+            <a:prstGeom prst="rect">
+              <a:avLst/>
+            </a:prstGeom>
+            <a:noFill/>
+            <a:ln w="9525"/>
+          </p:spPr>
+          <p:style>
+            <a:lnRef idx="2">
+              <a:schemeClr val="accent1">
+                <a:shade val="15000"/>
+              </a:schemeClr>
+            </a:lnRef>
+            <a:fillRef idx="1">
+              <a:schemeClr val="accent1"/>
+            </a:fillRef>
+            <a:effectRef idx="0">
+              <a:schemeClr val="accent1"/>
+            </a:effectRef>
+            <a:fontRef idx="minor">
+              <a:schemeClr val="lt1"/>
+            </a:fontRef>
+          </p:style>
+          <p:txBody>
+            <a:bodyPr rtlCol="0" anchor="ctr"/>
+            <a:lstStyle/>
+            <a:p>
+              <a:pPr algn="ctr"/>
+              <a:endParaRPr lang="en-MY"/>
+            </a:p>
+          </p:txBody>
+        </p:sp>
+        <p:sp>
+          <p:nvSpPr>
+            <p:cNvPr id="159" name="Rectangle: Top Corners Snipped 158">
+              <a:extLst>
+                <a:ext uri="{FF2B5EF4-FFF2-40B4-BE49-F238E27FC236}">
+                  <a16:creationId xmlns:a16="http://schemas.microsoft.com/office/drawing/2014/main" id="{DC02E4CA-36D4-F456-94D1-2472790B7AF2}"/>
+                </a:ext>
+              </a:extLst>
+            </p:cNvPr>
+            <p:cNvSpPr/>
+            <p:nvPr/>
+          </p:nvSpPr>
+          <p:spPr>
+            <a:xfrm rot="10800000">
+              <a:off x="2567608" y="4437112"/>
+              <a:ext cx="216024" cy="72008"/>
+            </a:xfrm>
+            <a:prstGeom prst="snip2SameRect">
+              <a:avLst>
+                <a:gd name="adj1" fmla="val 41469"/>
+                <a:gd name="adj2" fmla="val 0"/>
+              </a:avLst>
+            </a:prstGeom>
+            <a:noFill/>
+            <a:ln w="9525"/>
+          </p:spPr>
+          <p:style>
+            <a:lnRef idx="2">
+              <a:schemeClr val="accent1">
+                <a:shade val="15000"/>
+              </a:schemeClr>
+            </a:lnRef>
+            <a:fillRef idx="1">
+              <a:schemeClr val="accent1"/>
+            </a:fillRef>
+            <a:effectRef idx="0">
+              <a:schemeClr val="accent1"/>
+            </a:effectRef>
+            <a:fontRef idx="minor">
+              <a:schemeClr val="lt1"/>
+            </a:fontRef>
+          </p:style>
+          <p:txBody>
+            <a:bodyPr rtlCol="0" anchor="ctr"/>
+            <a:lstStyle/>
+            <a:p>
+              <a:pPr algn="ctr"/>
+              <a:endParaRPr lang="en-MY"/>
+            </a:p>
+          </p:txBody>
+        </p:sp>
+      </p:grpSp>
+      <p:sp>
+        <p:nvSpPr>
+          <p:cNvPr id="51" name="Oval 50">
+            <a:extLst>
+              <a:ext uri="{FF2B5EF4-FFF2-40B4-BE49-F238E27FC236}">
+                <a16:creationId xmlns:a16="http://schemas.microsoft.com/office/drawing/2014/main" id="{EB9ACA78-DEB6-659A-392A-DA2F5A690531}"/>
+              </a:ext>
+            </a:extLst>
+          </p:cNvPr>
+          <p:cNvSpPr/>
+          <p:nvPr/>
+        </p:nvSpPr>
+        <p:spPr>
+          <a:xfrm>
+            <a:off x="7608168" y="3861048"/>
+            <a:ext cx="288032" cy="288032"/>
+          </a:xfrm>
+          <a:prstGeom prst="ellipse">
+            <a:avLst/>
+          </a:prstGeom>
+          <a:solidFill>
+            <a:srgbClr val="FFC000"/>
+          </a:solidFill>
+          <a:ln>
+            <a:noFill/>
+          </a:ln>
+        </p:spPr>
+        <p:style>
+          <a:lnRef idx="2">
+            <a:schemeClr val="accent1">
+              <a:shade val="15000"/>
+            </a:schemeClr>
+          </a:lnRef>
+          <a:fillRef idx="1">
+            <a:schemeClr val="accent1"/>
+          </a:fillRef>
+          <a:effectRef idx="0">
+            <a:schemeClr val="accent1"/>
+          </a:effectRef>
+          <a:fontRef idx="minor">
+            <a:schemeClr val="lt1"/>
+          </a:fontRef>
+        </p:style>
+        <p:txBody>
+          <a:bodyPr wrap="none" rtlCol="0" anchor="ctr"/>
+          <a:lstStyle/>
+          <a:p>
+            <a:pPr algn="ctr"/>
+            <a:r>
+              <a:rPr lang="en-MY" sz="800" dirty="0">
+                <a:solidFill>
+                  <a:schemeClr val="tx1"/>
+                </a:solidFill>
+              </a:rPr>
+              <a:t>D1</a:t>
+            </a:r>
+          </a:p>
+        </p:txBody>
+      </p:sp>
+      <p:grpSp>
+        <p:nvGrpSpPr>
+          <p:cNvPr id="164" name="Group 163">
+            <a:extLst>
+              <a:ext uri="{FF2B5EF4-FFF2-40B4-BE49-F238E27FC236}">
+                <a16:creationId xmlns:a16="http://schemas.microsoft.com/office/drawing/2014/main" id="{5269052E-00ED-D5A8-0EE3-A3822AAF739A}"/>
+              </a:ext>
+            </a:extLst>
+          </p:cNvPr>
+          <p:cNvGrpSpPr/>
+          <p:nvPr/>
+        </p:nvGrpSpPr>
+        <p:grpSpPr>
+          <a:xfrm>
+            <a:off x="7104112" y="4149080"/>
+            <a:ext cx="72008" cy="72008"/>
+            <a:chOff x="1991544" y="3429000"/>
+            <a:chExt cx="216024" cy="216024"/>
+          </a:xfrm>
+        </p:grpSpPr>
+        <p:cxnSp>
+          <p:nvCxnSpPr>
+            <p:cNvPr id="161" name="Straight Connector 160">
+              <a:extLst>
+                <a:ext uri="{FF2B5EF4-FFF2-40B4-BE49-F238E27FC236}">
+                  <a16:creationId xmlns:a16="http://schemas.microsoft.com/office/drawing/2014/main" id="{B7DAC646-F630-D138-12DA-65E6A3EEFFD8}"/>
+                </a:ext>
+              </a:extLst>
+            </p:cNvPr>
+            <p:cNvCxnSpPr>
+              <a:cxnSpLocks/>
+            </p:cNvCxnSpPr>
+            <p:nvPr/>
+          </p:nvCxnSpPr>
+          <p:spPr>
+            <a:xfrm>
+              <a:off x="1991544" y="3645024"/>
+              <a:ext cx="216024" cy="0"/>
+            </a:xfrm>
+            <a:prstGeom prst="line">
+              <a:avLst/>
+            </a:prstGeom>
+            <a:ln w="9525">
+              <a:solidFill>
+                <a:schemeClr val="tx1"/>
+              </a:solidFill>
+            </a:ln>
+          </p:spPr>
+          <p:style>
+            <a:lnRef idx="2">
+              <a:schemeClr val="accent1"/>
+            </a:lnRef>
+            <a:fillRef idx="0">
+              <a:schemeClr val="accent1"/>
+            </a:fillRef>
+            <a:effectRef idx="1">
+              <a:schemeClr val="accent1"/>
+            </a:effectRef>
+            <a:fontRef idx="minor">
+              <a:schemeClr val="tx1"/>
+            </a:fontRef>
+          </p:style>
+        </p:cxnSp>
+        <p:sp>
+          <p:nvSpPr>
+            <p:cNvPr id="162" name="Rectangle 161">
+              <a:extLst>
+                <a:ext uri="{FF2B5EF4-FFF2-40B4-BE49-F238E27FC236}">
+                  <a16:creationId xmlns:a16="http://schemas.microsoft.com/office/drawing/2014/main" id="{B30BD75D-0048-A8EE-4AB3-1AA6907DCEF4}"/>
+                </a:ext>
+              </a:extLst>
+            </p:cNvPr>
+            <p:cNvSpPr/>
+            <p:nvPr/>
+          </p:nvSpPr>
+          <p:spPr>
+            <a:xfrm>
+              <a:off x="2063552" y="3429000"/>
+              <a:ext cx="72008" cy="72008"/>
+            </a:xfrm>
+            <a:prstGeom prst="rect">
+              <a:avLst/>
+            </a:prstGeom>
+            <a:noFill/>
+            <a:ln w="9525"/>
+          </p:spPr>
+          <p:style>
+            <a:lnRef idx="2">
+              <a:schemeClr val="accent1">
+                <a:shade val="15000"/>
+              </a:schemeClr>
+            </a:lnRef>
+            <a:fillRef idx="1">
+              <a:schemeClr val="accent1"/>
+            </a:fillRef>
+            <a:effectRef idx="0">
+              <a:schemeClr val="accent1"/>
+            </a:effectRef>
+            <a:fontRef idx="minor">
+              <a:schemeClr val="lt1"/>
+            </a:fontRef>
+          </p:style>
+          <p:txBody>
+            <a:bodyPr rtlCol="0" anchor="ctr"/>
+            <a:lstStyle/>
+            <a:p>
+              <a:pPr algn="ctr"/>
+              <a:endParaRPr lang="en-MY"/>
+            </a:p>
+          </p:txBody>
+        </p:sp>
+      </p:grpSp>
+      <p:sp>
+        <p:nvSpPr>
+          <p:cNvPr id="166" name="Rectangle 165">
+            <a:extLst>
+              <a:ext uri="{FF2B5EF4-FFF2-40B4-BE49-F238E27FC236}">
+                <a16:creationId xmlns:a16="http://schemas.microsoft.com/office/drawing/2014/main" id="{87E6CA44-B157-57F0-9220-448CE805A177}"/>
+              </a:ext>
+            </a:extLst>
+          </p:cNvPr>
+          <p:cNvSpPr/>
+          <p:nvPr/>
+        </p:nvSpPr>
+        <p:spPr>
+          <a:xfrm>
+            <a:off x="7104112" y="4077072"/>
+            <a:ext cx="720080" cy="216024"/>
+          </a:xfrm>
+          <a:prstGeom prst="rect">
+            <a:avLst/>
+          </a:prstGeom>
+          <a:noFill/>
+          <a:ln>
+            <a:noFill/>
+          </a:ln>
+        </p:spPr>
+        <p:style>
+          <a:lnRef idx="2">
+            <a:schemeClr val="accent1">
+              <a:shade val="15000"/>
+            </a:schemeClr>
+          </a:lnRef>
+          <a:fillRef idx="1">
+            <a:schemeClr val="accent1"/>
+          </a:fillRef>
+          <a:effectRef idx="0">
+            <a:schemeClr val="accent1"/>
+          </a:effectRef>
+          <a:fontRef idx="minor">
+            <a:schemeClr val="lt1"/>
+          </a:fontRef>
+        </p:style>
+        <p:txBody>
+          <a:bodyPr rtlCol="0" anchor="ctr"/>
+          <a:lstStyle/>
+          <a:p>
+            <a:r>
+              <a:rPr lang="en-US" sz="800" dirty="0">
+                <a:solidFill>
+                  <a:sysClr val="windowText" lastClr="000000"/>
+                </a:solidFill>
+              </a:rPr>
+              <a:t>End Gap</a:t>
+            </a:r>
+          </a:p>
+        </p:txBody>
+      </p:sp>
+      <p:sp>
+        <p:nvSpPr>
+          <p:cNvPr id="199" name="Rectangle 198">
+            <a:extLst>
+              <a:ext uri="{FF2B5EF4-FFF2-40B4-BE49-F238E27FC236}">
+                <a16:creationId xmlns:a16="http://schemas.microsoft.com/office/drawing/2014/main" id="{04E1EE4D-64FC-C81E-2BD9-606FC692C5A8}"/>
+              </a:ext>
+            </a:extLst>
+          </p:cNvPr>
+          <p:cNvSpPr/>
+          <p:nvPr/>
+        </p:nvSpPr>
+        <p:spPr>
+          <a:xfrm>
+            <a:off x="7032104" y="3429000"/>
+            <a:ext cx="2664296" cy="2304256"/>
+          </a:xfrm>
+          <a:prstGeom prst="rect">
+            <a:avLst/>
+          </a:prstGeom>
+          <a:noFill/>
+        </p:spPr>
+        <p:style>
+          <a:lnRef idx="2">
+            <a:schemeClr val="accent1">
+              <a:shade val="15000"/>
+            </a:schemeClr>
+          </a:lnRef>
+          <a:fillRef idx="1">
+            <a:schemeClr val="accent1"/>
+          </a:fillRef>
+          <a:effectRef idx="0">
+            <a:schemeClr val="accent1"/>
+          </a:effectRef>
+          <a:fontRef idx="minor">
+            <a:schemeClr val="lt1"/>
+          </a:fontRef>
+        </p:style>
+        <p:txBody>
+          <a:bodyPr rtlCol="0" anchor="ctr"/>
+          <a:lstStyle/>
+          <a:p>
+            <a:pPr algn="ctr"/>
+            <a:endParaRPr lang="en-MY"/>
+          </a:p>
+        </p:txBody>
+      </p:sp>
+      <p:sp>
+        <p:nvSpPr>
+          <p:cNvPr id="121" name="Rectangle 120">
+            <a:extLst>
+              <a:ext uri="{FF2B5EF4-FFF2-40B4-BE49-F238E27FC236}">
+                <a16:creationId xmlns:a16="http://schemas.microsoft.com/office/drawing/2014/main" id="{021EBFDE-FFE3-FCA0-D422-73C1BDCC4694}"/>
+              </a:ext>
+            </a:extLst>
+          </p:cNvPr>
+          <p:cNvSpPr/>
+          <p:nvPr/>
+        </p:nvSpPr>
+        <p:spPr>
+          <a:xfrm>
+            <a:off x="7104112" y="3789040"/>
+            <a:ext cx="792088" cy="216024"/>
+          </a:xfrm>
+          <a:prstGeom prst="rect">
+            <a:avLst/>
+          </a:prstGeom>
+          <a:noFill/>
+          <a:ln>
+            <a:noFill/>
+          </a:ln>
+        </p:spPr>
+        <p:style>
+          <a:lnRef idx="2">
+            <a:schemeClr val="accent1">
+              <a:shade val="15000"/>
+            </a:schemeClr>
+          </a:lnRef>
+          <a:fillRef idx="1">
+            <a:schemeClr val="accent1"/>
+          </a:fillRef>
+          <a:effectRef idx="0">
+            <a:schemeClr val="accent1"/>
+          </a:effectRef>
+          <a:fontRef idx="minor">
+            <a:schemeClr val="lt1"/>
+          </a:fontRef>
+        </p:style>
+        <p:txBody>
+          <a:bodyPr rtlCol="0" anchor="ctr"/>
+          <a:lstStyle/>
+          <a:p>
+            <a:r>
+              <a:rPr lang="en-US" sz="800" dirty="0">
+                <a:solidFill>
+                  <a:sysClr val="windowText" lastClr="000000"/>
+                </a:solidFill>
+              </a:rPr>
+              <a:t>Down Wait</a:t>
+            </a:r>
+          </a:p>
+        </p:txBody>
+      </p:sp>
+      <p:sp>
+        <p:nvSpPr>
+          <p:cNvPr id="99" name="Rectangle 98">
+            <a:extLst>
+              <a:ext uri="{FF2B5EF4-FFF2-40B4-BE49-F238E27FC236}">
+                <a16:creationId xmlns:a16="http://schemas.microsoft.com/office/drawing/2014/main" id="{66C685D2-B038-1C6E-3EB1-7D85CEABF166}"/>
+              </a:ext>
+            </a:extLst>
+          </p:cNvPr>
+          <p:cNvSpPr/>
+          <p:nvPr/>
+        </p:nvSpPr>
+        <p:spPr>
+          <a:xfrm>
+            <a:off x="7104112" y="3933056"/>
+            <a:ext cx="792088" cy="216024"/>
+          </a:xfrm>
+          <a:prstGeom prst="rect">
+            <a:avLst/>
+          </a:prstGeom>
+          <a:noFill/>
+          <a:ln>
+            <a:noFill/>
+          </a:ln>
+        </p:spPr>
+        <p:style>
+          <a:lnRef idx="2">
+            <a:schemeClr val="accent1">
+              <a:shade val="15000"/>
+            </a:schemeClr>
+          </a:lnRef>
+          <a:fillRef idx="1">
+            <a:schemeClr val="accent1"/>
+          </a:fillRef>
+          <a:effectRef idx="0">
+            <a:schemeClr val="accent1"/>
+          </a:effectRef>
+          <a:fontRef idx="minor">
+            <a:schemeClr val="lt1"/>
+          </a:fontRef>
+        </p:style>
+        <p:txBody>
+          <a:bodyPr rtlCol="0" anchor="ctr"/>
+          <a:lstStyle/>
+          <a:p>
+            <a:r>
+              <a:rPr lang="en-US" sz="800" dirty="0">
+                <a:solidFill>
+                  <a:sysClr val="windowText" lastClr="000000"/>
+                </a:solidFill>
+              </a:rPr>
+              <a:t>Disp</a:t>
+            </a:r>
+          </a:p>
+        </p:txBody>
+      </p:sp>
+      <p:sp>
+        <p:nvSpPr>
+          <p:cNvPr id="103" name="Rectangle 102">
+            <a:extLst>
+              <a:ext uri="{FF2B5EF4-FFF2-40B4-BE49-F238E27FC236}">
+                <a16:creationId xmlns:a16="http://schemas.microsoft.com/office/drawing/2014/main" id="{115BB02D-F4FC-6979-0BED-FE72C114D6EB}"/>
+              </a:ext>
+            </a:extLst>
+          </p:cNvPr>
+          <p:cNvSpPr/>
+          <p:nvPr/>
+        </p:nvSpPr>
+        <p:spPr>
+          <a:xfrm>
+            <a:off x="8904312" y="4437112"/>
+            <a:ext cx="720080" cy="216024"/>
+          </a:xfrm>
+          <a:prstGeom prst="rect">
+            <a:avLst/>
+          </a:prstGeom>
+          <a:noFill/>
+          <a:ln>
+            <a:noFill/>
+          </a:ln>
+        </p:spPr>
+        <p:style>
+          <a:lnRef idx="2">
+            <a:schemeClr val="accent1">
+              <a:shade val="15000"/>
+            </a:schemeClr>
+          </a:lnRef>
+          <a:fillRef idx="1">
+            <a:schemeClr val="accent1"/>
+          </a:fillRef>
+          <a:effectRef idx="0">
+            <a:schemeClr val="accent1"/>
+          </a:effectRef>
+          <a:fontRef idx="minor">
+            <a:schemeClr val="lt1"/>
+          </a:fontRef>
+        </p:style>
+        <p:txBody>
+          <a:bodyPr rtlCol="0" anchor="ctr"/>
+          <a:lstStyle/>
+          <a:p>
+            <a:r>
+              <a:rPr lang="en-US" sz="800" dirty="0">
+                <a:solidFill>
+                  <a:sysClr val="windowText" lastClr="000000"/>
+                </a:solidFill>
+              </a:rPr>
+              <a:t>Disp Gap</a:t>
+            </a:r>
+          </a:p>
+        </p:txBody>
+      </p:sp>
+      <p:grpSp>
+        <p:nvGrpSpPr>
+          <p:cNvPr id="104" name="Group 103">
+            <a:extLst>
+              <a:ext uri="{FF2B5EF4-FFF2-40B4-BE49-F238E27FC236}">
+                <a16:creationId xmlns:a16="http://schemas.microsoft.com/office/drawing/2014/main" id="{A3275B7D-6AC7-F0B8-7ACF-751356DC2058}"/>
+              </a:ext>
+            </a:extLst>
+          </p:cNvPr>
+          <p:cNvGrpSpPr/>
+          <p:nvPr/>
+        </p:nvGrpSpPr>
+        <p:grpSpPr>
+          <a:xfrm>
+            <a:off x="8904312" y="4941168"/>
+            <a:ext cx="72008" cy="72008"/>
+            <a:chOff x="2711624" y="4149080"/>
+            <a:chExt cx="144016" cy="144016"/>
+          </a:xfrm>
+        </p:grpSpPr>
+        <p:sp>
+          <p:nvSpPr>
+            <p:cNvPr id="116" name="Oval 115">
+              <a:extLst>
+                <a:ext uri="{FF2B5EF4-FFF2-40B4-BE49-F238E27FC236}">
+                  <a16:creationId xmlns:a16="http://schemas.microsoft.com/office/drawing/2014/main" id="{5FB140AF-8DD7-D692-5BD9-8FE56A2C3CD2}"/>
+                </a:ext>
+              </a:extLst>
+            </p:cNvPr>
+            <p:cNvSpPr/>
+            <p:nvPr/>
+          </p:nvSpPr>
+          <p:spPr>
+            <a:xfrm>
+              <a:off x="2711624" y="4149080"/>
+              <a:ext cx="144016" cy="144016"/>
+            </a:xfrm>
+            <a:prstGeom prst="ellipse">
+              <a:avLst/>
+            </a:prstGeom>
+            <a:noFill/>
+            <a:ln w="9525"/>
+          </p:spPr>
+          <p:style>
+            <a:lnRef idx="2">
+              <a:schemeClr val="accent1">
+                <a:shade val="15000"/>
+              </a:schemeClr>
+            </a:lnRef>
+            <a:fillRef idx="1">
+              <a:schemeClr val="accent1"/>
+            </a:fillRef>
+            <a:effectRef idx="0">
+              <a:schemeClr val="accent1"/>
+            </a:effectRef>
+            <a:fontRef idx="minor">
+              <a:schemeClr val="lt1"/>
+            </a:fontRef>
+          </p:style>
+          <p:txBody>
+            <a:bodyPr rtlCol="0" anchor="ctr"/>
+            <a:lstStyle/>
+            <a:p>
+              <a:pPr algn="ctr"/>
+              <a:endParaRPr lang="en-MY"/>
+            </a:p>
+          </p:txBody>
+        </p:sp>
+        <p:cxnSp>
+          <p:nvCxnSpPr>
+            <p:cNvPr id="122" name="Straight Connector 121">
+              <a:extLst>
+                <a:ext uri="{FF2B5EF4-FFF2-40B4-BE49-F238E27FC236}">
+                  <a16:creationId xmlns:a16="http://schemas.microsoft.com/office/drawing/2014/main" id="{E8F33E3F-BC6E-98B2-F72F-D13C0BAEDD09}"/>
+                </a:ext>
+              </a:extLst>
+            </p:cNvPr>
+            <p:cNvCxnSpPr>
+              <a:cxnSpLocks/>
+            </p:cNvCxnSpPr>
+            <p:nvPr/>
+          </p:nvCxnSpPr>
+          <p:spPr>
+            <a:xfrm>
+              <a:off x="2783632" y="4149080"/>
+              <a:ext cx="0" cy="72008"/>
+            </a:xfrm>
+            <a:prstGeom prst="line">
+              <a:avLst/>
+            </a:prstGeom>
+            <a:ln w="9525"/>
+          </p:spPr>
+          <p:style>
+            <a:lnRef idx="2">
+              <a:schemeClr val="dk1"/>
+            </a:lnRef>
+            <a:fillRef idx="0">
+              <a:schemeClr val="dk1"/>
+            </a:fillRef>
+            <a:effectRef idx="1">
+              <a:schemeClr val="dk1"/>
+            </a:effectRef>
+            <a:fontRef idx="minor">
+              <a:schemeClr val="tx1"/>
+            </a:fontRef>
+          </p:style>
+        </p:cxnSp>
+        <p:cxnSp>
+          <p:nvCxnSpPr>
+            <p:cNvPr id="123" name="Straight Connector 122">
+              <a:extLst>
+                <a:ext uri="{FF2B5EF4-FFF2-40B4-BE49-F238E27FC236}">
+                  <a16:creationId xmlns:a16="http://schemas.microsoft.com/office/drawing/2014/main" id="{B17F2113-6FF2-D130-FD9C-7FF5B8B6BEFF}"/>
+                </a:ext>
+              </a:extLst>
+            </p:cNvPr>
+            <p:cNvCxnSpPr>
+              <a:cxnSpLocks/>
+            </p:cNvCxnSpPr>
+            <p:nvPr/>
+          </p:nvCxnSpPr>
+          <p:spPr>
+            <a:xfrm flipH="1">
+              <a:off x="2711624" y="4221088"/>
+              <a:ext cx="72008" cy="0"/>
+            </a:xfrm>
+            <a:prstGeom prst="line">
+              <a:avLst/>
+            </a:prstGeom>
+            <a:ln w="9525"/>
+          </p:spPr>
+          <p:style>
+            <a:lnRef idx="2">
+              <a:schemeClr val="dk1"/>
+            </a:lnRef>
+            <a:fillRef idx="0">
+              <a:schemeClr val="dk1"/>
+            </a:fillRef>
+            <a:effectRef idx="1">
+              <a:schemeClr val="dk1"/>
+            </a:effectRef>
+            <a:fontRef idx="minor">
+              <a:schemeClr val="tx1"/>
+            </a:fontRef>
+          </p:style>
+        </p:cxnSp>
+      </p:grpSp>
+      <p:grpSp>
+        <p:nvGrpSpPr>
+          <p:cNvPr id="124" name="Group 123">
+            <a:extLst>
+              <a:ext uri="{FF2B5EF4-FFF2-40B4-BE49-F238E27FC236}">
+                <a16:creationId xmlns:a16="http://schemas.microsoft.com/office/drawing/2014/main" id="{442FA0B9-8A3F-34B4-C178-798C430206F5}"/>
+              </a:ext>
+            </a:extLst>
+          </p:cNvPr>
+          <p:cNvGrpSpPr/>
+          <p:nvPr/>
+        </p:nvGrpSpPr>
+        <p:grpSpPr>
+          <a:xfrm>
+            <a:off x="8904312" y="4509120"/>
+            <a:ext cx="72008" cy="72008"/>
+            <a:chOff x="2567608" y="4437112"/>
+            <a:chExt cx="216024" cy="216024"/>
+          </a:xfrm>
+        </p:grpSpPr>
+        <p:cxnSp>
+          <p:nvCxnSpPr>
+            <p:cNvPr id="125" name="Straight Connector 124">
+              <a:extLst>
+                <a:ext uri="{FF2B5EF4-FFF2-40B4-BE49-F238E27FC236}">
+                  <a16:creationId xmlns:a16="http://schemas.microsoft.com/office/drawing/2014/main" id="{65F1B6D8-06C1-85EA-743A-4163B46990C2}"/>
+                </a:ext>
+              </a:extLst>
+            </p:cNvPr>
+            <p:cNvCxnSpPr>
+              <a:cxnSpLocks/>
+            </p:cNvCxnSpPr>
+            <p:nvPr/>
+          </p:nvCxnSpPr>
+          <p:spPr>
+            <a:xfrm>
+              <a:off x="2567608" y="4653136"/>
+              <a:ext cx="216024" cy="0"/>
+            </a:xfrm>
+            <a:prstGeom prst="line">
+              <a:avLst/>
+            </a:prstGeom>
+            <a:ln w="9525">
+              <a:solidFill>
+                <a:schemeClr val="tx1"/>
+              </a:solidFill>
+            </a:ln>
+          </p:spPr>
+          <p:style>
+            <a:lnRef idx="2">
+              <a:schemeClr val="accent1"/>
+            </a:lnRef>
+            <a:fillRef idx="0">
+              <a:schemeClr val="accent1"/>
+            </a:fillRef>
+            <a:effectRef idx="1">
+              <a:schemeClr val="accent1"/>
+            </a:effectRef>
+            <a:fontRef idx="minor">
+              <a:schemeClr val="tx1"/>
+            </a:fontRef>
+          </p:style>
+        </p:cxnSp>
+        <p:sp>
+          <p:nvSpPr>
+            <p:cNvPr id="126" name="Rectangle 125">
+              <a:extLst>
+                <a:ext uri="{FF2B5EF4-FFF2-40B4-BE49-F238E27FC236}">
+                  <a16:creationId xmlns:a16="http://schemas.microsoft.com/office/drawing/2014/main" id="{1014D32D-BD55-3E5B-52CC-7500F134671E}"/>
+                </a:ext>
+              </a:extLst>
+            </p:cNvPr>
+            <p:cNvSpPr/>
+            <p:nvPr/>
+          </p:nvSpPr>
+          <p:spPr>
+            <a:xfrm>
+              <a:off x="2639616" y="4509120"/>
+              <a:ext cx="72008" cy="72008"/>
+            </a:xfrm>
+            <a:prstGeom prst="rect">
+              <a:avLst/>
+            </a:prstGeom>
+            <a:noFill/>
+            <a:ln w="9525"/>
+          </p:spPr>
+          <p:style>
+            <a:lnRef idx="2">
+              <a:schemeClr val="accent1">
+                <a:shade val="15000"/>
+              </a:schemeClr>
+            </a:lnRef>
+            <a:fillRef idx="1">
+              <a:schemeClr val="accent1"/>
+            </a:fillRef>
+            <a:effectRef idx="0">
+              <a:schemeClr val="accent1"/>
+            </a:effectRef>
+            <a:fontRef idx="minor">
+              <a:schemeClr val="lt1"/>
+            </a:fontRef>
+          </p:style>
+          <p:txBody>
+            <a:bodyPr rtlCol="0" anchor="ctr"/>
+            <a:lstStyle/>
+            <a:p>
+              <a:pPr algn="ctr"/>
+              <a:endParaRPr lang="en-MY"/>
+            </a:p>
+          </p:txBody>
+        </p:sp>
+        <p:sp>
+          <p:nvSpPr>
+            <p:cNvPr id="134" name="Rectangle: Top Corners Snipped 133">
+              <a:extLst>
+                <a:ext uri="{FF2B5EF4-FFF2-40B4-BE49-F238E27FC236}">
+                  <a16:creationId xmlns:a16="http://schemas.microsoft.com/office/drawing/2014/main" id="{0280AF4B-0AE8-2860-9439-91B928E098A4}"/>
+                </a:ext>
+              </a:extLst>
+            </p:cNvPr>
+            <p:cNvSpPr/>
+            <p:nvPr/>
+          </p:nvSpPr>
+          <p:spPr>
+            <a:xfrm rot="10800000">
+              <a:off x="2567608" y="4437112"/>
+              <a:ext cx="216024" cy="72008"/>
+            </a:xfrm>
+            <a:prstGeom prst="snip2SameRect">
+              <a:avLst>
+                <a:gd name="adj1" fmla="val 41469"/>
+                <a:gd name="adj2" fmla="val 0"/>
+              </a:avLst>
+            </a:prstGeom>
+            <a:noFill/>
+            <a:ln w="9525"/>
+          </p:spPr>
+          <p:style>
+            <a:lnRef idx="2">
+              <a:schemeClr val="accent1">
+                <a:shade val="15000"/>
+              </a:schemeClr>
+            </a:lnRef>
+            <a:fillRef idx="1">
+              <a:schemeClr val="accent1"/>
+            </a:fillRef>
+            <a:effectRef idx="0">
+              <a:schemeClr val="accent1"/>
+            </a:effectRef>
+            <a:fontRef idx="minor">
+              <a:schemeClr val="lt1"/>
+            </a:fontRef>
+          </p:style>
+          <p:txBody>
+            <a:bodyPr rtlCol="0" anchor="ctr"/>
+            <a:lstStyle/>
+            <a:p>
+              <a:pPr algn="ctr"/>
+              <a:endParaRPr lang="en-MY"/>
+            </a:p>
+          </p:txBody>
+        </p:sp>
+      </p:grpSp>
+      <p:grpSp>
+        <p:nvGrpSpPr>
+          <p:cNvPr id="136" name="Group 135">
+            <a:extLst>
+              <a:ext uri="{FF2B5EF4-FFF2-40B4-BE49-F238E27FC236}">
+                <a16:creationId xmlns:a16="http://schemas.microsoft.com/office/drawing/2014/main" id="{F9165536-F4C9-6207-A969-DE87F930D41E}"/>
+              </a:ext>
+            </a:extLst>
+          </p:cNvPr>
+          <p:cNvGrpSpPr/>
+          <p:nvPr/>
+        </p:nvGrpSpPr>
+        <p:grpSpPr>
+          <a:xfrm>
+            <a:off x="8904312" y="4797152"/>
+            <a:ext cx="72008" cy="72008"/>
+            <a:chOff x="1991544" y="3429000"/>
+            <a:chExt cx="216024" cy="216024"/>
+          </a:xfrm>
+        </p:grpSpPr>
+        <p:cxnSp>
+          <p:nvCxnSpPr>
+            <p:cNvPr id="137" name="Straight Connector 136">
+              <a:extLst>
+                <a:ext uri="{FF2B5EF4-FFF2-40B4-BE49-F238E27FC236}">
+                  <a16:creationId xmlns:a16="http://schemas.microsoft.com/office/drawing/2014/main" id="{7C160374-5BA8-6035-AC2A-A33DEC2EDE74}"/>
+                </a:ext>
+              </a:extLst>
+            </p:cNvPr>
+            <p:cNvCxnSpPr>
+              <a:cxnSpLocks/>
+            </p:cNvCxnSpPr>
+            <p:nvPr/>
+          </p:nvCxnSpPr>
+          <p:spPr>
+            <a:xfrm>
+              <a:off x="1991544" y="3645024"/>
+              <a:ext cx="216024" cy="0"/>
+            </a:xfrm>
+            <a:prstGeom prst="line">
+              <a:avLst/>
+            </a:prstGeom>
+            <a:ln w="9525">
+              <a:solidFill>
+                <a:schemeClr val="tx1"/>
+              </a:solidFill>
+            </a:ln>
+          </p:spPr>
+          <p:style>
+            <a:lnRef idx="2">
+              <a:schemeClr val="accent1"/>
+            </a:lnRef>
+            <a:fillRef idx="0">
+              <a:schemeClr val="accent1"/>
+            </a:fillRef>
+            <a:effectRef idx="1">
+              <a:schemeClr val="accent1"/>
+            </a:effectRef>
+            <a:fontRef idx="minor">
+              <a:schemeClr val="tx1"/>
+            </a:fontRef>
+          </p:style>
+        </p:cxnSp>
+        <p:sp>
+          <p:nvSpPr>
+            <p:cNvPr id="139" name="Rectangle 138">
+              <a:extLst>
+                <a:ext uri="{FF2B5EF4-FFF2-40B4-BE49-F238E27FC236}">
+                  <a16:creationId xmlns:a16="http://schemas.microsoft.com/office/drawing/2014/main" id="{3E46DA2C-C07E-C59A-E129-BEA125CBCAF6}"/>
+                </a:ext>
+              </a:extLst>
+            </p:cNvPr>
+            <p:cNvSpPr/>
+            <p:nvPr/>
+          </p:nvSpPr>
+          <p:spPr>
+            <a:xfrm>
+              <a:off x="2063552" y="3429000"/>
+              <a:ext cx="72008" cy="72008"/>
+            </a:xfrm>
+            <a:prstGeom prst="rect">
+              <a:avLst/>
+            </a:prstGeom>
+            <a:noFill/>
+            <a:ln w="9525"/>
+          </p:spPr>
+          <p:style>
+            <a:lnRef idx="2">
+              <a:schemeClr val="accent1">
+                <a:shade val="15000"/>
+              </a:schemeClr>
+            </a:lnRef>
+            <a:fillRef idx="1">
+              <a:schemeClr val="accent1"/>
+            </a:fillRef>
+            <a:effectRef idx="0">
+              <a:schemeClr val="accent1"/>
+            </a:effectRef>
+            <a:fontRef idx="minor">
+              <a:schemeClr val="lt1"/>
+            </a:fontRef>
+          </p:style>
+          <p:txBody>
+            <a:bodyPr rtlCol="0" anchor="ctr"/>
+            <a:lstStyle/>
+            <a:p>
+              <a:pPr algn="ctr"/>
+              <a:endParaRPr lang="en-MY"/>
+            </a:p>
+          </p:txBody>
+        </p:sp>
+      </p:grpSp>
+      <p:sp>
+        <p:nvSpPr>
+          <p:cNvPr id="143" name="Rectangle 142">
+            <a:extLst>
+              <a:ext uri="{FF2B5EF4-FFF2-40B4-BE49-F238E27FC236}">
+                <a16:creationId xmlns:a16="http://schemas.microsoft.com/office/drawing/2014/main" id="{17EAB9E5-F90F-6322-4194-D850B5A71588}"/>
+              </a:ext>
+            </a:extLst>
+          </p:cNvPr>
+          <p:cNvSpPr/>
+          <p:nvPr/>
+        </p:nvSpPr>
+        <p:spPr>
+          <a:xfrm>
+            <a:off x="8904312" y="4725144"/>
+            <a:ext cx="720080" cy="216024"/>
+          </a:xfrm>
+          <a:prstGeom prst="rect">
+            <a:avLst/>
+          </a:prstGeom>
+          <a:noFill/>
+          <a:ln>
+            <a:noFill/>
+          </a:ln>
+        </p:spPr>
+        <p:style>
+          <a:lnRef idx="2">
+            <a:schemeClr val="accent1">
+              <a:shade val="15000"/>
+            </a:schemeClr>
+          </a:lnRef>
+          <a:fillRef idx="1">
+            <a:schemeClr val="accent1"/>
+          </a:fillRef>
+          <a:effectRef idx="0">
+            <a:schemeClr val="accent1"/>
+          </a:effectRef>
+          <a:fontRef idx="minor">
+            <a:schemeClr val="lt1"/>
+          </a:fontRef>
+        </p:style>
+        <p:txBody>
+          <a:bodyPr rtlCol="0" anchor="ctr"/>
+          <a:lstStyle/>
+          <a:p>
+            <a:r>
+              <a:rPr lang="en-US" sz="800" dirty="0">
+                <a:solidFill>
+                  <a:sysClr val="windowText" lastClr="000000"/>
+                </a:solidFill>
+              </a:rPr>
+              <a:t>End Gap</a:t>
+            </a:r>
+          </a:p>
+        </p:txBody>
+      </p:sp>
+      <p:sp>
+        <p:nvSpPr>
+          <p:cNvPr id="147" name="Rectangle 146">
+            <a:extLst>
+              <a:ext uri="{FF2B5EF4-FFF2-40B4-BE49-F238E27FC236}">
+                <a16:creationId xmlns:a16="http://schemas.microsoft.com/office/drawing/2014/main" id="{47ED0520-74F9-BA86-151A-D547435244FA}"/>
+              </a:ext>
+            </a:extLst>
+          </p:cNvPr>
+          <p:cNvSpPr/>
+          <p:nvPr/>
+        </p:nvSpPr>
+        <p:spPr>
+          <a:xfrm>
+            <a:off x="8904312" y="4869160"/>
+            <a:ext cx="792088" cy="216024"/>
+          </a:xfrm>
+          <a:prstGeom prst="rect">
+            <a:avLst/>
+          </a:prstGeom>
+          <a:noFill/>
+          <a:ln>
+            <a:noFill/>
+          </a:ln>
+        </p:spPr>
+        <p:style>
+          <a:lnRef idx="2">
+            <a:schemeClr val="accent1">
+              <a:shade val="15000"/>
+            </a:schemeClr>
+          </a:lnRef>
+          <a:fillRef idx="1">
+            <a:schemeClr val="accent1"/>
+          </a:fillRef>
+          <a:effectRef idx="0">
+            <a:schemeClr val="accent1"/>
+          </a:effectRef>
+          <a:fontRef idx="minor">
+            <a:schemeClr val="lt1"/>
+          </a:fontRef>
+        </p:style>
+        <p:txBody>
+          <a:bodyPr rtlCol="0" anchor="ctr"/>
+          <a:lstStyle/>
+          <a:p>
+            <a:r>
+              <a:rPr lang="en-US" sz="800" dirty="0">
+                <a:solidFill>
+                  <a:sysClr val="windowText" lastClr="000000"/>
+                </a:solidFill>
+              </a:rPr>
+              <a:t>Post Wait</a:t>
+            </a:r>
+          </a:p>
+        </p:txBody>
+      </p:sp>
+      <p:sp>
+        <p:nvSpPr>
+          <p:cNvPr id="160" name="Rectangle 159">
+            <a:extLst>
+              <a:ext uri="{FF2B5EF4-FFF2-40B4-BE49-F238E27FC236}">
+                <a16:creationId xmlns:a16="http://schemas.microsoft.com/office/drawing/2014/main" id="{A745E943-7273-E9AF-811B-CC6ABC680F17}"/>
+              </a:ext>
+            </a:extLst>
+          </p:cNvPr>
+          <p:cNvSpPr/>
+          <p:nvPr/>
+        </p:nvSpPr>
+        <p:spPr>
+          <a:xfrm>
+            <a:off x="8904312" y="4581128"/>
+            <a:ext cx="792088" cy="216024"/>
+          </a:xfrm>
+          <a:prstGeom prst="rect">
+            <a:avLst/>
+          </a:prstGeom>
+          <a:noFill/>
+          <a:ln>
+            <a:noFill/>
+          </a:ln>
+        </p:spPr>
+        <p:style>
+          <a:lnRef idx="2">
+            <a:schemeClr val="accent1">
+              <a:shade val="15000"/>
+            </a:schemeClr>
+          </a:lnRef>
+          <a:fillRef idx="1">
+            <a:schemeClr val="accent1"/>
+          </a:fillRef>
+          <a:effectRef idx="0">
+            <a:schemeClr val="accent1"/>
+          </a:effectRef>
+          <a:fontRef idx="minor">
+            <a:schemeClr val="lt1"/>
+          </a:fontRef>
+        </p:style>
+        <p:txBody>
+          <a:bodyPr rtlCol="0" anchor="ctr"/>
+          <a:lstStyle/>
+          <a:p>
+            <a:r>
+              <a:rPr lang="en-US" sz="800" dirty="0">
+                <a:solidFill>
+                  <a:sysClr val="windowText" lastClr="000000"/>
+                </a:solidFill>
+              </a:rPr>
+              <a:t>Disp</a:t>
+            </a:r>
+          </a:p>
+        </p:txBody>
+      </p:sp>
+      <p:sp>
+        <p:nvSpPr>
+          <p:cNvPr id="165" name="Oval 164">
+            <a:extLst>
+              <a:ext uri="{FF2B5EF4-FFF2-40B4-BE49-F238E27FC236}">
+                <a16:creationId xmlns:a16="http://schemas.microsoft.com/office/drawing/2014/main" id="{D817EE5F-9AFF-3806-A191-BB6658C57B30}"/>
+              </a:ext>
+            </a:extLst>
+          </p:cNvPr>
+          <p:cNvSpPr/>
+          <p:nvPr/>
+        </p:nvSpPr>
+        <p:spPr>
+          <a:xfrm>
+            <a:off x="8976320" y="5085184"/>
+            <a:ext cx="288032" cy="288032"/>
+          </a:xfrm>
+          <a:prstGeom prst="ellipse">
+            <a:avLst/>
+          </a:prstGeom>
+          <a:solidFill>
+            <a:srgbClr val="FFC000"/>
+          </a:solidFill>
+          <a:ln>
+            <a:noFill/>
+          </a:ln>
+        </p:spPr>
+        <p:style>
+          <a:lnRef idx="2">
+            <a:schemeClr val="accent1">
+              <a:shade val="15000"/>
+            </a:schemeClr>
+          </a:lnRef>
+          <a:fillRef idx="1">
+            <a:schemeClr val="accent1"/>
+          </a:fillRef>
+          <a:effectRef idx="0">
+            <a:schemeClr val="accent1"/>
+          </a:effectRef>
+          <a:fontRef idx="minor">
+            <a:schemeClr val="lt1"/>
+          </a:fontRef>
+        </p:style>
+        <p:txBody>
+          <a:bodyPr wrap="none" rtlCol="0" anchor="ctr"/>
+          <a:lstStyle/>
+          <a:p>
+            <a:pPr algn="ctr"/>
+            <a:r>
+              <a:rPr lang="en-MY" sz="800" dirty="0">
+                <a:solidFill>
+                  <a:schemeClr val="tx1"/>
+                </a:solidFill>
+              </a:rPr>
+              <a:t>D4</a:t>
+            </a:r>
+          </a:p>
+        </p:txBody>
+      </p:sp>
+      <p:sp>
+        <p:nvSpPr>
+          <p:cNvPr id="167" name="Oval 166">
+            <a:extLst>
+              <a:ext uri="{FF2B5EF4-FFF2-40B4-BE49-F238E27FC236}">
+                <a16:creationId xmlns:a16="http://schemas.microsoft.com/office/drawing/2014/main" id="{C33B0E16-38AC-E02A-6B53-9CB63BD29D4D}"/>
+              </a:ext>
+            </a:extLst>
+          </p:cNvPr>
+          <p:cNvSpPr/>
+          <p:nvPr/>
+        </p:nvSpPr>
+        <p:spPr>
+          <a:xfrm>
+            <a:off x="8976320" y="3861048"/>
+            <a:ext cx="288032" cy="288032"/>
+          </a:xfrm>
+          <a:prstGeom prst="ellipse">
+            <a:avLst/>
+          </a:prstGeom>
+          <a:solidFill>
+            <a:srgbClr val="FFC000"/>
+          </a:solidFill>
+          <a:ln>
+            <a:noFill/>
+          </a:ln>
+        </p:spPr>
+        <p:style>
+          <a:lnRef idx="2">
+            <a:schemeClr val="accent1">
+              <a:shade val="15000"/>
+            </a:schemeClr>
+          </a:lnRef>
+          <a:fillRef idx="1">
+            <a:schemeClr val="accent1"/>
+          </a:fillRef>
+          <a:effectRef idx="0">
+            <a:schemeClr val="accent1"/>
+          </a:effectRef>
+          <a:fontRef idx="minor">
+            <a:schemeClr val="lt1"/>
+          </a:fontRef>
+        </p:style>
+        <p:txBody>
+          <a:bodyPr wrap="none" rtlCol="0" anchor="ctr"/>
+          <a:lstStyle/>
+          <a:p>
+            <a:pPr algn="ctr"/>
+            <a:r>
+              <a:rPr lang="en-MY" sz="800" dirty="0">
+                <a:solidFill>
+                  <a:schemeClr val="tx1"/>
+                </a:solidFill>
+              </a:rPr>
+              <a:t>D2</a:t>
+            </a:r>
+          </a:p>
+        </p:txBody>
+      </p:sp>
+      <p:sp>
+        <p:nvSpPr>
+          <p:cNvPr id="168" name="Oval 167">
+            <a:extLst>
+              <a:ext uri="{FF2B5EF4-FFF2-40B4-BE49-F238E27FC236}">
+                <a16:creationId xmlns:a16="http://schemas.microsoft.com/office/drawing/2014/main" id="{89D89ED9-A9B4-EE24-CBB3-AB1E6F349061}"/>
+              </a:ext>
+            </a:extLst>
+          </p:cNvPr>
+          <p:cNvSpPr/>
+          <p:nvPr/>
+        </p:nvSpPr>
+        <p:spPr>
+          <a:xfrm>
+            <a:off x="7608168" y="5085184"/>
+            <a:ext cx="288032" cy="288032"/>
+          </a:xfrm>
+          <a:prstGeom prst="ellipse">
+            <a:avLst/>
+          </a:prstGeom>
+          <a:solidFill>
+            <a:srgbClr val="FFC000"/>
+          </a:solidFill>
+          <a:ln>
+            <a:noFill/>
+          </a:ln>
+        </p:spPr>
+        <p:style>
+          <a:lnRef idx="2">
+            <a:schemeClr val="accent1">
+              <a:shade val="15000"/>
+            </a:schemeClr>
+          </a:lnRef>
+          <a:fillRef idx="1">
+            <a:schemeClr val="accent1"/>
+          </a:fillRef>
+          <a:effectRef idx="0">
+            <a:schemeClr val="accent1"/>
+          </a:effectRef>
+          <a:fontRef idx="minor">
+            <a:schemeClr val="lt1"/>
+          </a:fontRef>
+        </p:style>
+        <p:txBody>
+          <a:bodyPr wrap="none" rtlCol="0" anchor="ctr"/>
+          <a:lstStyle/>
+          <a:p>
+            <a:pPr algn="ctr"/>
+            <a:r>
+              <a:rPr lang="en-MY" sz="800" dirty="0">
+                <a:solidFill>
+                  <a:schemeClr val="tx1"/>
+                </a:solidFill>
+              </a:rPr>
+              <a:t>D3</a:t>
+            </a:r>
+          </a:p>
+        </p:txBody>
+      </p:sp>
     </p:spTree>
     <p:extLst>
       <p:ext uri="{BB962C8B-B14F-4D97-AF65-F5344CB8AC3E}">
@@ -7305,6 +12059,113 @@
     <p:extLst>
       <p:ext uri="{BB962C8B-B14F-4D97-AF65-F5344CB8AC3E}">
         <p14:creationId xmlns:p14="http://schemas.microsoft.com/office/powerpoint/2010/main" val="2783751418"/>
+      </p:ext>
+    </p:extLst>
+  </p:cSld>
+  <p:clrMapOvr>
+    <a:masterClrMapping/>
+  </p:clrMapOvr>
+</p:sld>
+</file>
+
+<file path=ppt/slides/slide3.xml><?xml version="1.0" encoding="utf-8"?>
+<p:sld xmlns:a="http://schemas.openxmlformats.org/drawingml/2006/main" xmlns:r="http://schemas.openxmlformats.org/officeDocument/2006/relationships" xmlns:p="http://schemas.openxmlformats.org/presentationml/2006/main">
+  <p:cSld>
+    <p:spTree>
+      <p:nvGrpSpPr>
+        <p:cNvPr id="1" name=""/>
+        <p:cNvGrpSpPr/>
+        <p:nvPr/>
+      </p:nvGrpSpPr>
+      <p:grpSpPr>
+        <a:xfrm>
+          <a:off x="0" y="0"/>
+          <a:ext cx="0" cy="0"/>
+          <a:chOff x="0" y="0"/>
+          <a:chExt cx="0" cy="0"/>
+        </a:xfrm>
+      </p:grpSpPr>
+      <p:sp>
+        <p:nvSpPr>
+          <p:cNvPr id="22" name="Rectangle 21">
+            <a:extLst>
+              <a:ext uri="{FF2B5EF4-FFF2-40B4-BE49-F238E27FC236}">
+                <a16:creationId xmlns:a16="http://schemas.microsoft.com/office/drawing/2014/main" id="{02330F6B-91F1-41CF-CF4C-67AC52413A1F}"/>
+              </a:ext>
+            </a:extLst>
+          </p:cNvPr>
+          <p:cNvSpPr/>
+          <p:nvPr/>
+        </p:nvSpPr>
+        <p:spPr>
+          <a:xfrm>
+            <a:off x="5663952" y="7857492"/>
+            <a:ext cx="504056" cy="216024"/>
+          </a:xfrm>
+          <a:prstGeom prst="rect">
+            <a:avLst/>
+          </a:prstGeom>
+          <a:noFill/>
+          <a:ln>
+            <a:solidFill>
+              <a:srgbClr val="FF0000"/>
+            </a:solidFill>
+          </a:ln>
+        </p:spPr>
+        <p:style>
+          <a:lnRef idx="2">
+            <a:schemeClr val="accent1">
+              <a:shade val="15000"/>
+            </a:schemeClr>
+          </a:lnRef>
+          <a:fillRef idx="1">
+            <a:schemeClr val="accent1"/>
+          </a:fillRef>
+          <a:effectRef idx="0">
+            <a:schemeClr val="accent1"/>
+          </a:effectRef>
+          <a:fontRef idx="minor">
+            <a:schemeClr val="lt1"/>
+          </a:fontRef>
+        </p:style>
+        <p:txBody>
+          <a:bodyPr rtlCol="0" anchor="ctr"/>
+          <a:lstStyle/>
+          <a:p>
+            <a:pPr algn="ctr"/>
+            <a:endParaRPr lang="en-MY"/>
+          </a:p>
+        </p:txBody>
+      </p:sp>
+      <p:sp>
+        <p:nvSpPr>
+          <p:cNvPr id="40" name="Content Placeholder 39">
+            <a:extLst>
+              <a:ext uri="{FF2B5EF4-FFF2-40B4-BE49-F238E27FC236}">
+                <a16:creationId xmlns:a16="http://schemas.microsoft.com/office/drawing/2014/main" id="{D17EDE12-C4AE-A051-D42A-F592BDC9CF56}"/>
+              </a:ext>
+            </a:extLst>
+          </p:cNvPr>
+          <p:cNvSpPr>
+            <a:spLocks noGrp="1"/>
+          </p:cNvSpPr>
+          <p:nvPr>
+            <p:ph idx="1"/>
+          </p:nvPr>
+        </p:nvSpPr>
+        <p:spPr/>
+        <p:txBody>
+          <a:bodyPr/>
+          <a:lstStyle/>
+          <a:p>
+            <a:endParaRPr lang="en-MY"/>
+          </a:p>
+        </p:txBody>
+      </p:sp>
+    </p:spTree>
+    <p:extLst>
+      <p:ext uri="{BB962C8B-B14F-4D97-AF65-F5344CB8AC3E}">
+        <p14:creationId xmlns:p14="http://schemas.microsoft.com/office/powerpoint/2010/main" val="425275617"/>
       </p:ext>
     </p:extLst>
   </p:cSld>

</xml_diff>

<commit_message>
Ver 6.1.5.9 - KN - 20250601 - Gitted   [Feature] Added LOT_END_IN_MAGAZINE_EMPTY to prompt event. OsKul/TPChng   [Feature] Added Speed2,3 Ratio to define line2 and 3. OsKul/TPChng   [Feature] Added Volume Display on Weight Measure. OsKul/TPChng Ver 6.1.5.8 - KN - 20250528   [BugFix] DryRun not dispense. OsKul/TPChng   [Feature] Added EHeightSensorType.Sick_OD2 support. OsKul/TPChng
</commit_message>
<xml_diff>
--- a/Doc/Z Pattern Cast Height 20240905.pptx
+++ b/Doc/Z Pattern Cast Height 20240905.pptx
@@ -261,7 +261,7 @@
           <a:p>
             <a:fld id="{FC340914-155A-4C7C-9240-728CD98F1C4F}" type="datetimeFigureOut">
               <a:rPr lang="en-US" smtClean="0"/>
-              <a:t>3/19/2025</a:t>
+              <a:t>6/3/2025</a:t>
             </a:fld>
             <a:endParaRPr lang="en-US"/>
           </a:p>
@@ -459,7 +459,7 @@
           <a:p>
             <a:fld id="{FC340914-155A-4C7C-9240-728CD98F1C4F}" type="datetimeFigureOut">
               <a:rPr lang="en-US" smtClean="0"/>
-              <a:t>3/19/2025</a:t>
+              <a:t>6/3/2025</a:t>
             </a:fld>
             <a:endParaRPr lang="en-US"/>
           </a:p>
@@ -667,7 +667,7 @@
           <a:p>
             <a:fld id="{FC340914-155A-4C7C-9240-728CD98F1C4F}" type="datetimeFigureOut">
               <a:rPr lang="en-US" smtClean="0"/>
-              <a:t>3/19/2025</a:t>
+              <a:t>6/3/2025</a:t>
             </a:fld>
             <a:endParaRPr lang="en-US"/>
           </a:p>
@@ -865,7 +865,7 @@
           <a:p>
             <a:fld id="{FC340914-155A-4C7C-9240-728CD98F1C4F}" type="datetimeFigureOut">
               <a:rPr lang="en-US" smtClean="0"/>
-              <a:t>3/19/2025</a:t>
+              <a:t>6/3/2025</a:t>
             </a:fld>
             <a:endParaRPr lang="en-US"/>
           </a:p>
@@ -1140,7 +1140,7 @@
           <a:p>
             <a:fld id="{FC340914-155A-4C7C-9240-728CD98F1C4F}" type="datetimeFigureOut">
               <a:rPr lang="en-US" smtClean="0"/>
-              <a:t>3/19/2025</a:t>
+              <a:t>6/3/2025</a:t>
             </a:fld>
             <a:endParaRPr lang="en-US"/>
           </a:p>
@@ -1405,7 +1405,7 @@
           <a:p>
             <a:fld id="{FC340914-155A-4C7C-9240-728CD98F1C4F}" type="datetimeFigureOut">
               <a:rPr lang="en-US" smtClean="0"/>
-              <a:t>3/19/2025</a:t>
+              <a:t>6/3/2025</a:t>
             </a:fld>
             <a:endParaRPr lang="en-US"/>
           </a:p>
@@ -1817,7 +1817,7 @@
           <a:p>
             <a:fld id="{FC340914-155A-4C7C-9240-728CD98F1C4F}" type="datetimeFigureOut">
               <a:rPr lang="en-US" smtClean="0"/>
-              <a:t>3/19/2025</a:t>
+              <a:t>6/3/2025</a:t>
             </a:fld>
             <a:endParaRPr lang="en-US"/>
           </a:p>
@@ -1958,7 +1958,7 @@
           <a:p>
             <a:fld id="{FC340914-155A-4C7C-9240-728CD98F1C4F}" type="datetimeFigureOut">
               <a:rPr lang="en-US" smtClean="0"/>
-              <a:t>3/19/2025</a:t>
+              <a:t>6/3/2025</a:t>
             </a:fld>
             <a:endParaRPr lang="en-US"/>
           </a:p>
@@ -2071,7 +2071,7 @@
           <a:p>
             <a:fld id="{FC340914-155A-4C7C-9240-728CD98F1C4F}" type="datetimeFigureOut">
               <a:rPr lang="en-US" smtClean="0"/>
-              <a:t>3/19/2025</a:t>
+              <a:t>6/3/2025</a:t>
             </a:fld>
             <a:endParaRPr lang="en-US"/>
           </a:p>
@@ -2382,7 +2382,7 @@
           <a:p>
             <a:fld id="{FC340914-155A-4C7C-9240-728CD98F1C4F}" type="datetimeFigureOut">
               <a:rPr lang="en-US" smtClean="0"/>
-              <a:t>3/19/2025</a:t>
+              <a:t>6/3/2025</a:t>
             </a:fld>
             <a:endParaRPr lang="en-US"/>
           </a:p>
@@ -2670,7 +2670,7 @@
           <a:p>
             <a:fld id="{FC340914-155A-4C7C-9240-728CD98F1C4F}" type="datetimeFigureOut">
               <a:rPr lang="en-US" smtClean="0"/>
-              <a:t>3/19/2025</a:t>
+              <a:t>6/3/2025</a:t>
             </a:fld>
             <a:endParaRPr lang="en-US"/>
           </a:p>
@@ -2911,7 +2911,7 @@
           <a:p>
             <a:fld id="{FC340914-155A-4C7C-9240-728CD98F1C4F}" type="datetimeFigureOut">
               <a:rPr lang="en-US" smtClean="0"/>
-              <a:t>3/19/2025</a:t>
+              <a:t>6/3/2025</a:t>
             </a:fld>
             <a:endParaRPr lang="en-US"/>
           </a:p>
@@ -7417,13 +7417,14 @@
           </p:cNvPr>
           <p:cNvCxnSpPr>
             <a:cxnSpLocks/>
+            <a:stCxn id="51" idx="6"/>
           </p:cNvCxnSpPr>
           <p:nvPr/>
         </p:nvCxnSpPr>
         <p:spPr>
           <a:xfrm>
-            <a:off x="7752184" y="4005064"/>
-            <a:ext cx="1224136" cy="0"/>
+            <a:off x="8112224" y="4005064"/>
+            <a:ext cx="864096" cy="0"/>
           </a:xfrm>
           <a:prstGeom prst="straightConnector1">
             <a:avLst/>
@@ -7465,13 +7466,15 @@
           </p:cNvPr>
           <p:cNvCxnSpPr>
             <a:cxnSpLocks/>
+            <a:stCxn id="167" idx="3"/>
+            <a:endCxn id="168" idx="7"/>
           </p:cNvCxnSpPr>
           <p:nvPr/>
         </p:nvCxnSpPr>
         <p:spPr>
           <a:xfrm flipH="1">
-            <a:off x="7854019" y="4005064"/>
-            <a:ext cx="1266317" cy="1122301"/>
+            <a:off x="8070043" y="4106899"/>
+            <a:ext cx="948458" cy="1020466"/>
           </a:xfrm>
           <a:prstGeom prst="straightConnector1">
             <a:avLst/>
@@ -7516,7 +7519,7 @@
         </p:nvSpPr>
         <p:spPr>
           <a:xfrm>
-            <a:off x="7392144" y="3501008"/>
+            <a:off x="7608168" y="3501008"/>
             <a:ext cx="720080" cy="216024"/>
           </a:xfrm>
           <a:prstGeom prst="rect">
@@ -7570,13 +7573,14 @@
           </p:cNvPr>
           <p:cNvCxnSpPr>
             <a:cxnSpLocks/>
+            <a:stCxn id="168" idx="6"/>
           </p:cNvCxnSpPr>
           <p:nvPr/>
         </p:nvCxnSpPr>
         <p:spPr>
           <a:xfrm>
-            <a:off x="7752184" y="5229200"/>
-            <a:ext cx="1224136" cy="0"/>
+            <a:off x="8112224" y="5229200"/>
+            <a:ext cx="864096" cy="0"/>
           </a:xfrm>
           <a:prstGeom prst="straightConnector1">
             <a:avLst/>
@@ -7716,7 +7720,7 @@
                   <a:sysClr val="windowText" lastClr="000000"/>
                 </a:solidFill>
               </a:rPr>
-              <a:t>SpeedF</a:t>
+              <a:t>Speed2</a:t>
             </a:r>
           </a:p>
         </p:txBody>
@@ -7830,7 +7834,7 @@
                   <a:sysClr val="windowText" lastClr="000000"/>
                 </a:solidFill>
               </a:rPr>
-              <a:t>Speed</a:t>
+              <a:t>Speed3</a:t>
             </a:r>
           </a:p>
         </p:txBody>
@@ -7881,7 +7885,7 @@
           <a:lstStyle/>
           <a:p>
             <a:r>
-              <a:rPr lang="en-US" sz="800" dirty="0">
+              <a:rPr lang="en-US" sz="1000" dirty="0">
                 <a:solidFill>
                   <a:sysClr val="windowText" lastClr="000000"/>
                 </a:solidFill>
@@ -7909,7 +7913,7 @@
         </p:nvCxnSpPr>
         <p:spPr>
           <a:xfrm>
-            <a:off x="7752184" y="3717032"/>
+            <a:off x="7968208" y="3717032"/>
             <a:ext cx="0" cy="144016"/>
           </a:xfrm>
           <a:prstGeom prst="straightConnector1">
@@ -9052,7 +9056,7 @@
         </p:nvSpPr>
         <p:spPr>
           <a:xfrm>
-            <a:off x="7608168" y="3861048"/>
+            <a:off x="7824192" y="3861048"/>
             <a:ext cx="288032" cy="288032"/>
           </a:xfrm>
           <a:prstGeom prst="ellipse">
@@ -9255,7 +9259,7 @@
           <a:lstStyle/>
           <a:p>
             <a:r>
-              <a:rPr lang="en-US" sz="800" dirty="0">
+              <a:rPr lang="en-US" sz="1000" dirty="0">
                 <a:solidFill>
                   <a:sysClr val="windowText" lastClr="000000"/>
                 </a:solidFill>
@@ -9358,7 +9362,7 @@
           <a:lstStyle/>
           <a:p>
             <a:r>
-              <a:rPr lang="en-US" sz="800" dirty="0">
+              <a:rPr lang="en-US" sz="1000" dirty="0">
                 <a:solidFill>
                   <a:sysClr val="windowText" lastClr="000000"/>
                 </a:solidFill>
@@ -9414,7 +9418,7 @@
           <a:lstStyle/>
           <a:p>
             <a:r>
-              <a:rPr lang="en-US" sz="800" dirty="0">
+              <a:rPr lang="en-US" sz="1000" dirty="0">
                 <a:solidFill>
                   <a:sysClr val="windowText" lastClr="000000"/>
                 </a:solidFill>
@@ -9470,7 +9474,7 @@
           <a:lstStyle/>
           <a:p>
             <a:r>
-              <a:rPr lang="en-US" sz="800" dirty="0">
+              <a:rPr lang="en-US" sz="1000" dirty="0">
                 <a:solidFill>
                   <a:sysClr val="windowText" lastClr="000000"/>
                 </a:solidFill>
@@ -9948,7 +9952,7 @@
           <a:lstStyle/>
           <a:p>
             <a:r>
-              <a:rPr lang="en-US" sz="800" dirty="0">
+              <a:rPr lang="en-US" sz="1000" dirty="0">
                 <a:solidFill>
                   <a:sysClr val="windowText" lastClr="000000"/>
                 </a:solidFill>
@@ -10004,7 +10008,7 @@
           <a:lstStyle/>
           <a:p>
             <a:r>
-              <a:rPr lang="en-US" sz="800" dirty="0">
+              <a:rPr lang="en-US" sz="1000" dirty="0">
                 <a:solidFill>
                   <a:sysClr val="windowText" lastClr="000000"/>
                 </a:solidFill>
@@ -10060,7 +10064,7 @@
           <a:lstStyle/>
           <a:p>
             <a:r>
-              <a:rPr lang="en-US" sz="800" dirty="0">
+              <a:rPr lang="en-US" sz="1000" dirty="0">
                 <a:solidFill>
                   <a:sysClr val="windowText" lastClr="000000"/>
                 </a:solidFill>
@@ -10202,7 +10206,7 @@
         </p:nvSpPr>
         <p:spPr>
           <a:xfrm>
-            <a:off x="7608168" y="5085184"/>
+            <a:off x="7824192" y="5085184"/>
             <a:ext cx="288032" cy="288032"/>
           </a:xfrm>
           <a:prstGeom prst="ellipse">

</xml_diff>